<commit_message>
finished the 2nd part of ppt
</commit_message>
<xml_diff>
--- a/Presentation/CMPUT631-ProjectProposal-V0P1.pptx
+++ b/Presentation/CMPUT631-ProjectProposal-V0P1.pptx
@@ -5,10 +5,10 @@
     <p:sldMasterId id="2147483648" r:id="rId1"/>
   </p:sldMasterIdLst>
   <p:notesMasterIdLst>
-    <p:notesMasterId r:id="rId15"/>
+    <p:notesMasterId r:id="rId16"/>
   </p:notesMasterIdLst>
   <p:handoutMasterIdLst>
-    <p:handoutMasterId r:id="rId16"/>
+    <p:handoutMasterId r:id="rId17"/>
   </p:handoutMasterIdLst>
   <p:sldIdLst>
     <p:sldId id="256" r:id="rId2"/>
@@ -19,11 +19,12 @@
     <p:sldId id="266" r:id="rId7"/>
     <p:sldId id="272" r:id="rId8"/>
     <p:sldId id="270" r:id="rId9"/>
-    <p:sldId id="271" r:id="rId10"/>
-    <p:sldId id="262" r:id="rId11"/>
-    <p:sldId id="263" r:id="rId12"/>
-    <p:sldId id="264" r:id="rId13"/>
-    <p:sldId id="265" r:id="rId14"/>
+    <p:sldId id="273" r:id="rId10"/>
+    <p:sldId id="271" r:id="rId11"/>
+    <p:sldId id="262" r:id="rId12"/>
+    <p:sldId id="263" r:id="rId13"/>
+    <p:sldId id="264" r:id="rId14"/>
+    <p:sldId id="265" r:id="rId15"/>
   </p:sldIdLst>
   <p:sldSz cx="9144000" cy="6858000" type="screen4x3"/>
   <p:notesSz cx="6858000" cy="9144000"/>
@@ -2414,6 +2415,757 @@
 </file>
 
 <file path=ppt/diagrams/colors4.xml><?xml version="1.0" encoding="utf-8"?>
+<dgm:colorsDef xmlns:dgm="http://schemas.openxmlformats.org/drawingml/2006/diagram" xmlns:a="http://schemas.openxmlformats.org/drawingml/2006/main" uniqueId="urn:microsoft.com/office/officeart/2005/8/colors/accent0_3">
+  <dgm:title val=""/>
+  <dgm:desc val=""/>
+  <dgm:catLst>
+    <dgm:cat type="mainScheme" pri="10300"/>
+  </dgm:catLst>
+  <dgm:styleLbl name="node0">
+    <dgm:fillClrLst meth="repeat">
+      <a:schemeClr val="dk2"/>
+    </dgm:fillClrLst>
+    <dgm:linClrLst meth="repeat">
+      <a:schemeClr val="lt2"/>
+    </dgm:linClrLst>
+    <dgm:effectClrLst/>
+    <dgm:txLinClrLst/>
+    <dgm:txFillClrLst/>
+    <dgm:txEffectClrLst/>
+  </dgm:styleLbl>
+  <dgm:styleLbl name="alignNode1">
+    <dgm:fillClrLst meth="repeat">
+      <a:schemeClr val="dk2"/>
+    </dgm:fillClrLst>
+    <dgm:linClrLst meth="repeat">
+      <a:schemeClr val="dk2"/>
+    </dgm:linClrLst>
+    <dgm:effectClrLst/>
+    <dgm:txLinClrLst/>
+    <dgm:txFillClrLst/>
+    <dgm:txEffectClrLst/>
+  </dgm:styleLbl>
+  <dgm:styleLbl name="node1">
+    <dgm:fillClrLst meth="repeat">
+      <a:schemeClr val="dk2"/>
+    </dgm:fillClrLst>
+    <dgm:linClrLst meth="repeat">
+      <a:schemeClr val="lt2"/>
+    </dgm:linClrLst>
+    <dgm:effectClrLst/>
+    <dgm:txLinClrLst/>
+    <dgm:txFillClrLst/>
+    <dgm:txEffectClrLst/>
+  </dgm:styleLbl>
+  <dgm:styleLbl name="lnNode1">
+    <dgm:fillClrLst meth="repeat">
+      <a:schemeClr val="dk2"/>
+    </dgm:fillClrLst>
+    <dgm:linClrLst meth="repeat">
+      <a:schemeClr val="lt2"/>
+    </dgm:linClrLst>
+    <dgm:effectClrLst/>
+    <dgm:txLinClrLst/>
+    <dgm:txFillClrLst/>
+    <dgm:txEffectClrLst/>
+  </dgm:styleLbl>
+  <dgm:styleLbl name="vennNode1">
+    <dgm:fillClrLst meth="repeat">
+      <a:schemeClr val="dk2">
+        <a:alpha val="50000"/>
+      </a:schemeClr>
+    </dgm:fillClrLst>
+    <dgm:linClrLst meth="repeat">
+      <a:schemeClr val="lt2"/>
+    </dgm:linClrLst>
+    <dgm:effectClrLst/>
+    <dgm:txLinClrLst/>
+    <dgm:txFillClrLst/>
+    <dgm:txEffectClrLst/>
+  </dgm:styleLbl>
+  <dgm:styleLbl name="node2">
+    <dgm:fillClrLst meth="repeat">
+      <a:schemeClr val="dk2"/>
+    </dgm:fillClrLst>
+    <dgm:linClrLst meth="repeat">
+      <a:schemeClr val="lt2"/>
+    </dgm:linClrLst>
+    <dgm:effectClrLst/>
+    <dgm:txLinClrLst/>
+    <dgm:txFillClrLst/>
+    <dgm:txEffectClrLst/>
+  </dgm:styleLbl>
+  <dgm:styleLbl name="node3">
+    <dgm:fillClrLst meth="repeat">
+      <a:schemeClr val="dk2"/>
+    </dgm:fillClrLst>
+    <dgm:linClrLst meth="repeat">
+      <a:schemeClr val="lt2"/>
+    </dgm:linClrLst>
+    <dgm:effectClrLst/>
+    <dgm:txLinClrLst/>
+    <dgm:txFillClrLst/>
+    <dgm:txEffectClrLst/>
+  </dgm:styleLbl>
+  <dgm:styleLbl name="node4">
+    <dgm:fillClrLst meth="repeat">
+      <a:schemeClr val="dk2"/>
+    </dgm:fillClrLst>
+    <dgm:linClrLst meth="repeat">
+      <a:schemeClr val="lt2"/>
+    </dgm:linClrLst>
+    <dgm:effectClrLst/>
+    <dgm:txLinClrLst/>
+    <dgm:txFillClrLst/>
+    <dgm:txEffectClrLst/>
+  </dgm:styleLbl>
+  <dgm:styleLbl name="fgImgPlace1">
+    <dgm:fillClrLst meth="repeat">
+      <a:schemeClr val="dk2">
+        <a:tint val="50000"/>
+      </a:schemeClr>
+    </dgm:fillClrLst>
+    <dgm:linClrLst meth="repeat">
+      <a:schemeClr val="lt2"/>
+    </dgm:linClrLst>
+    <dgm:effectClrLst/>
+    <dgm:txLinClrLst/>
+    <dgm:txFillClrLst meth="repeat">
+      <a:schemeClr val="lt2"/>
+    </dgm:txFillClrLst>
+    <dgm:txEffectClrLst/>
+  </dgm:styleLbl>
+  <dgm:styleLbl name="alignImgPlace1">
+    <dgm:fillClrLst meth="repeat">
+      <a:schemeClr val="dk2">
+        <a:tint val="50000"/>
+      </a:schemeClr>
+    </dgm:fillClrLst>
+    <dgm:linClrLst meth="repeat">
+      <a:schemeClr val="dk2">
+        <a:shade val="80000"/>
+      </a:schemeClr>
+    </dgm:linClrLst>
+    <dgm:effectClrLst/>
+    <dgm:txLinClrLst/>
+    <dgm:txFillClrLst meth="repeat">
+      <a:schemeClr val="lt2"/>
+    </dgm:txFillClrLst>
+    <dgm:txEffectClrLst/>
+  </dgm:styleLbl>
+  <dgm:styleLbl name="bgImgPlace1">
+    <dgm:fillClrLst meth="repeat">
+      <a:schemeClr val="dk2">
+        <a:tint val="50000"/>
+      </a:schemeClr>
+    </dgm:fillClrLst>
+    <dgm:linClrLst meth="repeat">
+      <a:schemeClr val="dk2">
+        <a:shade val="80000"/>
+      </a:schemeClr>
+    </dgm:linClrLst>
+    <dgm:effectClrLst/>
+    <dgm:txLinClrLst/>
+    <dgm:txFillClrLst meth="repeat">
+      <a:schemeClr val="lt2"/>
+    </dgm:txFillClrLst>
+    <dgm:txEffectClrLst/>
+  </dgm:styleLbl>
+  <dgm:styleLbl name="sibTrans2D1">
+    <dgm:fillClrLst meth="repeat">
+      <a:schemeClr val="dk2">
+        <a:tint val="60000"/>
+      </a:schemeClr>
+    </dgm:fillClrLst>
+    <dgm:linClrLst meth="repeat">
+      <a:schemeClr val="dk2">
+        <a:tint val="60000"/>
+      </a:schemeClr>
+    </dgm:linClrLst>
+    <dgm:effectClrLst/>
+    <dgm:txLinClrLst/>
+    <dgm:txFillClrLst/>
+    <dgm:txEffectClrLst/>
+  </dgm:styleLbl>
+  <dgm:styleLbl name="fgSibTrans2D1">
+    <dgm:fillClrLst meth="repeat">
+      <a:schemeClr val="dk2">
+        <a:tint val="60000"/>
+      </a:schemeClr>
+    </dgm:fillClrLst>
+    <dgm:linClrLst meth="repeat">
+      <a:schemeClr val="dk2">
+        <a:tint val="60000"/>
+      </a:schemeClr>
+    </dgm:linClrLst>
+    <dgm:effectClrLst/>
+    <dgm:txLinClrLst/>
+    <dgm:txFillClrLst/>
+    <dgm:txEffectClrLst/>
+  </dgm:styleLbl>
+  <dgm:styleLbl name="bgSibTrans2D1">
+    <dgm:fillClrLst meth="repeat">
+      <a:schemeClr val="dk2">
+        <a:tint val="60000"/>
+      </a:schemeClr>
+    </dgm:fillClrLst>
+    <dgm:linClrLst meth="repeat">
+      <a:schemeClr val="dk2">
+        <a:tint val="60000"/>
+      </a:schemeClr>
+    </dgm:linClrLst>
+    <dgm:effectClrLst/>
+    <dgm:txLinClrLst/>
+    <dgm:txFillClrLst/>
+    <dgm:txEffectClrLst/>
+  </dgm:styleLbl>
+  <dgm:styleLbl name="sibTrans1D1">
+    <dgm:fillClrLst meth="repeat">
+      <a:schemeClr val="dk2"/>
+    </dgm:fillClrLst>
+    <dgm:linClrLst meth="repeat">
+      <a:schemeClr val="dk2"/>
+    </dgm:linClrLst>
+    <dgm:effectClrLst/>
+    <dgm:txLinClrLst/>
+    <dgm:txFillClrLst meth="repeat">
+      <a:schemeClr val="lt2"/>
+    </dgm:txFillClrLst>
+    <dgm:txEffectClrLst/>
+  </dgm:styleLbl>
+  <dgm:styleLbl name="callout">
+    <dgm:fillClrLst meth="repeat">
+      <a:schemeClr val="dk2"/>
+    </dgm:fillClrLst>
+    <dgm:linClrLst meth="repeat">
+      <a:schemeClr val="dk2">
+        <a:tint val="50000"/>
+      </a:schemeClr>
+    </dgm:linClrLst>
+    <dgm:effectClrLst/>
+    <dgm:txLinClrLst/>
+    <dgm:txFillClrLst meth="repeat">
+      <a:schemeClr val="lt2"/>
+    </dgm:txFillClrLst>
+    <dgm:txEffectClrLst/>
+  </dgm:styleLbl>
+  <dgm:styleLbl name="asst0">
+    <dgm:fillClrLst meth="repeat">
+      <a:schemeClr val="dk2"/>
+    </dgm:fillClrLst>
+    <dgm:linClrLst meth="repeat">
+      <a:schemeClr val="lt2"/>
+    </dgm:linClrLst>
+    <dgm:effectClrLst/>
+    <dgm:txLinClrLst/>
+    <dgm:txFillClrLst/>
+    <dgm:txEffectClrLst/>
+  </dgm:styleLbl>
+  <dgm:styleLbl name="asst1">
+    <dgm:fillClrLst meth="repeat">
+      <a:schemeClr val="dk2"/>
+    </dgm:fillClrLst>
+    <dgm:linClrLst meth="repeat">
+      <a:schemeClr val="lt2"/>
+    </dgm:linClrLst>
+    <dgm:effectClrLst/>
+    <dgm:txLinClrLst/>
+    <dgm:txFillClrLst/>
+    <dgm:txEffectClrLst/>
+  </dgm:styleLbl>
+  <dgm:styleLbl name="asst2">
+    <dgm:fillClrLst meth="repeat">
+      <a:schemeClr val="dk2"/>
+    </dgm:fillClrLst>
+    <dgm:linClrLst meth="repeat">
+      <a:schemeClr val="lt2"/>
+    </dgm:linClrLst>
+    <dgm:effectClrLst/>
+    <dgm:txLinClrLst/>
+    <dgm:txFillClrLst/>
+    <dgm:txEffectClrLst/>
+  </dgm:styleLbl>
+  <dgm:styleLbl name="asst3">
+    <dgm:fillClrLst meth="repeat">
+      <a:schemeClr val="dk2"/>
+    </dgm:fillClrLst>
+    <dgm:linClrLst meth="repeat">
+      <a:schemeClr val="lt2"/>
+    </dgm:linClrLst>
+    <dgm:effectClrLst/>
+    <dgm:txLinClrLst/>
+    <dgm:txFillClrLst/>
+    <dgm:txEffectClrLst/>
+  </dgm:styleLbl>
+  <dgm:styleLbl name="asst4">
+    <dgm:fillClrLst meth="repeat">
+      <a:schemeClr val="dk2"/>
+    </dgm:fillClrLst>
+    <dgm:linClrLst meth="repeat">
+      <a:schemeClr val="lt2"/>
+    </dgm:linClrLst>
+    <dgm:effectClrLst/>
+    <dgm:txLinClrLst/>
+    <dgm:txFillClrLst/>
+    <dgm:txEffectClrLst/>
+  </dgm:styleLbl>
+  <dgm:styleLbl name="parChTrans2D1">
+    <dgm:fillClrLst meth="repeat">
+      <a:schemeClr val="dk2">
+        <a:tint val="60000"/>
+      </a:schemeClr>
+    </dgm:fillClrLst>
+    <dgm:linClrLst meth="repeat">
+      <a:schemeClr val="dk2">
+        <a:tint val="60000"/>
+      </a:schemeClr>
+    </dgm:linClrLst>
+    <dgm:effectClrLst/>
+    <dgm:txLinClrLst/>
+    <dgm:txFillClrLst meth="repeat">
+      <a:schemeClr val="lt2"/>
+    </dgm:txFillClrLst>
+    <dgm:txEffectClrLst/>
+  </dgm:styleLbl>
+  <dgm:styleLbl name="parChTrans2D2">
+    <dgm:fillClrLst meth="repeat">
+      <a:schemeClr val="dk2"/>
+    </dgm:fillClrLst>
+    <dgm:linClrLst meth="repeat">
+      <a:schemeClr val="dk2"/>
+    </dgm:linClrLst>
+    <dgm:effectClrLst/>
+    <dgm:txLinClrLst/>
+    <dgm:txFillClrLst meth="repeat">
+      <a:schemeClr val="lt2"/>
+    </dgm:txFillClrLst>
+    <dgm:txEffectClrLst/>
+  </dgm:styleLbl>
+  <dgm:styleLbl name="parChTrans2D3">
+    <dgm:fillClrLst meth="repeat">
+      <a:schemeClr val="dk2"/>
+    </dgm:fillClrLst>
+    <dgm:linClrLst meth="repeat">
+      <a:schemeClr val="dk2"/>
+    </dgm:linClrLst>
+    <dgm:effectClrLst/>
+    <dgm:txLinClrLst/>
+    <dgm:txFillClrLst meth="repeat">
+      <a:schemeClr val="lt2"/>
+    </dgm:txFillClrLst>
+    <dgm:txEffectClrLst/>
+  </dgm:styleLbl>
+  <dgm:styleLbl name="parChTrans2D4">
+    <dgm:fillClrLst meth="repeat">
+      <a:schemeClr val="dk2"/>
+    </dgm:fillClrLst>
+    <dgm:linClrLst meth="repeat">
+      <a:schemeClr val="dk2"/>
+    </dgm:linClrLst>
+    <dgm:effectClrLst/>
+    <dgm:txLinClrLst/>
+    <dgm:txFillClrLst meth="repeat">
+      <a:schemeClr val="lt2"/>
+    </dgm:txFillClrLst>
+    <dgm:txEffectClrLst/>
+  </dgm:styleLbl>
+  <dgm:styleLbl name="parChTrans1D1">
+    <dgm:fillClrLst meth="repeat">
+      <a:schemeClr val="dk2"/>
+    </dgm:fillClrLst>
+    <dgm:linClrLst meth="repeat">
+      <a:schemeClr val="dk2">
+        <a:shade val="60000"/>
+      </a:schemeClr>
+    </dgm:linClrLst>
+    <dgm:effectClrLst/>
+    <dgm:txLinClrLst/>
+    <dgm:txFillClrLst meth="repeat">
+      <a:schemeClr val="tx1"/>
+    </dgm:txFillClrLst>
+    <dgm:txEffectClrLst/>
+  </dgm:styleLbl>
+  <dgm:styleLbl name="parChTrans1D2">
+    <dgm:fillClrLst meth="repeat">
+      <a:schemeClr val="dk2"/>
+    </dgm:fillClrLst>
+    <dgm:linClrLst meth="repeat">
+      <a:schemeClr val="dk2">
+        <a:shade val="60000"/>
+      </a:schemeClr>
+    </dgm:linClrLst>
+    <dgm:effectClrLst/>
+    <dgm:txLinClrLst/>
+    <dgm:txFillClrLst meth="repeat">
+      <a:schemeClr val="tx1"/>
+    </dgm:txFillClrLst>
+    <dgm:txEffectClrLst/>
+  </dgm:styleLbl>
+  <dgm:styleLbl name="parChTrans1D3">
+    <dgm:fillClrLst meth="repeat">
+      <a:schemeClr val="dk2"/>
+    </dgm:fillClrLst>
+    <dgm:linClrLst meth="repeat">
+      <a:schemeClr val="dk2">
+        <a:shade val="80000"/>
+      </a:schemeClr>
+    </dgm:linClrLst>
+    <dgm:effectClrLst/>
+    <dgm:txLinClrLst/>
+    <dgm:txFillClrLst meth="repeat">
+      <a:schemeClr val="tx1"/>
+    </dgm:txFillClrLst>
+    <dgm:txEffectClrLst/>
+  </dgm:styleLbl>
+  <dgm:styleLbl name="parChTrans1D4">
+    <dgm:fillClrLst meth="repeat">
+      <a:schemeClr val="dk2"/>
+    </dgm:fillClrLst>
+    <dgm:linClrLst meth="repeat">
+      <a:schemeClr val="dk2">
+        <a:shade val="80000"/>
+      </a:schemeClr>
+    </dgm:linClrLst>
+    <dgm:effectClrLst/>
+    <dgm:txLinClrLst/>
+    <dgm:txFillClrLst meth="repeat">
+      <a:schemeClr val="tx1"/>
+    </dgm:txFillClrLst>
+    <dgm:txEffectClrLst/>
+  </dgm:styleLbl>
+  <dgm:styleLbl name="fgAcc1">
+    <dgm:fillClrLst meth="repeat">
+      <a:schemeClr val="lt2">
+        <a:alpha val="90000"/>
+      </a:schemeClr>
+    </dgm:fillClrLst>
+    <dgm:linClrLst meth="repeat">
+      <a:schemeClr val="dk2"/>
+    </dgm:linClrLst>
+    <dgm:effectClrLst/>
+    <dgm:txLinClrLst/>
+    <dgm:txFillClrLst meth="repeat">
+      <a:schemeClr val="dk1"/>
+    </dgm:txFillClrLst>
+    <dgm:txEffectClrLst/>
+  </dgm:styleLbl>
+  <dgm:styleLbl name="conFgAcc1">
+    <dgm:fillClrLst meth="repeat">
+      <a:schemeClr val="lt2">
+        <a:alpha val="90000"/>
+      </a:schemeClr>
+    </dgm:fillClrLst>
+    <dgm:linClrLst meth="repeat">
+      <a:schemeClr val="dk2"/>
+    </dgm:linClrLst>
+    <dgm:effectClrLst/>
+    <dgm:txLinClrLst/>
+    <dgm:txFillClrLst meth="repeat">
+      <a:schemeClr val="dk1"/>
+    </dgm:txFillClrLst>
+    <dgm:txEffectClrLst/>
+  </dgm:styleLbl>
+  <dgm:styleLbl name="alignAcc1">
+    <dgm:fillClrLst meth="repeat">
+      <a:schemeClr val="lt2">
+        <a:alpha val="90000"/>
+      </a:schemeClr>
+    </dgm:fillClrLst>
+    <dgm:linClrLst meth="repeat">
+      <a:schemeClr val="dk2"/>
+    </dgm:linClrLst>
+    <dgm:effectClrLst/>
+    <dgm:txLinClrLst/>
+    <dgm:txFillClrLst meth="repeat">
+      <a:schemeClr val="dk1"/>
+    </dgm:txFillClrLst>
+    <dgm:txEffectClrLst/>
+  </dgm:styleLbl>
+  <dgm:styleLbl name="trAlignAcc1">
+    <dgm:fillClrLst meth="repeat">
+      <a:schemeClr val="lt2">
+        <a:alpha val="40000"/>
+      </a:schemeClr>
+    </dgm:fillClrLst>
+    <dgm:linClrLst meth="repeat">
+      <a:schemeClr val="dk2"/>
+    </dgm:linClrLst>
+    <dgm:effectClrLst/>
+    <dgm:txLinClrLst/>
+    <dgm:txFillClrLst meth="repeat">
+      <a:schemeClr val="dk1"/>
+    </dgm:txFillClrLst>
+    <dgm:txEffectClrLst/>
+  </dgm:styleLbl>
+  <dgm:styleLbl name="bgAcc1">
+    <dgm:fillClrLst meth="repeat">
+      <a:schemeClr val="lt2">
+        <a:alpha val="90000"/>
+      </a:schemeClr>
+    </dgm:fillClrLst>
+    <dgm:linClrLst meth="repeat">
+      <a:schemeClr val="dk2"/>
+    </dgm:linClrLst>
+    <dgm:effectClrLst/>
+    <dgm:txLinClrLst/>
+    <dgm:txFillClrLst meth="repeat">
+      <a:schemeClr val="dk1"/>
+    </dgm:txFillClrLst>
+    <dgm:txEffectClrLst/>
+  </dgm:styleLbl>
+  <dgm:styleLbl name="solidFgAcc1">
+    <dgm:fillClrLst meth="repeat">
+      <a:schemeClr val="lt2"/>
+    </dgm:fillClrLst>
+    <dgm:linClrLst meth="repeat">
+      <a:schemeClr val="dk2"/>
+    </dgm:linClrLst>
+    <dgm:effectClrLst/>
+    <dgm:txLinClrLst/>
+    <dgm:txFillClrLst meth="repeat">
+      <a:schemeClr val="dk1"/>
+    </dgm:txFillClrLst>
+    <dgm:txEffectClrLst/>
+  </dgm:styleLbl>
+  <dgm:styleLbl name="solidAlignAcc1">
+    <dgm:fillClrLst meth="repeat">
+      <a:schemeClr val="lt2"/>
+    </dgm:fillClrLst>
+    <dgm:linClrLst meth="repeat">
+      <a:schemeClr val="dk2"/>
+    </dgm:linClrLst>
+    <dgm:effectClrLst/>
+    <dgm:txLinClrLst/>
+    <dgm:txFillClrLst meth="repeat">
+      <a:schemeClr val="dk1"/>
+    </dgm:txFillClrLst>
+    <dgm:txEffectClrLst/>
+  </dgm:styleLbl>
+  <dgm:styleLbl name="solidBgAcc1">
+    <dgm:fillClrLst meth="repeat">
+      <a:schemeClr val="lt2"/>
+    </dgm:fillClrLst>
+    <dgm:linClrLst meth="repeat">
+      <a:schemeClr val="dk2"/>
+    </dgm:linClrLst>
+    <dgm:effectClrLst/>
+    <dgm:txLinClrLst/>
+    <dgm:txFillClrLst meth="repeat">
+      <a:schemeClr val="dk1"/>
+    </dgm:txFillClrLst>
+    <dgm:txEffectClrLst/>
+  </dgm:styleLbl>
+  <dgm:styleLbl name="fgAccFollowNode1">
+    <dgm:fillClrLst meth="repeat">
+      <a:schemeClr val="dk2">
+        <a:alpha val="90000"/>
+        <a:tint val="40000"/>
+      </a:schemeClr>
+    </dgm:fillClrLst>
+    <dgm:linClrLst meth="repeat">
+      <a:schemeClr val="dk2">
+        <a:alpha val="90000"/>
+        <a:tint val="40000"/>
+      </a:schemeClr>
+    </dgm:linClrLst>
+    <dgm:effectClrLst/>
+    <dgm:txLinClrLst/>
+    <dgm:txFillClrLst meth="repeat">
+      <a:schemeClr val="dk1"/>
+    </dgm:txFillClrLst>
+    <dgm:txEffectClrLst/>
+  </dgm:styleLbl>
+  <dgm:styleLbl name="alignAccFollowNode1">
+    <dgm:fillClrLst meth="repeat">
+      <a:schemeClr val="dk2">
+        <a:alpha val="90000"/>
+        <a:tint val="40000"/>
+      </a:schemeClr>
+    </dgm:fillClrLst>
+    <dgm:linClrLst meth="repeat">
+      <a:schemeClr val="dk2">
+        <a:alpha val="90000"/>
+        <a:tint val="40000"/>
+      </a:schemeClr>
+    </dgm:linClrLst>
+    <dgm:effectClrLst/>
+    <dgm:txLinClrLst/>
+    <dgm:txFillClrLst meth="repeat">
+      <a:schemeClr val="dk1"/>
+    </dgm:txFillClrLst>
+    <dgm:txEffectClrLst/>
+  </dgm:styleLbl>
+  <dgm:styleLbl name="bgAccFollowNode1">
+    <dgm:fillClrLst meth="repeat">
+      <a:schemeClr val="dk2">
+        <a:alpha val="90000"/>
+        <a:tint val="40000"/>
+      </a:schemeClr>
+    </dgm:fillClrLst>
+    <dgm:linClrLst meth="repeat">
+      <a:schemeClr val="dk2">
+        <a:alpha val="90000"/>
+        <a:tint val="40000"/>
+      </a:schemeClr>
+    </dgm:linClrLst>
+    <dgm:effectClrLst/>
+    <dgm:txLinClrLst/>
+    <dgm:txFillClrLst meth="repeat">
+      <a:schemeClr val="dk1"/>
+    </dgm:txFillClrLst>
+    <dgm:txEffectClrLst/>
+  </dgm:styleLbl>
+  <dgm:styleLbl name="fgAcc0">
+    <dgm:fillClrLst meth="repeat">
+      <a:schemeClr val="lt2">
+        <a:alpha val="90000"/>
+      </a:schemeClr>
+    </dgm:fillClrLst>
+    <dgm:linClrLst meth="repeat">
+      <a:schemeClr val="dk2"/>
+    </dgm:linClrLst>
+    <dgm:effectClrLst/>
+    <dgm:txLinClrLst/>
+    <dgm:txFillClrLst meth="repeat">
+      <a:schemeClr val="dk1"/>
+    </dgm:txFillClrLst>
+    <dgm:txEffectClrLst/>
+  </dgm:styleLbl>
+  <dgm:styleLbl name="fgAcc2">
+    <dgm:fillClrLst meth="repeat">
+      <a:schemeClr val="lt2">
+        <a:alpha val="90000"/>
+      </a:schemeClr>
+    </dgm:fillClrLst>
+    <dgm:linClrLst meth="repeat">
+      <a:schemeClr val="dk2"/>
+    </dgm:linClrLst>
+    <dgm:effectClrLst/>
+    <dgm:txLinClrLst/>
+    <dgm:txFillClrLst meth="repeat">
+      <a:schemeClr val="dk1"/>
+    </dgm:txFillClrLst>
+    <dgm:txEffectClrLst/>
+  </dgm:styleLbl>
+  <dgm:styleLbl name="fgAcc3">
+    <dgm:fillClrLst meth="repeat">
+      <a:schemeClr val="lt2">
+        <a:alpha val="90000"/>
+      </a:schemeClr>
+    </dgm:fillClrLst>
+    <dgm:linClrLst meth="repeat">
+      <a:schemeClr val="dk2"/>
+    </dgm:linClrLst>
+    <dgm:effectClrLst/>
+    <dgm:txLinClrLst/>
+    <dgm:txFillClrLst meth="repeat">
+      <a:schemeClr val="dk1"/>
+    </dgm:txFillClrLst>
+    <dgm:txEffectClrLst/>
+  </dgm:styleLbl>
+  <dgm:styleLbl name="fgAcc4">
+    <dgm:fillClrLst meth="repeat">
+      <a:schemeClr val="lt2">
+        <a:alpha val="90000"/>
+      </a:schemeClr>
+    </dgm:fillClrLst>
+    <dgm:linClrLst meth="repeat">
+      <a:schemeClr val="dk2"/>
+    </dgm:linClrLst>
+    <dgm:effectClrLst/>
+    <dgm:txLinClrLst/>
+    <dgm:txFillClrLst meth="repeat">
+      <a:schemeClr val="dk1"/>
+    </dgm:txFillClrLst>
+    <dgm:txEffectClrLst/>
+  </dgm:styleLbl>
+  <dgm:styleLbl name="bgShp">
+    <dgm:fillClrLst meth="repeat">
+      <a:schemeClr val="dk2">
+        <a:tint val="40000"/>
+      </a:schemeClr>
+    </dgm:fillClrLst>
+    <dgm:linClrLst meth="repeat">
+      <a:schemeClr val="dk2"/>
+    </dgm:linClrLst>
+    <dgm:effectClrLst/>
+    <dgm:txLinClrLst/>
+    <dgm:txFillClrLst meth="repeat">
+      <a:schemeClr val="dk1"/>
+    </dgm:txFillClrLst>
+    <dgm:txEffectClrLst/>
+  </dgm:styleLbl>
+  <dgm:styleLbl name="dkBgShp">
+    <dgm:fillClrLst meth="repeat">
+      <a:schemeClr val="dk2">
+        <a:shade val="80000"/>
+      </a:schemeClr>
+    </dgm:fillClrLst>
+    <dgm:linClrLst meth="repeat">
+      <a:schemeClr val="dk2"/>
+    </dgm:linClrLst>
+    <dgm:effectClrLst/>
+    <dgm:txLinClrLst/>
+    <dgm:txFillClrLst meth="repeat">
+      <a:schemeClr val="lt1"/>
+    </dgm:txFillClrLst>
+    <dgm:txEffectClrLst/>
+  </dgm:styleLbl>
+  <dgm:styleLbl name="trBgShp">
+    <dgm:fillClrLst meth="repeat">
+      <a:schemeClr val="dk2">
+        <a:tint val="50000"/>
+        <a:alpha val="40000"/>
+      </a:schemeClr>
+    </dgm:fillClrLst>
+    <dgm:linClrLst meth="repeat">
+      <a:schemeClr val="dk2"/>
+    </dgm:linClrLst>
+    <dgm:effectClrLst/>
+    <dgm:txLinClrLst/>
+    <dgm:txFillClrLst meth="repeat">
+      <a:schemeClr val="lt1"/>
+    </dgm:txFillClrLst>
+    <dgm:txEffectClrLst/>
+  </dgm:styleLbl>
+  <dgm:styleLbl name="fgShp">
+    <dgm:fillClrLst meth="repeat">
+      <a:schemeClr val="dk2">
+        <a:tint val="60000"/>
+      </a:schemeClr>
+    </dgm:fillClrLst>
+    <dgm:linClrLst meth="repeat">
+      <a:schemeClr val="lt2"/>
+    </dgm:linClrLst>
+    <dgm:effectClrLst/>
+    <dgm:txLinClrLst/>
+    <dgm:txFillClrLst meth="repeat">
+      <a:schemeClr val="dk1"/>
+    </dgm:txFillClrLst>
+    <dgm:txEffectClrLst/>
+  </dgm:styleLbl>
+  <dgm:styleLbl name="revTx">
+    <dgm:fillClrLst meth="repeat">
+      <a:schemeClr val="lt2">
+        <a:alpha val="0"/>
+      </a:schemeClr>
+    </dgm:fillClrLst>
+    <dgm:linClrLst meth="repeat">
+      <a:schemeClr val="dk1">
+        <a:alpha val="0"/>
+      </a:schemeClr>
+    </dgm:linClrLst>
+    <dgm:effectClrLst/>
+    <dgm:txLinClrLst/>
+    <dgm:txFillClrLst meth="repeat">
+      <a:schemeClr val="tx1"/>
+    </dgm:txFillClrLst>
+    <dgm:txEffectClrLst/>
+  </dgm:styleLbl>
+</dgm:colorsDef>
+</file>
+
+<file path=ppt/diagrams/colors5.xml><?xml version="1.0" encoding="utf-8"?>
 <dgm:colorsDef xmlns:dgm="http://schemas.openxmlformats.org/drawingml/2006/diagram" xmlns:a="http://schemas.openxmlformats.org/drawingml/2006/main" uniqueId="urn:microsoft.com/office/officeart/2005/8/colors/accent0_3">
   <dgm:title val=""/>
   <dgm:desc val=""/>
@@ -3978,6 +4730,308 @@
 </file>
 
 <file path=ppt/diagrams/data4.xml><?xml version="1.0" encoding="utf-8"?>
+<dgm:dataModel xmlns:dgm="http://schemas.openxmlformats.org/drawingml/2006/diagram" xmlns:a="http://schemas.openxmlformats.org/drawingml/2006/main">
+  <dgm:ptLst>
+    <dgm:pt modelId="{3864FB22-6654-4A1F-BB80-14CEF4C6158C}" type="doc">
+      <dgm:prSet loTypeId="urn:microsoft.com/office/officeart/2005/8/layout/process1" loCatId="process" qsTypeId="urn:microsoft.com/office/officeart/2005/8/quickstyle/simple3" qsCatId="simple" csTypeId="urn:microsoft.com/office/officeart/2005/8/colors/accent0_3" csCatId="mainScheme" phldr="1"/>
+      <dgm:spPr/>
+    </dgm:pt>
+    <dgm:pt modelId="{CB7992A6-AC8A-4C24-9F48-CEDEABBA7128}">
+      <dgm:prSet phldrT="[Text]" custT="1">
+        <dgm:style>
+          <a:lnRef idx="1">
+            <a:schemeClr val="accent1"/>
+          </a:lnRef>
+          <a:fillRef idx="2">
+            <a:schemeClr val="accent1"/>
+          </a:fillRef>
+          <a:effectRef idx="1">
+            <a:schemeClr val="accent1"/>
+          </a:effectRef>
+          <a:fontRef idx="minor">
+            <a:schemeClr val="dk1"/>
+          </a:fontRef>
+        </dgm:style>
+      </dgm:prSet>
+      <dgm:spPr>
+        <a:ln/>
+      </dgm:spPr>
+      <dgm:t>
+        <a:bodyPr spcFirstLastPara="0" vert="horz" wrap="square" lIns="60960" tIns="60960" rIns="60960" bIns="60960" numCol="1" spcCol="1270" anchor="ctr" anchorCtr="0"/>
+        <a:lstStyle/>
+        <a:p>
+          <a:pPr marL="0" lvl="0" indent="0" algn="ctr" defTabSz="711200">
+            <a:lnSpc>
+              <a:spcPct val="90000"/>
+            </a:lnSpc>
+            <a:spcBef>
+              <a:spcPct val="0"/>
+            </a:spcBef>
+            <a:spcAft>
+              <a:spcPct val="35000"/>
+            </a:spcAft>
+            <a:buNone/>
+          </a:pPr>
+          <a:r>
+            <a:rPr lang="en-US" sz="1600" b="1" kern="1200" dirty="0">
+              <a:solidFill>
+                <a:prstClr val="black"/>
+              </a:solidFill>
+              <a:latin typeface="Arial"/>
+              <a:ea typeface="+mn-ea"/>
+              <a:cs typeface="+mn-cs"/>
+            </a:rPr>
+            <a:t>Baseline Evaluation</a:t>
+          </a:r>
+        </a:p>
+      </dgm:t>
+    </dgm:pt>
+    <dgm:pt modelId="{39BC531E-9DBA-4818-8BD5-41ECA75341AE}" type="parTrans" cxnId="{86B2A4E5-9EE6-4868-ABCA-0024327CF0AD}">
+      <dgm:prSet/>
+      <dgm:spPr/>
+      <dgm:t>
+        <a:bodyPr/>
+        <a:lstStyle/>
+        <a:p>
+          <a:endParaRPr lang="en-US"/>
+        </a:p>
+      </dgm:t>
+    </dgm:pt>
+    <dgm:pt modelId="{5C18E0DA-3616-421C-A781-23AF032467F7}" type="sibTrans" cxnId="{86B2A4E5-9EE6-4868-ABCA-0024327CF0AD}">
+      <dgm:prSet/>
+      <dgm:spPr/>
+      <dgm:t>
+        <a:bodyPr/>
+        <a:lstStyle/>
+        <a:p>
+          <a:endParaRPr lang="en-US"/>
+        </a:p>
+      </dgm:t>
+    </dgm:pt>
+    <dgm:pt modelId="{4F7689B0-33C9-4732-8C26-B1327C3C142F}">
+      <dgm:prSet phldrT="[Text]" custT="1">
+        <dgm:style>
+          <a:lnRef idx="1">
+            <a:schemeClr val="accent2"/>
+          </a:lnRef>
+          <a:fillRef idx="2">
+            <a:schemeClr val="accent2"/>
+          </a:fillRef>
+          <a:effectRef idx="1">
+            <a:schemeClr val="accent2"/>
+          </a:effectRef>
+          <a:fontRef idx="minor">
+            <a:schemeClr val="dk1"/>
+          </a:fontRef>
+        </dgm:style>
+      </dgm:prSet>
+      <dgm:spPr>
+        <a:ln/>
+      </dgm:spPr>
+      <dgm:t>
+        <a:bodyPr spcFirstLastPara="0" vert="horz" wrap="square" lIns="60960" tIns="60960" rIns="60960" bIns="60960" numCol="1" spcCol="1270" anchor="ctr" anchorCtr="0"/>
+        <a:lstStyle/>
+        <a:p>
+          <a:pPr marL="0" lvl="0" indent="0" algn="ctr" defTabSz="711200">
+            <a:lnSpc>
+              <a:spcPct val="90000"/>
+            </a:lnSpc>
+            <a:spcBef>
+              <a:spcPct val="0"/>
+            </a:spcBef>
+            <a:spcAft>
+              <a:spcPct val="35000"/>
+            </a:spcAft>
+            <a:buNone/>
+          </a:pPr>
+          <a:r>
+            <a:rPr lang="en-US" sz="1600" b="1" kern="1200" dirty="0">
+              <a:solidFill>
+                <a:prstClr val="black"/>
+              </a:solidFill>
+              <a:latin typeface="Arial"/>
+              <a:ea typeface="+mn-ea"/>
+              <a:cs typeface="+mn-cs"/>
+            </a:rPr>
+            <a:t>Depth Info. Extraction and Utilization</a:t>
+          </a:r>
+        </a:p>
+      </dgm:t>
+    </dgm:pt>
+    <dgm:pt modelId="{85E505F5-FCC8-4B28-BA48-90BE25F2E9D3}" type="parTrans" cxnId="{A2DF76DF-3E32-41A5-8E57-8BAAAED10EF9}">
+      <dgm:prSet/>
+      <dgm:spPr/>
+      <dgm:t>
+        <a:bodyPr/>
+        <a:lstStyle/>
+        <a:p>
+          <a:endParaRPr lang="en-US"/>
+        </a:p>
+      </dgm:t>
+    </dgm:pt>
+    <dgm:pt modelId="{E15DFF01-335B-40A7-9707-4ACB4C1A3B63}" type="sibTrans" cxnId="{A2DF76DF-3E32-41A5-8E57-8BAAAED10EF9}">
+      <dgm:prSet/>
+      <dgm:spPr/>
+      <dgm:t>
+        <a:bodyPr/>
+        <a:lstStyle/>
+        <a:p>
+          <a:endParaRPr lang="en-US"/>
+        </a:p>
+      </dgm:t>
+    </dgm:pt>
+    <dgm:pt modelId="{A27BCC1B-5AA5-4509-BF92-A4DE212A9C7B}">
+      <dgm:prSet phldrT="[Text]" custT="1">
+        <dgm:style>
+          <a:lnRef idx="1">
+            <a:schemeClr val="accent1"/>
+          </a:lnRef>
+          <a:fillRef idx="2">
+            <a:schemeClr val="accent1"/>
+          </a:fillRef>
+          <a:effectRef idx="1">
+            <a:schemeClr val="accent1"/>
+          </a:effectRef>
+          <a:fontRef idx="minor">
+            <a:schemeClr val="dk1"/>
+          </a:fontRef>
+        </dgm:style>
+      </dgm:prSet>
+      <dgm:spPr/>
+      <dgm:t>
+        <a:bodyPr/>
+        <a:lstStyle/>
+        <a:p>
+          <a:r>
+            <a:rPr lang="en-US" sz="1600" b="1" dirty="0"/>
+            <a:t>System Validation</a:t>
+          </a:r>
+        </a:p>
+      </dgm:t>
+    </dgm:pt>
+    <dgm:pt modelId="{5EC9967B-6916-41B4-A658-48B3E4C7F38A}" type="parTrans" cxnId="{2F58C8FE-F5AE-4500-9172-5A7E1C965038}">
+      <dgm:prSet/>
+      <dgm:spPr/>
+      <dgm:t>
+        <a:bodyPr/>
+        <a:lstStyle/>
+        <a:p>
+          <a:endParaRPr lang="en-US"/>
+        </a:p>
+      </dgm:t>
+    </dgm:pt>
+    <dgm:pt modelId="{6A5D40BB-916A-431E-9446-B98791B48641}" type="sibTrans" cxnId="{2F58C8FE-F5AE-4500-9172-5A7E1C965038}">
+      <dgm:prSet/>
+      <dgm:spPr/>
+      <dgm:t>
+        <a:bodyPr/>
+        <a:lstStyle/>
+        <a:p>
+          <a:endParaRPr lang="en-US"/>
+        </a:p>
+      </dgm:t>
+    </dgm:pt>
+    <dgm:pt modelId="{3524EBFF-12EC-4571-A61E-FEA4B1637C28}" type="pres">
+      <dgm:prSet presAssocID="{3864FB22-6654-4A1F-BB80-14CEF4C6158C}" presName="Name0" presStyleCnt="0">
+        <dgm:presLayoutVars>
+          <dgm:dir/>
+          <dgm:resizeHandles val="exact"/>
+        </dgm:presLayoutVars>
+      </dgm:prSet>
+      <dgm:spPr/>
+    </dgm:pt>
+    <dgm:pt modelId="{75D46431-8936-48AB-8BD8-A5A3E1DA54B1}" type="pres">
+      <dgm:prSet presAssocID="{CB7992A6-AC8A-4C24-9F48-CEDEABBA7128}" presName="node" presStyleLbl="node1" presStyleIdx="0" presStyleCnt="3">
+        <dgm:presLayoutVars>
+          <dgm:bulletEnabled val="1"/>
+        </dgm:presLayoutVars>
+      </dgm:prSet>
+      <dgm:spPr>
+        <a:xfrm>
+          <a:off x="7339" y="0"/>
+          <a:ext cx="2193776" cy="840346"/>
+        </a:xfrm>
+        <a:prstGeom prst="roundRect">
+          <a:avLst>
+            <a:gd name="adj" fmla="val 10000"/>
+          </a:avLst>
+        </a:prstGeom>
+      </dgm:spPr>
+    </dgm:pt>
+    <dgm:pt modelId="{E8596835-CCFA-4D60-AF1F-124B7C7D7C75}" type="pres">
+      <dgm:prSet presAssocID="{5C18E0DA-3616-421C-A781-23AF032467F7}" presName="sibTrans" presStyleLbl="sibTrans2D1" presStyleIdx="0" presStyleCnt="2"/>
+      <dgm:spPr/>
+    </dgm:pt>
+    <dgm:pt modelId="{4B797248-40C0-4F3D-A22C-6FF1CA79B91C}" type="pres">
+      <dgm:prSet presAssocID="{5C18E0DA-3616-421C-A781-23AF032467F7}" presName="connectorText" presStyleLbl="sibTrans2D1" presStyleIdx="0" presStyleCnt="2"/>
+      <dgm:spPr/>
+    </dgm:pt>
+    <dgm:pt modelId="{AF036E0E-7540-41AF-923B-41C332A54ABC}" type="pres">
+      <dgm:prSet presAssocID="{4F7689B0-33C9-4732-8C26-B1327C3C142F}" presName="node" presStyleLbl="node1" presStyleIdx="1" presStyleCnt="3">
+        <dgm:presLayoutVars>
+          <dgm:bulletEnabled val="1"/>
+        </dgm:presLayoutVars>
+      </dgm:prSet>
+      <dgm:spPr>
+        <a:xfrm>
+          <a:off x="3078627" y="0"/>
+          <a:ext cx="2193776" cy="840346"/>
+        </a:xfrm>
+        <a:prstGeom prst="roundRect">
+          <a:avLst>
+            <a:gd name="adj" fmla="val 10000"/>
+          </a:avLst>
+        </a:prstGeom>
+      </dgm:spPr>
+    </dgm:pt>
+    <dgm:pt modelId="{7888BAEF-0EBC-4B2B-835C-139C3D96515D}" type="pres">
+      <dgm:prSet presAssocID="{E15DFF01-335B-40A7-9707-4ACB4C1A3B63}" presName="sibTrans" presStyleLbl="sibTrans2D1" presStyleIdx="1" presStyleCnt="2"/>
+      <dgm:spPr/>
+    </dgm:pt>
+    <dgm:pt modelId="{CBA5AC26-3D2F-4E21-8F7E-D8826B5AA4A1}" type="pres">
+      <dgm:prSet presAssocID="{E15DFF01-335B-40A7-9707-4ACB4C1A3B63}" presName="connectorText" presStyleLbl="sibTrans2D1" presStyleIdx="1" presStyleCnt="2"/>
+      <dgm:spPr/>
+    </dgm:pt>
+    <dgm:pt modelId="{76AF4964-5314-43BE-B03D-DCA756892D71}" type="pres">
+      <dgm:prSet presAssocID="{A27BCC1B-5AA5-4509-BF92-A4DE212A9C7B}" presName="node" presStyleLbl="node1" presStyleIdx="2" presStyleCnt="3">
+        <dgm:presLayoutVars>
+          <dgm:bulletEnabled val="1"/>
+        </dgm:presLayoutVars>
+      </dgm:prSet>
+      <dgm:spPr/>
+    </dgm:pt>
+  </dgm:ptLst>
+  <dgm:cxnLst>
+    <dgm:cxn modelId="{DA608825-EEE1-4499-9916-69F30F5AB579}" type="presOf" srcId="{5C18E0DA-3616-421C-A781-23AF032467F7}" destId="{4B797248-40C0-4F3D-A22C-6FF1CA79B91C}" srcOrd="1" destOrd="0" presId="urn:microsoft.com/office/officeart/2005/8/layout/process1"/>
+    <dgm:cxn modelId="{E73DDA5C-3BE1-43F4-93B6-B8861EE0E88F}" type="presOf" srcId="{A27BCC1B-5AA5-4509-BF92-A4DE212A9C7B}" destId="{76AF4964-5314-43BE-B03D-DCA756892D71}" srcOrd="0" destOrd="0" presId="urn:microsoft.com/office/officeart/2005/8/layout/process1"/>
+    <dgm:cxn modelId="{2A667441-8516-4A3F-AAE0-FF1A0A6F270C}" type="presOf" srcId="{3864FB22-6654-4A1F-BB80-14CEF4C6158C}" destId="{3524EBFF-12EC-4571-A61E-FEA4B1637C28}" srcOrd="0" destOrd="0" presId="urn:microsoft.com/office/officeart/2005/8/layout/process1"/>
+    <dgm:cxn modelId="{98E21D4A-8FCA-403D-B7B1-E89256F6A906}" type="presOf" srcId="{E15DFF01-335B-40A7-9707-4ACB4C1A3B63}" destId="{CBA5AC26-3D2F-4E21-8F7E-D8826B5AA4A1}" srcOrd="1" destOrd="0" presId="urn:microsoft.com/office/officeart/2005/8/layout/process1"/>
+    <dgm:cxn modelId="{27C09A92-FBED-4FA3-91A3-66F0D5A68078}" type="presOf" srcId="{CB7992A6-AC8A-4C24-9F48-CEDEABBA7128}" destId="{75D46431-8936-48AB-8BD8-A5A3E1DA54B1}" srcOrd="0" destOrd="0" presId="urn:microsoft.com/office/officeart/2005/8/layout/process1"/>
+    <dgm:cxn modelId="{7E490C9C-EF16-4797-B85C-34C2F241C291}" type="presOf" srcId="{E15DFF01-335B-40A7-9707-4ACB4C1A3B63}" destId="{7888BAEF-0EBC-4B2B-835C-139C3D96515D}" srcOrd="0" destOrd="0" presId="urn:microsoft.com/office/officeart/2005/8/layout/process1"/>
+    <dgm:cxn modelId="{0F4A85B4-D350-4488-A8C3-41BC5E9781C2}" type="presOf" srcId="{5C18E0DA-3616-421C-A781-23AF032467F7}" destId="{E8596835-CCFA-4D60-AF1F-124B7C7D7C75}" srcOrd="0" destOrd="0" presId="urn:microsoft.com/office/officeart/2005/8/layout/process1"/>
+    <dgm:cxn modelId="{B20920D5-A57F-43CF-8E44-08CDD1E61913}" type="presOf" srcId="{4F7689B0-33C9-4732-8C26-B1327C3C142F}" destId="{AF036E0E-7540-41AF-923B-41C332A54ABC}" srcOrd="0" destOrd="0" presId="urn:microsoft.com/office/officeart/2005/8/layout/process1"/>
+    <dgm:cxn modelId="{A2DF76DF-3E32-41A5-8E57-8BAAAED10EF9}" srcId="{3864FB22-6654-4A1F-BB80-14CEF4C6158C}" destId="{4F7689B0-33C9-4732-8C26-B1327C3C142F}" srcOrd="1" destOrd="0" parTransId="{85E505F5-FCC8-4B28-BA48-90BE25F2E9D3}" sibTransId="{E15DFF01-335B-40A7-9707-4ACB4C1A3B63}"/>
+    <dgm:cxn modelId="{86B2A4E5-9EE6-4868-ABCA-0024327CF0AD}" srcId="{3864FB22-6654-4A1F-BB80-14CEF4C6158C}" destId="{CB7992A6-AC8A-4C24-9F48-CEDEABBA7128}" srcOrd="0" destOrd="0" parTransId="{39BC531E-9DBA-4818-8BD5-41ECA75341AE}" sibTransId="{5C18E0DA-3616-421C-A781-23AF032467F7}"/>
+    <dgm:cxn modelId="{2F58C8FE-F5AE-4500-9172-5A7E1C965038}" srcId="{3864FB22-6654-4A1F-BB80-14CEF4C6158C}" destId="{A27BCC1B-5AA5-4509-BF92-A4DE212A9C7B}" srcOrd="2" destOrd="0" parTransId="{5EC9967B-6916-41B4-A658-48B3E4C7F38A}" sibTransId="{6A5D40BB-916A-431E-9446-B98791B48641}"/>
+    <dgm:cxn modelId="{0B9E0ECD-C7AF-405A-AB60-832EFDCA4255}" type="presParOf" srcId="{3524EBFF-12EC-4571-A61E-FEA4B1637C28}" destId="{75D46431-8936-48AB-8BD8-A5A3E1DA54B1}" srcOrd="0" destOrd="0" presId="urn:microsoft.com/office/officeart/2005/8/layout/process1"/>
+    <dgm:cxn modelId="{3EA7A9C8-2312-4C30-93B1-C18C21966B1A}" type="presParOf" srcId="{3524EBFF-12EC-4571-A61E-FEA4B1637C28}" destId="{E8596835-CCFA-4D60-AF1F-124B7C7D7C75}" srcOrd="1" destOrd="0" presId="urn:microsoft.com/office/officeart/2005/8/layout/process1"/>
+    <dgm:cxn modelId="{2AF1EAA1-B76C-41B8-95BC-69BF95C1750C}" type="presParOf" srcId="{E8596835-CCFA-4D60-AF1F-124B7C7D7C75}" destId="{4B797248-40C0-4F3D-A22C-6FF1CA79B91C}" srcOrd="0" destOrd="0" presId="urn:microsoft.com/office/officeart/2005/8/layout/process1"/>
+    <dgm:cxn modelId="{60115B7C-FE72-4FD2-9A3E-4C936E4F296A}" type="presParOf" srcId="{3524EBFF-12EC-4571-A61E-FEA4B1637C28}" destId="{AF036E0E-7540-41AF-923B-41C332A54ABC}" srcOrd="2" destOrd="0" presId="urn:microsoft.com/office/officeart/2005/8/layout/process1"/>
+    <dgm:cxn modelId="{93251D20-886C-4A74-B4FA-6389080FD2BC}" type="presParOf" srcId="{3524EBFF-12EC-4571-A61E-FEA4B1637C28}" destId="{7888BAEF-0EBC-4B2B-835C-139C3D96515D}" srcOrd="3" destOrd="0" presId="urn:microsoft.com/office/officeart/2005/8/layout/process1"/>
+    <dgm:cxn modelId="{F0632FF0-5A94-4ED7-8BD8-3CE4AD77D1BF}" type="presParOf" srcId="{7888BAEF-0EBC-4B2B-835C-139C3D96515D}" destId="{CBA5AC26-3D2F-4E21-8F7E-D8826B5AA4A1}" srcOrd="0" destOrd="0" presId="urn:microsoft.com/office/officeart/2005/8/layout/process1"/>
+    <dgm:cxn modelId="{2BD4AB1B-BCDF-46C5-B180-90E1ECCBA1AF}" type="presParOf" srcId="{3524EBFF-12EC-4571-A61E-FEA4B1637C28}" destId="{76AF4964-5314-43BE-B03D-DCA756892D71}" srcOrd="4" destOrd="0" presId="urn:microsoft.com/office/officeart/2005/8/layout/process1"/>
+  </dgm:cxnLst>
+  <dgm:bg/>
+  <dgm:whole/>
+  <dgm:extLst>
+    <a:ext uri="http://schemas.microsoft.com/office/drawing/2008/diagram">
+      <dsp:dataModelExt xmlns:dsp="http://schemas.microsoft.com/office/drawing/2008/diagram" relId="rId6" minVer="http://schemas.openxmlformats.org/drawingml/2006/diagram"/>
+    </a:ext>
+  </dgm:extLst>
+</dgm:dataModel>
+</file>
+
+<file path=ppt/diagrams/data5.xml><?xml version="1.0" encoding="utf-8"?>
 <dgm:dataModel xmlns:dgm="http://schemas.openxmlformats.org/drawingml/2006/diagram" xmlns:a="http://schemas.openxmlformats.org/drawingml/2006/main">
   <dgm:ptLst>
     <dgm:pt modelId="{3864FB22-6654-4A1F-BB80-14CEF4C6158C}" type="doc">
@@ -6134,6 +7188,551 @@
         <a:gradFill rotWithShape="1">
           <a:gsLst>
             <a:gs pos="0">
+              <a:schemeClr val="accent2">
+                <a:tint val="50000"/>
+                <a:satMod val="300000"/>
+              </a:schemeClr>
+            </a:gs>
+            <a:gs pos="35000">
+              <a:schemeClr val="accent2">
+                <a:tint val="37000"/>
+                <a:satMod val="300000"/>
+              </a:schemeClr>
+            </a:gs>
+            <a:gs pos="100000">
+              <a:schemeClr val="accent2">
+                <a:tint val="15000"/>
+                <a:satMod val="350000"/>
+              </a:schemeClr>
+            </a:gs>
+          </a:gsLst>
+          <a:lin ang="16200000" scaled="1"/>
+        </a:gradFill>
+        <a:ln w="9525" cap="flat" cmpd="sng" algn="ctr">
+          <a:solidFill>
+            <a:schemeClr val="accent2">
+              <a:shade val="95000"/>
+              <a:satMod val="105000"/>
+            </a:schemeClr>
+          </a:solidFill>
+          <a:prstDash val="solid"/>
+        </a:ln>
+        <a:effectLst>
+          <a:outerShdw blurRad="40000" dist="20000" dir="5400000" rotWithShape="0">
+            <a:srgbClr val="000000">
+              <a:alpha val="38000"/>
+            </a:srgbClr>
+          </a:outerShdw>
+        </a:effectLst>
+        <a:scene3d>
+          <a:camera prst="orthographicFront"/>
+          <a:lightRig rig="flat" dir="t"/>
+        </a:scene3d>
+        <a:sp3d/>
+      </dsp:spPr>
+      <dsp:style>
+        <a:lnRef idx="1">
+          <a:schemeClr val="accent2"/>
+        </a:lnRef>
+        <a:fillRef idx="2">
+          <a:schemeClr val="accent2"/>
+        </a:fillRef>
+        <a:effectRef idx="1">
+          <a:schemeClr val="accent2"/>
+        </a:effectRef>
+        <a:fontRef idx="minor">
+          <a:schemeClr val="dk1"/>
+        </a:fontRef>
+      </dsp:style>
+      <dsp:txBody>
+        <a:bodyPr spcFirstLastPara="0" vert="horz" wrap="square" lIns="60960" tIns="60960" rIns="60960" bIns="60960" numCol="1" spcCol="1270" anchor="ctr" anchorCtr="0">
+          <a:noAutofit/>
+        </a:bodyPr>
+        <a:lstStyle/>
+        <a:p>
+          <a:pPr marL="0" lvl="0" indent="0" algn="ctr" defTabSz="711200">
+            <a:lnSpc>
+              <a:spcPct val="90000"/>
+            </a:lnSpc>
+            <a:spcBef>
+              <a:spcPct val="0"/>
+            </a:spcBef>
+            <a:spcAft>
+              <a:spcPct val="35000"/>
+            </a:spcAft>
+            <a:buNone/>
+          </a:pPr>
+          <a:r>
+            <a:rPr lang="en-US" sz="1600" b="1" kern="1200" dirty="0">
+              <a:solidFill>
+                <a:prstClr val="black"/>
+              </a:solidFill>
+              <a:latin typeface="Arial"/>
+              <a:ea typeface="+mn-ea"/>
+              <a:cs typeface="+mn-cs"/>
+            </a:rPr>
+            <a:t>Depth Info. Extraction and Utilization</a:t>
+          </a:r>
+        </a:p>
+      </dsp:txBody>
+      <dsp:txXfrm>
+        <a:off x="3103240" y="24613"/>
+        <a:ext cx="2144550" cy="791120"/>
+      </dsp:txXfrm>
+    </dsp:sp>
+    <dsp:sp modelId="{7888BAEF-0EBC-4B2B-835C-139C3D96515D}">
+      <dsp:nvSpPr>
+        <dsp:cNvPr id="0" name=""/>
+        <dsp:cNvSpPr/>
+      </dsp:nvSpPr>
+      <dsp:spPr>
+        <a:xfrm>
+          <a:off x="5491781" y="148144"/>
+          <a:ext cx="465080" cy="544056"/>
+        </a:xfrm>
+        <a:prstGeom prst="rightArrow">
+          <a:avLst>
+            <a:gd name="adj1" fmla="val 60000"/>
+            <a:gd name="adj2" fmla="val 50000"/>
+          </a:avLst>
+        </a:prstGeom>
+        <a:gradFill rotWithShape="0">
+          <a:gsLst>
+            <a:gs pos="0">
+              <a:schemeClr val="dk2">
+                <a:tint val="60000"/>
+                <a:hueOff val="0"/>
+                <a:satOff val="0"/>
+                <a:lumOff val="0"/>
+                <a:alphaOff val="0"/>
+                <a:tint val="50000"/>
+                <a:satMod val="300000"/>
+              </a:schemeClr>
+            </a:gs>
+            <a:gs pos="35000">
+              <a:schemeClr val="dk2">
+                <a:tint val="60000"/>
+                <a:hueOff val="0"/>
+                <a:satOff val="0"/>
+                <a:lumOff val="0"/>
+                <a:alphaOff val="0"/>
+                <a:tint val="37000"/>
+                <a:satMod val="300000"/>
+              </a:schemeClr>
+            </a:gs>
+            <a:gs pos="100000">
+              <a:schemeClr val="dk2">
+                <a:tint val="60000"/>
+                <a:hueOff val="0"/>
+                <a:satOff val="0"/>
+                <a:lumOff val="0"/>
+                <a:alphaOff val="0"/>
+                <a:tint val="15000"/>
+                <a:satMod val="350000"/>
+              </a:schemeClr>
+            </a:gs>
+          </a:gsLst>
+          <a:lin ang="16200000" scaled="1"/>
+        </a:gradFill>
+        <a:ln>
+          <a:noFill/>
+        </a:ln>
+        <a:effectLst>
+          <a:outerShdw blurRad="40000" dist="20000" dir="5400000" rotWithShape="0">
+            <a:srgbClr val="000000">
+              <a:alpha val="38000"/>
+            </a:srgbClr>
+          </a:outerShdw>
+        </a:effectLst>
+      </dsp:spPr>
+      <dsp:style>
+        <a:lnRef idx="0">
+          <a:scrgbClr r="0" g="0" b="0"/>
+        </a:lnRef>
+        <a:fillRef idx="2">
+          <a:scrgbClr r="0" g="0" b="0"/>
+        </a:fillRef>
+        <a:effectRef idx="1">
+          <a:scrgbClr r="0" g="0" b="0"/>
+        </a:effectRef>
+        <a:fontRef idx="minor">
+          <a:schemeClr val="dk1"/>
+        </a:fontRef>
+      </dsp:style>
+      <dsp:txBody>
+        <a:bodyPr spcFirstLastPara="0" vert="horz" wrap="square" lIns="0" tIns="0" rIns="0" bIns="0" numCol="1" spcCol="1270" anchor="ctr" anchorCtr="0">
+          <a:noAutofit/>
+        </a:bodyPr>
+        <a:lstStyle/>
+        <a:p>
+          <a:pPr marL="0" lvl="0" indent="0" algn="ctr" defTabSz="1066800">
+            <a:lnSpc>
+              <a:spcPct val="90000"/>
+            </a:lnSpc>
+            <a:spcBef>
+              <a:spcPct val="0"/>
+            </a:spcBef>
+            <a:spcAft>
+              <a:spcPct val="35000"/>
+            </a:spcAft>
+            <a:buNone/>
+          </a:pPr>
+          <a:endParaRPr lang="en-US" sz="2400" kern="1200"/>
+        </a:p>
+      </dsp:txBody>
+      <dsp:txXfrm>
+        <a:off x="5491781" y="256955"/>
+        <a:ext cx="325556" cy="326434"/>
+      </dsp:txXfrm>
+    </dsp:sp>
+    <dsp:sp modelId="{76AF4964-5314-43BE-B03D-DCA756892D71}">
+      <dsp:nvSpPr>
+        <dsp:cNvPr id="0" name=""/>
+        <dsp:cNvSpPr/>
+      </dsp:nvSpPr>
+      <dsp:spPr>
+        <a:xfrm>
+          <a:off x="6149914" y="0"/>
+          <a:ext cx="2193776" cy="840346"/>
+        </a:xfrm>
+        <a:prstGeom prst="roundRect">
+          <a:avLst>
+            <a:gd name="adj" fmla="val 10000"/>
+          </a:avLst>
+        </a:prstGeom>
+        <a:gradFill rotWithShape="1">
+          <a:gsLst>
+            <a:gs pos="0">
+              <a:schemeClr val="accent1">
+                <a:tint val="50000"/>
+                <a:satMod val="300000"/>
+              </a:schemeClr>
+            </a:gs>
+            <a:gs pos="35000">
+              <a:schemeClr val="accent1">
+                <a:tint val="37000"/>
+                <a:satMod val="300000"/>
+              </a:schemeClr>
+            </a:gs>
+            <a:gs pos="100000">
+              <a:schemeClr val="accent1">
+                <a:tint val="15000"/>
+                <a:satMod val="350000"/>
+              </a:schemeClr>
+            </a:gs>
+          </a:gsLst>
+          <a:lin ang="16200000" scaled="1"/>
+        </a:gradFill>
+        <a:ln w="9525" cap="flat" cmpd="sng" algn="ctr">
+          <a:solidFill>
+            <a:schemeClr val="accent1">
+              <a:shade val="95000"/>
+              <a:satMod val="105000"/>
+            </a:schemeClr>
+          </a:solidFill>
+          <a:prstDash val="solid"/>
+        </a:ln>
+        <a:effectLst>
+          <a:outerShdw blurRad="40000" dist="20000" dir="5400000" rotWithShape="0">
+            <a:srgbClr val="000000">
+              <a:alpha val="38000"/>
+            </a:srgbClr>
+          </a:outerShdw>
+        </a:effectLst>
+        <a:scene3d>
+          <a:camera prst="orthographicFront"/>
+          <a:lightRig rig="flat" dir="t"/>
+        </a:scene3d>
+        <a:sp3d/>
+      </dsp:spPr>
+      <dsp:style>
+        <a:lnRef idx="1">
+          <a:schemeClr val="accent1"/>
+        </a:lnRef>
+        <a:fillRef idx="2">
+          <a:schemeClr val="accent1"/>
+        </a:fillRef>
+        <a:effectRef idx="1">
+          <a:schemeClr val="accent1"/>
+        </a:effectRef>
+        <a:fontRef idx="minor">
+          <a:schemeClr val="dk1"/>
+        </a:fontRef>
+      </dsp:style>
+      <dsp:txBody>
+        <a:bodyPr spcFirstLastPara="0" vert="horz" wrap="square" lIns="60960" tIns="60960" rIns="60960" bIns="60960" numCol="1" spcCol="1270" anchor="ctr" anchorCtr="0">
+          <a:noAutofit/>
+        </a:bodyPr>
+        <a:lstStyle/>
+        <a:p>
+          <a:pPr marL="0" lvl="0" indent="0" algn="ctr" defTabSz="711200">
+            <a:lnSpc>
+              <a:spcPct val="90000"/>
+            </a:lnSpc>
+            <a:spcBef>
+              <a:spcPct val="0"/>
+            </a:spcBef>
+            <a:spcAft>
+              <a:spcPct val="35000"/>
+            </a:spcAft>
+            <a:buNone/>
+          </a:pPr>
+          <a:r>
+            <a:rPr lang="en-US" sz="1600" b="1" kern="1200" dirty="0"/>
+            <a:t>System Validation</a:t>
+          </a:r>
+        </a:p>
+      </dsp:txBody>
+      <dsp:txXfrm>
+        <a:off x="6174527" y="24613"/>
+        <a:ext cx="2144550" cy="791120"/>
+      </dsp:txXfrm>
+    </dsp:sp>
+  </dsp:spTree>
+</dsp:drawing>
+</file>
+
+<file path=ppt/diagrams/drawing5.xml><?xml version="1.0" encoding="utf-8"?>
+<dsp:drawing xmlns:dgm="http://schemas.openxmlformats.org/drawingml/2006/diagram" xmlns:dsp="http://schemas.microsoft.com/office/drawing/2008/diagram" xmlns:a="http://schemas.openxmlformats.org/drawingml/2006/main">
+  <dsp:spTree>
+    <dsp:nvGrpSpPr>
+      <dsp:cNvPr id="0" name=""/>
+      <dsp:cNvGrpSpPr/>
+    </dsp:nvGrpSpPr>
+    <dsp:grpSpPr/>
+    <dsp:sp modelId="{75D46431-8936-48AB-8BD8-A5A3E1DA54B1}">
+      <dsp:nvSpPr>
+        <dsp:cNvPr id="0" name=""/>
+        <dsp:cNvSpPr/>
+      </dsp:nvSpPr>
+      <dsp:spPr>
+        <a:xfrm>
+          <a:off x="7339" y="0"/>
+          <a:ext cx="2193776" cy="840346"/>
+        </a:xfrm>
+        <a:prstGeom prst="roundRect">
+          <a:avLst>
+            <a:gd name="adj" fmla="val 10000"/>
+          </a:avLst>
+        </a:prstGeom>
+        <a:gradFill rotWithShape="1">
+          <a:gsLst>
+            <a:gs pos="0">
+              <a:schemeClr val="accent1">
+                <a:tint val="50000"/>
+                <a:satMod val="300000"/>
+              </a:schemeClr>
+            </a:gs>
+            <a:gs pos="35000">
+              <a:schemeClr val="accent1">
+                <a:tint val="37000"/>
+                <a:satMod val="300000"/>
+              </a:schemeClr>
+            </a:gs>
+            <a:gs pos="100000">
+              <a:schemeClr val="accent1">
+                <a:tint val="15000"/>
+                <a:satMod val="350000"/>
+              </a:schemeClr>
+            </a:gs>
+          </a:gsLst>
+          <a:lin ang="16200000" scaled="1"/>
+        </a:gradFill>
+        <a:ln w="9525" cap="flat" cmpd="sng" algn="ctr">
+          <a:solidFill>
+            <a:schemeClr val="accent1">
+              <a:shade val="95000"/>
+              <a:satMod val="105000"/>
+            </a:schemeClr>
+          </a:solidFill>
+          <a:prstDash val="solid"/>
+        </a:ln>
+        <a:effectLst>
+          <a:outerShdw blurRad="40000" dist="20000" dir="5400000" rotWithShape="0">
+            <a:srgbClr val="000000">
+              <a:alpha val="38000"/>
+            </a:srgbClr>
+          </a:outerShdw>
+        </a:effectLst>
+        <a:scene3d>
+          <a:camera prst="orthographicFront"/>
+          <a:lightRig rig="flat" dir="t"/>
+        </a:scene3d>
+        <a:sp3d/>
+      </dsp:spPr>
+      <dsp:style>
+        <a:lnRef idx="1">
+          <a:schemeClr val="accent1"/>
+        </a:lnRef>
+        <a:fillRef idx="2">
+          <a:schemeClr val="accent1"/>
+        </a:fillRef>
+        <a:effectRef idx="1">
+          <a:schemeClr val="accent1"/>
+        </a:effectRef>
+        <a:fontRef idx="minor">
+          <a:schemeClr val="dk1"/>
+        </a:fontRef>
+      </dsp:style>
+      <dsp:txBody>
+        <a:bodyPr spcFirstLastPara="0" vert="horz" wrap="square" lIns="60960" tIns="60960" rIns="60960" bIns="60960" numCol="1" spcCol="1270" anchor="ctr" anchorCtr="0">
+          <a:noAutofit/>
+        </a:bodyPr>
+        <a:lstStyle/>
+        <a:p>
+          <a:pPr marL="0" lvl="0" indent="0" algn="ctr" defTabSz="711200">
+            <a:lnSpc>
+              <a:spcPct val="90000"/>
+            </a:lnSpc>
+            <a:spcBef>
+              <a:spcPct val="0"/>
+            </a:spcBef>
+            <a:spcAft>
+              <a:spcPct val="35000"/>
+            </a:spcAft>
+            <a:buNone/>
+          </a:pPr>
+          <a:r>
+            <a:rPr lang="en-US" sz="1600" b="1" kern="1200" dirty="0">
+              <a:solidFill>
+                <a:prstClr val="black"/>
+              </a:solidFill>
+              <a:latin typeface="Arial"/>
+              <a:ea typeface="+mn-ea"/>
+              <a:cs typeface="+mn-cs"/>
+            </a:rPr>
+            <a:t>Baseline Evaluation</a:t>
+          </a:r>
+        </a:p>
+      </dsp:txBody>
+      <dsp:txXfrm>
+        <a:off x="31952" y="24613"/>
+        <a:ext cx="2144550" cy="791120"/>
+      </dsp:txXfrm>
+    </dsp:sp>
+    <dsp:sp modelId="{E8596835-CCFA-4D60-AF1F-124B7C7D7C75}">
+      <dsp:nvSpPr>
+        <dsp:cNvPr id="0" name=""/>
+        <dsp:cNvSpPr/>
+      </dsp:nvSpPr>
+      <dsp:spPr>
+        <a:xfrm>
+          <a:off x="2420494" y="148144"/>
+          <a:ext cx="465080" cy="544056"/>
+        </a:xfrm>
+        <a:prstGeom prst="rightArrow">
+          <a:avLst>
+            <a:gd name="adj1" fmla="val 60000"/>
+            <a:gd name="adj2" fmla="val 50000"/>
+          </a:avLst>
+        </a:prstGeom>
+        <a:gradFill rotWithShape="0">
+          <a:gsLst>
+            <a:gs pos="0">
+              <a:schemeClr val="dk2">
+                <a:tint val="60000"/>
+                <a:hueOff val="0"/>
+                <a:satOff val="0"/>
+                <a:lumOff val="0"/>
+                <a:alphaOff val="0"/>
+                <a:tint val="50000"/>
+                <a:satMod val="300000"/>
+              </a:schemeClr>
+            </a:gs>
+            <a:gs pos="35000">
+              <a:schemeClr val="dk2">
+                <a:tint val="60000"/>
+                <a:hueOff val="0"/>
+                <a:satOff val="0"/>
+                <a:lumOff val="0"/>
+                <a:alphaOff val="0"/>
+                <a:tint val="37000"/>
+                <a:satMod val="300000"/>
+              </a:schemeClr>
+            </a:gs>
+            <a:gs pos="100000">
+              <a:schemeClr val="dk2">
+                <a:tint val="60000"/>
+                <a:hueOff val="0"/>
+                <a:satOff val="0"/>
+                <a:lumOff val="0"/>
+                <a:alphaOff val="0"/>
+                <a:tint val="15000"/>
+                <a:satMod val="350000"/>
+              </a:schemeClr>
+            </a:gs>
+          </a:gsLst>
+          <a:lin ang="16200000" scaled="1"/>
+        </a:gradFill>
+        <a:ln>
+          <a:noFill/>
+        </a:ln>
+        <a:effectLst>
+          <a:outerShdw blurRad="40000" dist="20000" dir="5400000" rotWithShape="0">
+            <a:srgbClr val="000000">
+              <a:alpha val="38000"/>
+            </a:srgbClr>
+          </a:outerShdw>
+        </a:effectLst>
+      </dsp:spPr>
+      <dsp:style>
+        <a:lnRef idx="0">
+          <a:scrgbClr r="0" g="0" b="0"/>
+        </a:lnRef>
+        <a:fillRef idx="2">
+          <a:scrgbClr r="0" g="0" b="0"/>
+        </a:fillRef>
+        <a:effectRef idx="1">
+          <a:scrgbClr r="0" g="0" b="0"/>
+        </a:effectRef>
+        <a:fontRef idx="minor">
+          <a:schemeClr val="dk1"/>
+        </a:fontRef>
+      </dsp:style>
+      <dsp:txBody>
+        <a:bodyPr spcFirstLastPara="0" vert="horz" wrap="square" lIns="0" tIns="0" rIns="0" bIns="0" numCol="1" spcCol="1270" anchor="ctr" anchorCtr="0">
+          <a:noAutofit/>
+        </a:bodyPr>
+        <a:lstStyle/>
+        <a:p>
+          <a:pPr marL="0" lvl="0" indent="0" algn="ctr" defTabSz="1066800">
+            <a:lnSpc>
+              <a:spcPct val="90000"/>
+            </a:lnSpc>
+            <a:spcBef>
+              <a:spcPct val="0"/>
+            </a:spcBef>
+            <a:spcAft>
+              <a:spcPct val="35000"/>
+            </a:spcAft>
+            <a:buNone/>
+          </a:pPr>
+          <a:endParaRPr lang="en-US" sz="2400" kern="1200"/>
+        </a:p>
+      </dsp:txBody>
+      <dsp:txXfrm>
+        <a:off x="2420494" y="256955"/>
+        <a:ext cx="325556" cy="326434"/>
+      </dsp:txXfrm>
+    </dsp:sp>
+    <dsp:sp modelId="{AF036E0E-7540-41AF-923B-41C332A54ABC}">
+      <dsp:nvSpPr>
+        <dsp:cNvPr id="0" name=""/>
+        <dsp:cNvSpPr/>
+      </dsp:nvSpPr>
+      <dsp:spPr>
+        <a:xfrm>
+          <a:off x="3078627" y="0"/>
+          <a:ext cx="2193776" cy="840346"/>
+        </a:xfrm>
+        <a:prstGeom prst="roundRect">
+          <a:avLst>
+            <a:gd name="adj" fmla="val 10000"/>
+          </a:avLst>
+        </a:prstGeom>
+        <a:gradFill rotWithShape="1">
+          <a:gsLst>
+            <a:gs pos="0">
               <a:schemeClr val="accent1">
                 <a:tint val="50000"/>
                 <a:satMod val="300000"/>
@@ -7022,6 +8621,152 @@
 </dgm:layoutDef>
 </file>
 
+<file path=ppt/diagrams/layout5.xml><?xml version="1.0" encoding="utf-8"?>
+<dgm:layoutDef xmlns:dgm="http://schemas.openxmlformats.org/drawingml/2006/diagram" xmlns:a="http://schemas.openxmlformats.org/drawingml/2006/main" uniqueId="urn:microsoft.com/office/officeart/2005/8/layout/process1">
+  <dgm:title val=""/>
+  <dgm:desc val=""/>
+  <dgm:catLst>
+    <dgm:cat type="process" pri="1000"/>
+    <dgm:cat type="convert" pri="15000"/>
+  </dgm:catLst>
+  <dgm:sampData useDef="1">
+    <dgm:dataModel>
+      <dgm:ptLst/>
+      <dgm:bg/>
+      <dgm:whole/>
+    </dgm:dataModel>
+  </dgm:sampData>
+  <dgm:styleData>
+    <dgm:dataModel>
+      <dgm:ptLst>
+        <dgm:pt modelId="0" type="doc"/>
+        <dgm:pt modelId="1"/>
+        <dgm:pt modelId="2"/>
+      </dgm:ptLst>
+      <dgm:cxnLst>
+        <dgm:cxn modelId="3" srcId="0" destId="1" srcOrd="0" destOrd="0"/>
+        <dgm:cxn modelId="4" srcId="0" destId="2" srcOrd="1" destOrd="0"/>
+      </dgm:cxnLst>
+      <dgm:bg/>
+      <dgm:whole/>
+    </dgm:dataModel>
+  </dgm:styleData>
+  <dgm:clrData>
+    <dgm:dataModel>
+      <dgm:ptLst>
+        <dgm:pt modelId="0" type="doc"/>
+        <dgm:pt modelId="1"/>
+        <dgm:pt modelId="2"/>
+        <dgm:pt modelId="3"/>
+        <dgm:pt modelId="4"/>
+      </dgm:ptLst>
+      <dgm:cxnLst>
+        <dgm:cxn modelId="5" srcId="0" destId="1" srcOrd="0" destOrd="0"/>
+        <dgm:cxn modelId="6" srcId="0" destId="2" srcOrd="1" destOrd="0"/>
+        <dgm:cxn modelId="7" srcId="0" destId="3" srcOrd="2" destOrd="0"/>
+        <dgm:cxn modelId="8" srcId="0" destId="4" srcOrd="3" destOrd="0"/>
+      </dgm:cxnLst>
+      <dgm:bg/>
+      <dgm:whole/>
+    </dgm:dataModel>
+  </dgm:clrData>
+  <dgm:layoutNode name="Name0">
+    <dgm:varLst>
+      <dgm:dir/>
+      <dgm:resizeHandles val="exact"/>
+    </dgm:varLst>
+    <dgm:choose name="Name1">
+      <dgm:if name="Name2" func="var" arg="dir" op="equ" val="norm">
+        <dgm:alg type="lin"/>
+      </dgm:if>
+      <dgm:else name="Name3">
+        <dgm:alg type="lin">
+          <dgm:param type="linDir" val="fromR"/>
+        </dgm:alg>
+      </dgm:else>
+    </dgm:choose>
+    <dgm:shape xmlns:r="http://schemas.openxmlformats.org/officeDocument/2006/relationships" r:blip="">
+      <dgm:adjLst/>
+    </dgm:shape>
+    <dgm:presOf/>
+    <dgm:constrLst>
+      <dgm:constr type="w" for="ch" ptType="node" refType="w"/>
+      <dgm:constr type="h" for="ch" ptType="node" op="equ"/>
+      <dgm:constr type="primFontSz" for="ch" ptType="node" op="equ" val="65"/>
+      <dgm:constr type="w" for="ch" ptType="sibTrans" refType="w" refFor="ch" refPtType="node" op="equ" fact="0.4"/>
+      <dgm:constr type="h" for="ch" ptType="sibTrans" op="equ"/>
+      <dgm:constr type="primFontSz" for="des" forName="connectorText" op="equ" val="55"/>
+      <dgm:constr type="primFontSz" for="des" forName="connectorText" refType="primFontSz" refFor="ch" refPtType="node" op="lte" fact="0.8"/>
+    </dgm:constrLst>
+    <dgm:ruleLst/>
+    <dgm:forEach name="nodesForEach" axis="ch" ptType="node">
+      <dgm:layoutNode name="node">
+        <dgm:varLst>
+          <dgm:bulletEnabled val="1"/>
+        </dgm:varLst>
+        <dgm:alg type="tx"/>
+        <dgm:shape xmlns:r="http://schemas.openxmlformats.org/officeDocument/2006/relationships" type="roundRect" r:blip="">
+          <dgm:adjLst>
+            <dgm:adj idx="1" val="0.1"/>
+          </dgm:adjLst>
+        </dgm:shape>
+        <dgm:presOf axis="desOrSelf" ptType="node"/>
+        <dgm:constrLst>
+          <dgm:constr type="h" refType="w" fact="0.6"/>
+          <dgm:constr type="tMarg" refType="primFontSz" fact="0.3"/>
+          <dgm:constr type="bMarg" refType="primFontSz" fact="0.3"/>
+          <dgm:constr type="lMarg" refType="primFontSz" fact="0.3"/>
+          <dgm:constr type="rMarg" refType="primFontSz" fact="0.3"/>
+        </dgm:constrLst>
+        <dgm:ruleLst>
+          <dgm:rule type="primFontSz" val="18" fact="NaN" max="NaN"/>
+          <dgm:rule type="h" val="NaN" fact="1.5" max="NaN"/>
+          <dgm:rule type="primFontSz" val="5" fact="NaN" max="NaN"/>
+          <dgm:rule type="h" val="INF" fact="NaN" max="NaN"/>
+        </dgm:ruleLst>
+      </dgm:layoutNode>
+      <dgm:forEach name="sibTransForEach" axis="followSib" ptType="sibTrans" cnt="1">
+        <dgm:layoutNode name="sibTrans">
+          <dgm:alg type="conn">
+            <dgm:param type="begPts" val="auto"/>
+            <dgm:param type="endPts" val="auto"/>
+          </dgm:alg>
+          <dgm:shape xmlns:r="http://schemas.openxmlformats.org/officeDocument/2006/relationships" type="conn" r:blip="">
+            <dgm:adjLst/>
+          </dgm:shape>
+          <dgm:presOf axis="self"/>
+          <dgm:constrLst>
+            <dgm:constr type="h" refType="w" fact="0.62"/>
+            <dgm:constr type="connDist"/>
+            <dgm:constr type="begPad" refType="connDist" fact="0.25"/>
+            <dgm:constr type="endPad" refType="connDist" fact="0.22"/>
+          </dgm:constrLst>
+          <dgm:ruleLst/>
+          <dgm:layoutNode name="connectorText">
+            <dgm:alg type="tx">
+              <dgm:param type="autoTxRot" val="grav"/>
+            </dgm:alg>
+            <dgm:shape xmlns:r="http://schemas.openxmlformats.org/officeDocument/2006/relationships" type="conn" r:blip="" hideGeom="1">
+              <dgm:adjLst/>
+            </dgm:shape>
+            <dgm:presOf axis="self"/>
+            <dgm:constrLst>
+              <dgm:constr type="lMarg"/>
+              <dgm:constr type="rMarg"/>
+              <dgm:constr type="tMarg"/>
+              <dgm:constr type="bMarg"/>
+            </dgm:constrLst>
+            <dgm:ruleLst>
+              <dgm:rule type="primFontSz" val="5" fact="NaN" max="NaN"/>
+            </dgm:ruleLst>
+          </dgm:layoutNode>
+        </dgm:layoutNode>
+      </dgm:forEach>
+    </dgm:forEach>
+  </dgm:layoutNode>
+</dgm:layoutDef>
+</file>
+
 <file path=ppt/diagrams/quickStyle1.xml><?xml version="1.0" encoding="utf-8"?>
 <dgm:styleDef xmlns:dgm="http://schemas.openxmlformats.org/drawingml/2006/diagram" xmlns:a="http://schemas.openxmlformats.org/drawingml/2006/main" uniqueId="urn:microsoft.com/office/officeart/2005/8/quickstyle/simple3">
   <dgm:title val=""/>
@@ -10203,6 +11948,1066 @@
 </file>
 
 <file path=ppt/diagrams/quickStyle4.xml><?xml version="1.0" encoding="utf-8"?>
+<dgm:styleDef xmlns:dgm="http://schemas.openxmlformats.org/drawingml/2006/diagram" xmlns:a="http://schemas.openxmlformats.org/drawingml/2006/main" uniqueId="urn:microsoft.com/office/officeart/2005/8/quickstyle/simple3">
+  <dgm:title val=""/>
+  <dgm:desc val=""/>
+  <dgm:catLst>
+    <dgm:cat type="simple" pri="10300"/>
+  </dgm:catLst>
+  <dgm:scene3d>
+    <a:camera prst="orthographicFront"/>
+    <a:lightRig rig="threePt" dir="t"/>
+  </dgm:scene3d>
+  <dgm:styleLbl name="node0">
+    <dgm:scene3d>
+      <a:camera prst="orthographicFront"/>
+      <a:lightRig rig="flat" dir="t"/>
+    </dgm:scene3d>
+    <dgm:sp3d prstMaterial="dkEdge">
+      <a:bevelT w="8200" h="38100"/>
+    </dgm:sp3d>
+    <dgm:txPr/>
+    <dgm:style>
+      <a:lnRef idx="0">
+        <a:scrgbClr r="0" g="0" b="0"/>
+      </a:lnRef>
+      <a:fillRef idx="2">
+        <a:scrgbClr r="0" g="0" b="0"/>
+      </a:fillRef>
+      <a:effectRef idx="1">
+        <a:scrgbClr r="0" g="0" b="0"/>
+      </a:effectRef>
+      <a:fontRef idx="minor">
+        <a:schemeClr val="dk1"/>
+      </a:fontRef>
+    </dgm:style>
+  </dgm:styleLbl>
+  <dgm:styleLbl name="lnNode1">
+    <dgm:scene3d>
+      <a:camera prst="orthographicFront"/>
+      <a:lightRig rig="flat" dir="t"/>
+    </dgm:scene3d>
+    <dgm:sp3d prstMaterial="dkEdge">
+      <a:bevelT w="8200" h="38100"/>
+    </dgm:sp3d>
+    <dgm:txPr/>
+    <dgm:style>
+      <a:lnRef idx="1">
+        <a:scrgbClr r="0" g="0" b="0"/>
+      </a:lnRef>
+      <a:fillRef idx="2">
+        <a:scrgbClr r="0" g="0" b="0"/>
+      </a:fillRef>
+      <a:effectRef idx="0">
+        <a:scrgbClr r="0" g="0" b="0"/>
+      </a:effectRef>
+      <a:fontRef idx="minor">
+        <a:schemeClr val="dk1"/>
+      </a:fontRef>
+    </dgm:style>
+  </dgm:styleLbl>
+  <dgm:styleLbl name="vennNode1">
+    <dgm:scene3d>
+      <a:camera prst="orthographicFront"/>
+      <a:lightRig rig="flat" dir="t"/>
+    </dgm:scene3d>
+    <dgm:sp3d prstMaterial="dkEdge">
+      <a:bevelT w="8200" h="38100"/>
+    </dgm:sp3d>
+    <dgm:txPr/>
+    <dgm:style>
+      <a:lnRef idx="0">
+        <a:scrgbClr r="0" g="0" b="0"/>
+      </a:lnRef>
+      <a:fillRef idx="2">
+        <a:scrgbClr r="0" g="0" b="0"/>
+      </a:fillRef>
+      <a:effectRef idx="0">
+        <a:scrgbClr r="0" g="0" b="0"/>
+      </a:effectRef>
+      <a:fontRef idx="minor">
+        <a:schemeClr val="tx1"/>
+      </a:fontRef>
+    </dgm:style>
+  </dgm:styleLbl>
+  <dgm:styleLbl name="alignNode1">
+    <dgm:scene3d>
+      <a:camera prst="orthographicFront"/>
+      <a:lightRig rig="threePt" dir="t"/>
+    </dgm:scene3d>
+    <dgm:sp3d/>
+    <dgm:txPr/>
+    <dgm:style>
+      <a:lnRef idx="1">
+        <a:scrgbClr r="0" g="0" b="0"/>
+      </a:lnRef>
+      <a:fillRef idx="2">
+        <a:scrgbClr r="0" g="0" b="0"/>
+      </a:fillRef>
+      <a:effectRef idx="1">
+        <a:scrgbClr r="0" g="0" b="0"/>
+      </a:effectRef>
+      <a:fontRef idx="minor">
+        <a:schemeClr val="dk1"/>
+      </a:fontRef>
+    </dgm:style>
+  </dgm:styleLbl>
+  <dgm:styleLbl name="node1">
+    <dgm:scene3d>
+      <a:camera prst="orthographicFront"/>
+      <a:lightRig rig="flat" dir="t"/>
+    </dgm:scene3d>
+    <dgm:sp3d prstMaterial="dkEdge">
+      <a:bevelT w="8200" h="38100"/>
+    </dgm:sp3d>
+    <dgm:txPr/>
+    <dgm:style>
+      <a:lnRef idx="0">
+        <a:scrgbClr r="0" g="0" b="0"/>
+      </a:lnRef>
+      <a:fillRef idx="2">
+        <a:scrgbClr r="0" g="0" b="0"/>
+      </a:fillRef>
+      <a:effectRef idx="1">
+        <a:scrgbClr r="0" g="0" b="0"/>
+      </a:effectRef>
+      <a:fontRef idx="minor">
+        <a:schemeClr val="dk1"/>
+      </a:fontRef>
+    </dgm:style>
+  </dgm:styleLbl>
+  <dgm:styleLbl name="node2">
+    <dgm:scene3d>
+      <a:camera prst="orthographicFront"/>
+      <a:lightRig rig="flat" dir="t"/>
+    </dgm:scene3d>
+    <dgm:sp3d prstMaterial="dkEdge">
+      <a:bevelT w="8200" h="38100"/>
+    </dgm:sp3d>
+    <dgm:txPr/>
+    <dgm:style>
+      <a:lnRef idx="0">
+        <a:scrgbClr r="0" g="0" b="0"/>
+      </a:lnRef>
+      <a:fillRef idx="2">
+        <a:scrgbClr r="0" g="0" b="0"/>
+      </a:fillRef>
+      <a:effectRef idx="1">
+        <a:scrgbClr r="0" g="0" b="0"/>
+      </a:effectRef>
+      <a:fontRef idx="minor">
+        <a:schemeClr val="dk1"/>
+      </a:fontRef>
+    </dgm:style>
+  </dgm:styleLbl>
+  <dgm:styleLbl name="node3">
+    <dgm:scene3d>
+      <a:camera prst="orthographicFront"/>
+      <a:lightRig rig="flat" dir="t"/>
+    </dgm:scene3d>
+    <dgm:sp3d prstMaterial="dkEdge">
+      <a:bevelT w="8200" h="38100"/>
+    </dgm:sp3d>
+    <dgm:txPr/>
+    <dgm:style>
+      <a:lnRef idx="0">
+        <a:scrgbClr r="0" g="0" b="0"/>
+      </a:lnRef>
+      <a:fillRef idx="2">
+        <a:scrgbClr r="0" g="0" b="0"/>
+      </a:fillRef>
+      <a:effectRef idx="1">
+        <a:scrgbClr r="0" g="0" b="0"/>
+      </a:effectRef>
+      <a:fontRef idx="minor">
+        <a:schemeClr val="dk1"/>
+      </a:fontRef>
+    </dgm:style>
+  </dgm:styleLbl>
+  <dgm:styleLbl name="node4">
+    <dgm:scene3d>
+      <a:camera prst="orthographicFront"/>
+      <a:lightRig rig="flat" dir="t"/>
+    </dgm:scene3d>
+    <dgm:sp3d prstMaterial="dkEdge">
+      <a:bevelT w="8200" h="38100"/>
+    </dgm:sp3d>
+    <dgm:txPr/>
+    <dgm:style>
+      <a:lnRef idx="0">
+        <a:scrgbClr r="0" g="0" b="0"/>
+      </a:lnRef>
+      <a:fillRef idx="2">
+        <a:scrgbClr r="0" g="0" b="0"/>
+      </a:fillRef>
+      <a:effectRef idx="1">
+        <a:scrgbClr r="0" g="0" b="0"/>
+      </a:effectRef>
+      <a:fontRef idx="minor">
+        <a:schemeClr val="dk1"/>
+      </a:fontRef>
+    </dgm:style>
+  </dgm:styleLbl>
+  <dgm:styleLbl name="fgImgPlace1">
+    <dgm:scene3d>
+      <a:camera prst="orthographicFront"/>
+      <a:lightRig rig="threePt" dir="t"/>
+    </dgm:scene3d>
+    <dgm:sp3d/>
+    <dgm:txPr/>
+    <dgm:style>
+      <a:lnRef idx="1">
+        <a:scrgbClr r="0" g="0" b="0"/>
+      </a:lnRef>
+      <a:fillRef idx="1">
+        <a:scrgbClr r="0" g="0" b="0"/>
+      </a:fillRef>
+      <a:effectRef idx="1">
+        <a:scrgbClr r="0" g="0" b="0"/>
+      </a:effectRef>
+      <a:fontRef idx="minor"/>
+    </dgm:style>
+  </dgm:styleLbl>
+  <dgm:styleLbl name="alignImgPlace1">
+    <dgm:scene3d>
+      <a:camera prst="orthographicFront"/>
+      <a:lightRig rig="threePt" dir="t"/>
+    </dgm:scene3d>
+    <dgm:sp3d/>
+    <dgm:txPr/>
+    <dgm:style>
+      <a:lnRef idx="1">
+        <a:scrgbClr r="0" g="0" b="0"/>
+      </a:lnRef>
+      <a:fillRef idx="1">
+        <a:scrgbClr r="0" g="0" b="0"/>
+      </a:fillRef>
+      <a:effectRef idx="1">
+        <a:scrgbClr r="0" g="0" b="0"/>
+      </a:effectRef>
+      <a:fontRef idx="minor"/>
+    </dgm:style>
+  </dgm:styleLbl>
+  <dgm:styleLbl name="bgImgPlace1">
+    <dgm:scene3d>
+      <a:camera prst="orthographicFront"/>
+      <a:lightRig rig="threePt" dir="t"/>
+    </dgm:scene3d>
+    <dgm:sp3d/>
+    <dgm:txPr/>
+    <dgm:style>
+      <a:lnRef idx="1">
+        <a:scrgbClr r="0" g="0" b="0"/>
+      </a:lnRef>
+      <a:fillRef idx="1">
+        <a:scrgbClr r="0" g="0" b="0"/>
+      </a:fillRef>
+      <a:effectRef idx="1">
+        <a:scrgbClr r="0" g="0" b="0"/>
+      </a:effectRef>
+      <a:fontRef idx="minor"/>
+    </dgm:style>
+  </dgm:styleLbl>
+  <dgm:styleLbl name="sibTrans2D1">
+    <dgm:scene3d>
+      <a:camera prst="orthographicFront"/>
+      <a:lightRig rig="threePt" dir="t"/>
+    </dgm:scene3d>
+    <dgm:sp3d/>
+    <dgm:txPr/>
+    <dgm:style>
+      <a:lnRef idx="0">
+        <a:scrgbClr r="0" g="0" b="0"/>
+      </a:lnRef>
+      <a:fillRef idx="2">
+        <a:scrgbClr r="0" g="0" b="0"/>
+      </a:fillRef>
+      <a:effectRef idx="1">
+        <a:scrgbClr r="0" g="0" b="0"/>
+      </a:effectRef>
+      <a:fontRef idx="minor">
+        <a:schemeClr val="dk1"/>
+      </a:fontRef>
+    </dgm:style>
+  </dgm:styleLbl>
+  <dgm:styleLbl name="fgSibTrans2D1">
+    <dgm:scene3d>
+      <a:camera prst="orthographicFront"/>
+      <a:lightRig rig="threePt" dir="t"/>
+    </dgm:scene3d>
+    <dgm:sp3d/>
+    <dgm:txPr/>
+    <dgm:style>
+      <a:lnRef idx="0">
+        <a:scrgbClr r="0" g="0" b="0"/>
+      </a:lnRef>
+      <a:fillRef idx="2">
+        <a:scrgbClr r="0" g="0" b="0"/>
+      </a:fillRef>
+      <a:effectRef idx="1">
+        <a:scrgbClr r="0" g="0" b="0"/>
+      </a:effectRef>
+      <a:fontRef idx="minor">
+        <a:schemeClr val="dk1"/>
+      </a:fontRef>
+    </dgm:style>
+  </dgm:styleLbl>
+  <dgm:styleLbl name="bgSibTrans2D1">
+    <dgm:scene3d>
+      <a:camera prst="orthographicFront"/>
+      <a:lightRig rig="threePt" dir="t"/>
+    </dgm:scene3d>
+    <dgm:sp3d/>
+    <dgm:txPr/>
+    <dgm:style>
+      <a:lnRef idx="0">
+        <a:scrgbClr r="0" g="0" b="0"/>
+      </a:lnRef>
+      <a:fillRef idx="2">
+        <a:scrgbClr r="0" g="0" b="0"/>
+      </a:fillRef>
+      <a:effectRef idx="1">
+        <a:scrgbClr r="0" g="0" b="0"/>
+      </a:effectRef>
+      <a:fontRef idx="minor">
+        <a:schemeClr val="dk1"/>
+      </a:fontRef>
+    </dgm:style>
+  </dgm:styleLbl>
+  <dgm:styleLbl name="sibTrans1D1">
+    <dgm:scene3d>
+      <a:camera prst="orthographicFront"/>
+      <a:lightRig rig="threePt" dir="t"/>
+    </dgm:scene3d>
+    <dgm:sp3d/>
+    <dgm:txPr/>
+    <dgm:style>
+      <a:lnRef idx="1">
+        <a:scrgbClr r="0" g="0" b="0"/>
+      </a:lnRef>
+      <a:fillRef idx="0">
+        <a:scrgbClr r="0" g="0" b="0"/>
+      </a:fillRef>
+      <a:effectRef idx="0">
+        <a:scrgbClr r="0" g="0" b="0"/>
+      </a:effectRef>
+      <a:fontRef idx="minor"/>
+    </dgm:style>
+  </dgm:styleLbl>
+  <dgm:styleLbl name="callout">
+    <dgm:scene3d>
+      <a:camera prst="orthographicFront"/>
+      <a:lightRig rig="threePt" dir="t"/>
+    </dgm:scene3d>
+    <dgm:sp3d/>
+    <dgm:txPr/>
+    <dgm:style>
+      <a:lnRef idx="1">
+        <a:scrgbClr r="0" g="0" b="0"/>
+      </a:lnRef>
+      <a:fillRef idx="2">
+        <a:scrgbClr r="0" g="0" b="0"/>
+      </a:fillRef>
+      <a:effectRef idx="1">
+        <a:scrgbClr r="0" g="0" b="0"/>
+      </a:effectRef>
+      <a:fontRef idx="minor"/>
+    </dgm:style>
+  </dgm:styleLbl>
+  <dgm:styleLbl name="asst0">
+    <dgm:scene3d>
+      <a:camera prst="orthographicFront"/>
+      <a:lightRig rig="flat" dir="t"/>
+    </dgm:scene3d>
+    <dgm:sp3d prstMaterial="dkEdge">
+      <a:bevelT w="8200" h="38100"/>
+    </dgm:sp3d>
+    <dgm:txPr/>
+    <dgm:style>
+      <a:lnRef idx="0">
+        <a:scrgbClr r="0" g="0" b="0"/>
+      </a:lnRef>
+      <a:fillRef idx="2">
+        <a:scrgbClr r="0" g="0" b="0"/>
+      </a:fillRef>
+      <a:effectRef idx="1">
+        <a:scrgbClr r="0" g="0" b="0"/>
+      </a:effectRef>
+      <a:fontRef idx="minor">
+        <a:schemeClr val="dk1"/>
+      </a:fontRef>
+    </dgm:style>
+  </dgm:styleLbl>
+  <dgm:styleLbl name="asst1">
+    <dgm:scene3d>
+      <a:camera prst="orthographicFront"/>
+      <a:lightRig rig="flat" dir="t"/>
+    </dgm:scene3d>
+    <dgm:sp3d prstMaterial="dkEdge">
+      <a:bevelT w="8200" h="38100"/>
+    </dgm:sp3d>
+    <dgm:txPr/>
+    <dgm:style>
+      <a:lnRef idx="0">
+        <a:scrgbClr r="0" g="0" b="0"/>
+      </a:lnRef>
+      <a:fillRef idx="2">
+        <a:scrgbClr r="0" g="0" b="0"/>
+      </a:fillRef>
+      <a:effectRef idx="1">
+        <a:scrgbClr r="0" g="0" b="0"/>
+      </a:effectRef>
+      <a:fontRef idx="minor">
+        <a:schemeClr val="dk1"/>
+      </a:fontRef>
+    </dgm:style>
+  </dgm:styleLbl>
+  <dgm:styleLbl name="asst2">
+    <dgm:scene3d>
+      <a:camera prst="orthographicFront"/>
+      <a:lightRig rig="flat" dir="t"/>
+    </dgm:scene3d>
+    <dgm:sp3d prstMaterial="dkEdge">
+      <a:bevelT w="8200" h="38100"/>
+    </dgm:sp3d>
+    <dgm:txPr/>
+    <dgm:style>
+      <a:lnRef idx="0">
+        <a:scrgbClr r="0" g="0" b="0"/>
+      </a:lnRef>
+      <a:fillRef idx="2">
+        <a:scrgbClr r="0" g="0" b="0"/>
+      </a:fillRef>
+      <a:effectRef idx="1">
+        <a:scrgbClr r="0" g="0" b="0"/>
+      </a:effectRef>
+      <a:fontRef idx="minor">
+        <a:schemeClr val="dk1"/>
+      </a:fontRef>
+    </dgm:style>
+  </dgm:styleLbl>
+  <dgm:styleLbl name="asst3">
+    <dgm:scene3d>
+      <a:camera prst="orthographicFront"/>
+      <a:lightRig rig="flat" dir="t"/>
+    </dgm:scene3d>
+    <dgm:sp3d prstMaterial="dkEdge">
+      <a:bevelT w="8200" h="38100"/>
+    </dgm:sp3d>
+    <dgm:txPr/>
+    <dgm:style>
+      <a:lnRef idx="0">
+        <a:scrgbClr r="0" g="0" b="0"/>
+      </a:lnRef>
+      <a:fillRef idx="2">
+        <a:scrgbClr r="0" g="0" b="0"/>
+      </a:fillRef>
+      <a:effectRef idx="1">
+        <a:scrgbClr r="0" g="0" b="0"/>
+      </a:effectRef>
+      <a:fontRef idx="minor">
+        <a:schemeClr val="dk1"/>
+      </a:fontRef>
+    </dgm:style>
+  </dgm:styleLbl>
+  <dgm:styleLbl name="asst4">
+    <dgm:scene3d>
+      <a:camera prst="orthographicFront"/>
+      <a:lightRig rig="flat" dir="t"/>
+    </dgm:scene3d>
+    <dgm:sp3d prstMaterial="dkEdge">
+      <a:bevelT w="8200" h="38100"/>
+    </dgm:sp3d>
+    <dgm:txPr/>
+    <dgm:style>
+      <a:lnRef idx="0">
+        <a:scrgbClr r="0" g="0" b="0"/>
+      </a:lnRef>
+      <a:fillRef idx="2">
+        <a:scrgbClr r="0" g="0" b="0"/>
+      </a:fillRef>
+      <a:effectRef idx="1">
+        <a:scrgbClr r="0" g="0" b="0"/>
+      </a:effectRef>
+      <a:fontRef idx="minor">
+        <a:schemeClr val="dk1"/>
+      </a:fontRef>
+    </dgm:style>
+  </dgm:styleLbl>
+  <dgm:styleLbl name="parChTrans2D1">
+    <dgm:scene3d>
+      <a:camera prst="orthographicFront"/>
+      <a:lightRig rig="threePt" dir="t"/>
+    </dgm:scene3d>
+    <dgm:sp3d/>
+    <dgm:txPr/>
+    <dgm:style>
+      <a:lnRef idx="1">
+        <a:scrgbClr r="0" g="0" b="0"/>
+      </a:lnRef>
+      <a:fillRef idx="2">
+        <a:scrgbClr r="0" g="0" b="0"/>
+      </a:fillRef>
+      <a:effectRef idx="1">
+        <a:scrgbClr r="0" g="0" b="0"/>
+      </a:effectRef>
+      <a:fontRef idx="minor">
+        <a:schemeClr val="dk1"/>
+      </a:fontRef>
+    </dgm:style>
+  </dgm:styleLbl>
+  <dgm:styleLbl name="parChTrans2D2">
+    <dgm:scene3d>
+      <a:camera prst="orthographicFront"/>
+      <a:lightRig rig="threePt" dir="t"/>
+    </dgm:scene3d>
+    <dgm:sp3d/>
+    <dgm:txPr/>
+    <dgm:style>
+      <a:lnRef idx="1">
+        <a:scrgbClr r="0" g="0" b="0"/>
+      </a:lnRef>
+      <a:fillRef idx="2">
+        <a:scrgbClr r="0" g="0" b="0"/>
+      </a:fillRef>
+      <a:effectRef idx="1">
+        <a:scrgbClr r="0" g="0" b="0"/>
+      </a:effectRef>
+      <a:fontRef idx="minor">
+        <a:schemeClr val="dk1"/>
+      </a:fontRef>
+    </dgm:style>
+  </dgm:styleLbl>
+  <dgm:styleLbl name="parChTrans2D3">
+    <dgm:scene3d>
+      <a:camera prst="orthographicFront"/>
+      <a:lightRig rig="threePt" dir="t"/>
+    </dgm:scene3d>
+    <dgm:sp3d/>
+    <dgm:txPr/>
+    <dgm:style>
+      <a:lnRef idx="1">
+        <a:scrgbClr r="0" g="0" b="0"/>
+      </a:lnRef>
+      <a:fillRef idx="2">
+        <a:scrgbClr r="0" g="0" b="0"/>
+      </a:fillRef>
+      <a:effectRef idx="1">
+        <a:scrgbClr r="0" g="0" b="0"/>
+      </a:effectRef>
+      <a:fontRef idx="minor">
+        <a:schemeClr val="dk1"/>
+      </a:fontRef>
+    </dgm:style>
+  </dgm:styleLbl>
+  <dgm:styleLbl name="parChTrans2D4">
+    <dgm:scene3d>
+      <a:camera prst="orthographicFront"/>
+      <a:lightRig rig="threePt" dir="t"/>
+    </dgm:scene3d>
+    <dgm:sp3d/>
+    <dgm:txPr/>
+    <dgm:style>
+      <a:lnRef idx="1">
+        <a:scrgbClr r="0" g="0" b="0"/>
+      </a:lnRef>
+      <a:fillRef idx="2">
+        <a:scrgbClr r="0" g="0" b="0"/>
+      </a:fillRef>
+      <a:effectRef idx="1">
+        <a:scrgbClr r="0" g="0" b="0"/>
+      </a:effectRef>
+      <a:fontRef idx="minor">
+        <a:schemeClr val="dk1"/>
+      </a:fontRef>
+    </dgm:style>
+  </dgm:styleLbl>
+  <dgm:styleLbl name="parChTrans1D1">
+    <dgm:scene3d>
+      <a:camera prst="orthographicFront"/>
+      <a:lightRig rig="threePt" dir="t"/>
+    </dgm:scene3d>
+    <dgm:sp3d/>
+    <dgm:txPr/>
+    <dgm:style>
+      <a:lnRef idx="2">
+        <a:scrgbClr r="0" g="0" b="0"/>
+      </a:lnRef>
+      <a:fillRef idx="0">
+        <a:scrgbClr r="0" g="0" b="0"/>
+      </a:fillRef>
+      <a:effectRef idx="0">
+        <a:scrgbClr r="0" g="0" b="0"/>
+      </a:effectRef>
+      <a:fontRef idx="minor"/>
+    </dgm:style>
+  </dgm:styleLbl>
+  <dgm:styleLbl name="parChTrans1D2">
+    <dgm:scene3d>
+      <a:camera prst="orthographicFront"/>
+      <a:lightRig rig="threePt" dir="t"/>
+    </dgm:scene3d>
+    <dgm:sp3d/>
+    <dgm:txPr/>
+    <dgm:style>
+      <a:lnRef idx="2">
+        <a:scrgbClr r="0" g="0" b="0"/>
+      </a:lnRef>
+      <a:fillRef idx="0">
+        <a:scrgbClr r="0" g="0" b="0"/>
+      </a:fillRef>
+      <a:effectRef idx="0">
+        <a:scrgbClr r="0" g="0" b="0"/>
+      </a:effectRef>
+      <a:fontRef idx="minor"/>
+    </dgm:style>
+  </dgm:styleLbl>
+  <dgm:styleLbl name="parChTrans1D3">
+    <dgm:scene3d>
+      <a:camera prst="orthographicFront"/>
+      <a:lightRig rig="threePt" dir="t"/>
+    </dgm:scene3d>
+    <dgm:sp3d/>
+    <dgm:txPr/>
+    <dgm:style>
+      <a:lnRef idx="2">
+        <a:scrgbClr r="0" g="0" b="0"/>
+      </a:lnRef>
+      <a:fillRef idx="0">
+        <a:scrgbClr r="0" g="0" b="0"/>
+      </a:fillRef>
+      <a:effectRef idx="0">
+        <a:scrgbClr r="0" g="0" b="0"/>
+      </a:effectRef>
+      <a:fontRef idx="minor"/>
+    </dgm:style>
+  </dgm:styleLbl>
+  <dgm:styleLbl name="parChTrans1D4">
+    <dgm:scene3d>
+      <a:camera prst="orthographicFront"/>
+      <a:lightRig rig="threePt" dir="t"/>
+    </dgm:scene3d>
+    <dgm:sp3d/>
+    <dgm:txPr/>
+    <dgm:style>
+      <a:lnRef idx="2">
+        <a:scrgbClr r="0" g="0" b="0"/>
+      </a:lnRef>
+      <a:fillRef idx="0">
+        <a:scrgbClr r="0" g="0" b="0"/>
+      </a:fillRef>
+      <a:effectRef idx="0">
+        <a:scrgbClr r="0" g="0" b="0"/>
+      </a:effectRef>
+      <a:fontRef idx="minor"/>
+    </dgm:style>
+  </dgm:styleLbl>
+  <dgm:styleLbl name="fgAcc1">
+    <dgm:scene3d>
+      <a:camera prst="orthographicFront"/>
+      <a:lightRig rig="threePt" dir="t"/>
+    </dgm:scene3d>
+    <dgm:sp3d/>
+    <dgm:txPr/>
+    <dgm:style>
+      <a:lnRef idx="1">
+        <a:scrgbClr r="0" g="0" b="0"/>
+      </a:lnRef>
+      <a:fillRef idx="1">
+        <a:scrgbClr r="0" g="0" b="0"/>
+      </a:fillRef>
+      <a:effectRef idx="0">
+        <a:scrgbClr r="0" g="0" b="0"/>
+      </a:effectRef>
+      <a:fontRef idx="minor"/>
+    </dgm:style>
+  </dgm:styleLbl>
+  <dgm:styleLbl name="conFgAcc1">
+    <dgm:scene3d>
+      <a:camera prst="orthographicFront"/>
+      <a:lightRig rig="threePt" dir="t"/>
+    </dgm:scene3d>
+    <dgm:sp3d/>
+    <dgm:txPr/>
+    <dgm:style>
+      <a:lnRef idx="1">
+        <a:scrgbClr r="0" g="0" b="0"/>
+      </a:lnRef>
+      <a:fillRef idx="1">
+        <a:scrgbClr r="0" g="0" b="0"/>
+      </a:fillRef>
+      <a:effectRef idx="0">
+        <a:scrgbClr r="0" g="0" b="0"/>
+      </a:effectRef>
+      <a:fontRef idx="minor"/>
+    </dgm:style>
+  </dgm:styleLbl>
+  <dgm:styleLbl name="alignAcc1">
+    <dgm:scene3d>
+      <a:camera prst="orthographicFront"/>
+      <a:lightRig rig="threePt" dir="t"/>
+    </dgm:scene3d>
+    <dgm:sp3d/>
+    <dgm:txPr/>
+    <dgm:style>
+      <a:lnRef idx="1">
+        <a:scrgbClr r="0" g="0" b="0"/>
+      </a:lnRef>
+      <a:fillRef idx="1">
+        <a:scrgbClr r="0" g="0" b="0"/>
+      </a:fillRef>
+      <a:effectRef idx="0">
+        <a:scrgbClr r="0" g="0" b="0"/>
+      </a:effectRef>
+      <a:fontRef idx="minor"/>
+    </dgm:style>
+  </dgm:styleLbl>
+  <dgm:styleLbl name="trAlignAcc1">
+    <dgm:scene3d>
+      <a:camera prst="orthographicFront"/>
+      <a:lightRig rig="threePt" dir="t"/>
+    </dgm:scene3d>
+    <dgm:sp3d/>
+    <dgm:txPr/>
+    <dgm:style>
+      <a:lnRef idx="1">
+        <a:scrgbClr r="0" g="0" b="0"/>
+      </a:lnRef>
+      <a:fillRef idx="1">
+        <a:scrgbClr r="0" g="0" b="0"/>
+      </a:fillRef>
+      <a:effectRef idx="0">
+        <a:scrgbClr r="0" g="0" b="0"/>
+      </a:effectRef>
+      <a:fontRef idx="minor"/>
+    </dgm:style>
+  </dgm:styleLbl>
+  <dgm:styleLbl name="bgAcc1">
+    <dgm:scene3d>
+      <a:camera prst="orthographicFront"/>
+      <a:lightRig rig="threePt" dir="t"/>
+    </dgm:scene3d>
+    <dgm:sp3d/>
+    <dgm:txPr/>
+    <dgm:style>
+      <a:lnRef idx="1">
+        <a:scrgbClr r="0" g="0" b="0"/>
+      </a:lnRef>
+      <a:fillRef idx="1">
+        <a:scrgbClr r="0" g="0" b="0"/>
+      </a:fillRef>
+      <a:effectRef idx="0">
+        <a:scrgbClr r="0" g="0" b="0"/>
+      </a:effectRef>
+      <a:fontRef idx="minor"/>
+    </dgm:style>
+  </dgm:styleLbl>
+  <dgm:styleLbl name="solidFgAcc1">
+    <dgm:scene3d>
+      <a:camera prst="orthographicFront"/>
+      <a:lightRig rig="threePt" dir="t"/>
+    </dgm:scene3d>
+    <dgm:sp3d/>
+    <dgm:txPr/>
+    <dgm:style>
+      <a:lnRef idx="1">
+        <a:scrgbClr r="0" g="0" b="0"/>
+      </a:lnRef>
+      <a:fillRef idx="2">
+        <a:scrgbClr r="0" g="0" b="0"/>
+      </a:fillRef>
+      <a:effectRef idx="0">
+        <a:scrgbClr r="0" g="0" b="0"/>
+      </a:effectRef>
+      <a:fontRef idx="minor"/>
+    </dgm:style>
+  </dgm:styleLbl>
+  <dgm:styleLbl name="solidAlignAcc1">
+    <dgm:scene3d>
+      <a:camera prst="orthographicFront"/>
+      <a:lightRig rig="threePt" dir="t"/>
+    </dgm:scene3d>
+    <dgm:sp3d/>
+    <dgm:txPr/>
+    <dgm:style>
+      <a:lnRef idx="1">
+        <a:scrgbClr r="0" g="0" b="0"/>
+      </a:lnRef>
+      <a:fillRef idx="1">
+        <a:scrgbClr r="0" g="0" b="0"/>
+      </a:fillRef>
+      <a:effectRef idx="0">
+        <a:scrgbClr r="0" g="0" b="0"/>
+      </a:effectRef>
+      <a:fontRef idx="minor"/>
+    </dgm:style>
+  </dgm:styleLbl>
+  <dgm:styleLbl name="solidBgAcc1">
+    <dgm:scene3d>
+      <a:camera prst="orthographicFront"/>
+      <a:lightRig rig="threePt" dir="t"/>
+    </dgm:scene3d>
+    <dgm:sp3d/>
+    <dgm:txPr/>
+    <dgm:style>
+      <a:lnRef idx="1">
+        <a:scrgbClr r="0" g="0" b="0"/>
+      </a:lnRef>
+      <a:fillRef idx="1">
+        <a:scrgbClr r="0" g="0" b="0"/>
+      </a:fillRef>
+      <a:effectRef idx="0">
+        <a:scrgbClr r="0" g="0" b="0"/>
+      </a:effectRef>
+      <a:fontRef idx="minor"/>
+    </dgm:style>
+  </dgm:styleLbl>
+  <dgm:styleLbl name="fgAccFollowNode1">
+    <dgm:scene3d>
+      <a:camera prst="orthographicFront"/>
+      <a:lightRig rig="threePt" dir="t"/>
+    </dgm:scene3d>
+    <dgm:sp3d/>
+    <dgm:txPr/>
+    <dgm:style>
+      <a:lnRef idx="1">
+        <a:scrgbClr r="0" g="0" b="0"/>
+      </a:lnRef>
+      <a:fillRef idx="1">
+        <a:scrgbClr r="0" g="0" b="0"/>
+      </a:fillRef>
+      <a:effectRef idx="0">
+        <a:scrgbClr r="0" g="0" b="0"/>
+      </a:effectRef>
+      <a:fontRef idx="minor"/>
+    </dgm:style>
+  </dgm:styleLbl>
+  <dgm:styleLbl name="alignAccFollowNode1">
+    <dgm:scene3d>
+      <a:camera prst="orthographicFront"/>
+      <a:lightRig rig="threePt" dir="t"/>
+    </dgm:scene3d>
+    <dgm:sp3d/>
+    <dgm:txPr/>
+    <dgm:style>
+      <a:lnRef idx="1">
+        <a:scrgbClr r="0" g="0" b="0"/>
+      </a:lnRef>
+      <a:fillRef idx="1">
+        <a:scrgbClr r="0" g="0" b="0"/>
+      </a:fillRef>
+      <a:effectRef idx="0">
+        <a:scrgbClr r="0" g="0" b="0"/>
+      </a:effectRef>
+      <a:fontRef idx="minor"/>
+    </dgm:style>
+  </dgm:styleLbl>
+  <dgm:styleLbl name="bgAccFollowNode1">
+    <dgm:scene3d>
+      <a:camera prst="orthographicFront"/>
+      <a:lightRig rig="threePt" dir="t"/>
+    </dgm:scene3d>
+    <dgm:sp3d/>
+    <dgm:txPr/>
+    <dgm:style>
+      <a:lnRef idx="1">
+        <a:scrgbClr r="0" g="0" b="0"/>
+      </a:lnRef>
+      <a:fillRef idx="1">
+        <a:scrgbClr r="0" g="0" b="0"/>
+      </a:fillRef>
+      <a:effectRef idx="0">
+        <a:scrgbClr r="0" g="0" b="0"/>
+      </a:effectRef>
+      <a:fontRef idx="minor"/>
+    </dgm:style>
+  </dgm:styleLbl>
+  <dgm:styleLbl name="fgAcc0">
+    <dgm:scene3d>
+      <a:camera prst="orthographicFront"/>
+      <a:lightRig rig="threePt" dir="t"/>
+    </dgm:scene3d>
+    <dgm:sp3d/>
+    <dgm:txPr/>
+    <dgm:style>
+      <a:lnRef idx="1">
+        <a:scrgbClr r="0" g="0" b="0"/>
+      </a:lnRef>
+      <a:fillRef idx="1">
+        <a:scrgbClr r="0" g="0" b="0"/>
+      </a:fillRef>
+      <a:effectRef idx="0">
+        <a:scrgbClr r="0" g="0" b="0"/>
+      </a:effectRef>
+      <a:fontRef idx="minor"/>
+    </dgm:style>
+  </dgm:styleLbl>
+  <dgm:styleLbl name="fgAcc2">
+    <dgm:scene3d>
+      <a:camera prst="orthographicFront"/>
+      <a:lightRig rig="threePt" dir="t"/>
+    </dgm:scene3d>
+    <dgm:sp3d/>
+    <dgm:txPr/>
+    <dgm:style>
+      <a:lnRef idx="1">
+        <a:scrgbClr r="0" g="0" b="0"/>
+      </a:lnRef>
+      <a:fillRef idx="1">
+        <a:scrgbClr r="0" g="0" b="0"/>
+      </a:fillRef>
+      <a:effectRef idx="0">
+        <a:scrgbClr r="0" g="0" b="0"/>
+      </a:effectRef>
+      <a:fontRef idx="minor"/>
+    </dgm:style>
+  </dgm:styleLbl>
+  <dgm:styleLbl name="fgAcc3">
+    <dgm:scene3d>
+      <a:camera prst="orthographicFront"/>
+      <a:lightRig rig="threePt" dir="t"/>
+    </dgm:scene3d>
+    <dgm:sp3d/>
+    <dgm:txPr/>
+    <dgm:style>
+      <a:lnRef idx="1">
+        <a:scrgbClr r="0" g="0" b="0"/>
+      </a:lnRef>
+      <a:fillRef idx="1">
+        <a:scrgbClr r="0" g="0" b="0"/>
+      </a:fillRef>
+      <a:effectRef idx="0">
+        <a:scrgbClr r="0" g="0" b="0"/>
+      </a:effectRef>
+      <a:fontRef idx="minor"/>
+    </dgm:style>
+  </dgm:styleLbl>
+  <dgm:styleLbl name="fgAcc4">
+    <dgm:scene3d>
+      <a:camera prst="orthographicFront"/>
+      <a:lightRig rig="threePt" dir="t"/>
+    </dgm:scene3d>
+    <dgm:sp3d/>
+    <dgm:txPr/>
+    <dgm:style>
+      <a:lnRef idx="1">
+        <a:scrgbClr r="0" g="0" b="0"/>
+      </a:lnRef>
+      <a:fillRef idx="1">
+        <a:scrgbClr r="0" g="0" b="0"/>
+      </a:fillRef>
+      <a:effectRef idx="0">
+        <a:scrgbClr r="0" g="0" b="0"/>
+      </a:effectRef>
+      <a:fontRef idx="minor"/>
+    </dgm:style>
+  </dgm:styleLbl>
+  <dgm:styleLbl name="bgShp">
+    <dgm:scene3d>
+      <a:camera prst="orthographicFront"/>
+      <a:lightRig rig="threePt" dir="t"/>
+    </dgm:scene3d>
+    <dgm:sp3d/>
+    <dgm:txPr/>
+    <dgm:style>
+      <a:lnRef idx="0">
+        <a:scrgbClr r="0" g="0" b="0"/>
+      </a:lnRef>
+      <a:fillRef idx="1">
+        <a:scrgbClr r="0" g="0" b="0"/>
+      </a:fillRef>
+      <a:effectRef idx="1">
+        <a:scrgbClr r="0" g="0" b="0"/>
+      </a:effectRef>
+      <a:fontRef idx="minor"/>
+    </dgm:style>
+  </dgm:styleLbl>
+  <dgm:styleLbl name="dkBgShp">
+    <dgm:scene3d>
+      <a:camera prst="orthographicFront"/>
+      <a:lightRig rig="threePt" dir="t"/>
+    </dgm:scene3d>
+    <dgm:sp3d/>
+    <dgm:txPr/>
+    <dgm:style>
+      <a:lnRef idx="0">
+        <a:scrgbClr r="0" g="0" b="0"/>
+      </a:lnRef>
+      <a:fillRef idx="1">
+        <a:scrgbClr r="0" g="0" b="0"/>
+      </a:fillRef>
+      <a:effectRef idx="1">
+        <a:scrgbClr r="0" g="0" b="0"/>
+      </a:effectRef>
+      <a:fontRef idx="minor"/>
+    </dgm:style>
+  </dgm:styleLbl>
+  <dgm:styleLbl name="trBgShp">
+    <dgm:scene3d>
+      <a:camera prst="orthographicFront"/>
+      <a:lightRig rig="threePt" dir="t"/>
+    </dgm:scene3d>
+    <dgm:sp3d/>
+    <dgm:txPr/>
+    <dgm:style>
+      <a:lnRef idx="0">
+        <a:scrgbClr r="0" g="0" b="0"/>
+      </a:lnRef>
+      <a:fillRef idx="1">
+        <a:scrgbClr r="0" g="0" b="0"/>
+      </a:fillRef>
+      <a:effectRef idx="0">
+        <a:scrgbClr r="0" g="0" b="0"/>
+      </a:effectRef>
+      <a:fontRef idx="minor"/>
+    </dgm:style>
+  </dgm:styleLbl>
+  <dgm:styleLbl name="fgShp">
+    <dgm:scene3d>
+      <a:camera prst="orthographicFront"/>
+      <a:lightRig rig="flat" dir="t"/>
+    </dgm:scene3d>
+    <dgm:sp3d prstMaterial="dkEdge">
+      <a:bevelT w="8200" h="38100"/>
+    </dgm:sp3d>
+    <dgm:txPr/>
+    <dgm:style>
+      <a:lnRef idx="1">
+        <a:scrgbClr r="0" g="0" b="0"/>
+      </a:lnRef>
+      <a:fillRef idx="2">
+        <a:scrgbClr r="0" g="0" b="0"/>
+      </a:fillRef>
+      <a:effectRef idx="1">
+        <a:scrgbClr r="0" g="0" b="0"/>
+      </a:effectRef>
+      <a:fontRef idx="minor"/>
+    </dgm:style>
+  </dgm:styleLbl>
+  <dgm:styleLbl name="revTx">
+    <dgm:scene3d>
+      <a:camera prst="orthographicFront"/>
+      <a:lightRig rig="threePt" dir="t"/>
+    </dgm:scene3d>
+    <dgm:sp3d/>
+    <dgm:txPr/>
+    <dgm:style>
+      <a:lnRef idx="0">
+        <a:scrgbClr r="0" g="0" b="0"/>
+      </a:lnRef>
+      <a:fillRef idx="0">
+        <a:scrgbClr r="0" g="0" b="0"/>
+      </a:fillRef>
+      <a:effectRef idx="0">
+        <a:scrgbClr r="0" g="0" b="0"/>
+      </a:effectRef>
+      <a:fontRef idx="minor"/>
+    </dgm:style>
+  </dgm:styleLbl>
+</dgm:styleDef>
+</file>
+
+<file path=ppt/diagrams/quickStyle5.xml><?xml version="1.0" encoding="utf-8"?>
 <dgm:styleDef xmlns:dgm="http://schemas.openxmlformats.org/drawingml/2006/diagram" xmlns:a="http://schemas.openxmlformats.org/drawingml/2006/main" uniqueId="urn:microsoft.com/office/officeart/2005/8/quickstyle/simple3">
   <dgm:title val=""/>
   <dgm:desc val=""/>
@@ -19869,6 +22674,339 @@
       </p:grpSpPr>
       <p:sp>
         <p:nvSpPr>
+          <p:cNvPr id="12" name="Title 11">
+            <a:extLst>
+              <a:ext uri="{FF2B5EF4-FFF2-40B4-BE49-F238E27FC236}">
+                <a16:creationId xmlns:a16="http://schemas.microsoft.com/office/drawing/2014/main" id="{2DD2AFE4-63BE-45E4-B15C-024DB8D8D5D6}"/>
+              </a:ext>
+            </a:extLst>
+          </p:cNvPr>
+          <p:cNvSpPr>
+            <a:spLocks noGrp="1"/>
+          </p:cNvSpPr>
+          <p:nvPr>
+            <p:ph type="title"/>
+          </p:nvPr>
+        </p:nvSpPr>
+        <p:spPr/>
+        <p:txBody>
+          <a:bodyPr/>
+          <a:lstStyle/>
+          <a:p>
+            <a:r>
+              <a:rPr lang="en-US" dirty="0"/>
+              <a:t>Methodology and Procedure</a:t>
+            </a:r>
+          </a:p>
+        </p:txBody>
+      </p:sp>
+      <p:graphicFrame>
+        <p:nvGraphicFramePr>
+          <p:cNvPr id="5" name="Diagram 4">
+            <a:extLst>
+              <a:ext uri="{FF2B5EF4-FFF2-40B4-BE49-F238E27FC236}">
+                <a16:creationId xmlns:a16="http://schemas.microsoft.com/office/drawing/2014/main" id="{B1338040-89B1-474B-AE2E-9438B2C640BA}"/>
+              </a:ext>
+            </a:extLst>
+          </p:cNvPr>
+          <p:cNvGraphicFramePr/>
+          <p:nvPr>
+            <p:extLst>
+              <p:ext uri="{D42A27DB-BD31-4B8C-83A1-F6EECF244321}">
+                <p14:modId xmlns:p14="http://schemas.microsoft.com/office/powerpoint/2010/main" val="681127614"/>
+              </p:ext>
+            </p:extLst>
+          </p:nvPr>
+        </p:nvGraphicFramePr>
+        <p:xfrm>
+          <a:off x="396484" y="1188492"/>
+          <a:ext cx="8351031" cy="840346"/>
+        </p:xfrm>
+        <a:graphic>
+          <a:graphicData uri="http://schemas.openxmlformats.org/drawingml/2006/diagram">
+            <dgm:relIds xmlns:dgm="http://schemas.openxmlformats.org/drawingml/2006/diagram" xmlns:r="http://schemas.openxmlformats.org/officeDocument/2006/relationships" r:dm="rId2" r:lo="rId3" r:qs="rId4" r:cs="rId5"/>
+          </a:graphicData>
+        </a:graphic>
+      </p:graphicFrame>
+      <p:sp>
+        <p:nvSpPr>
+          <p:cNvPr id="8" name="Text Placeholder 12">
+            <a:extLst>
+              <a:ext uri="{FF2B5EF4-FFF2-40B4-BE49-F238E27FC236}">
+                <a16:creationId xmlns:a16="http://schemas.microsoft.com/office/drawing/2014/main" id="{9885164F-EB21-49BB-B210-AD5A1F91677F}"/>
+              </a:ext>
+            </a:extLst>
+          </p:cNvPr>
+          <p:cNvSpPr txBox="1">
+            <a:spLocks/>
+          </p:cNvSpPr>
+          <p:nvPr/>
+        </p:nvSpPr>
+        <p:spPr>
+          <a:xfrm>
+            <a:off x="966788" y="2253803"/>
+            <a:ext cx="7562850" cy="4171627"/>
+          </a:xfrm>
+          <a:prstGeom prst="rect">
+            <a:avLst/>
+          </a:prstGeom>
+        </p:spPr>
+        <p:txBody>
+          <a:bodyPr vert="horz"/>
+          <a:lstStyle>
+            <a:lvl1pPr marL="0" indent="0" algn="l" defTabSz="457200" rtl="0" eaLnBrk="1" fontAlgn="base" hangingPunct="1">
+              <a:spcBef>
+                <a:spcPts val="1200"/>
+              </a:spcBef>
+              <a:spcAft>
+                <a:spcPts val="600"/>
+              </a:spcAft>
+              <a:buFont typeface="Arial" panose="020B0604020202020204" pitchFamily="34" charset="0"/>
+              <a:buNone/>
+              <a:tabLst>
+                <a:tab pos="230188" algn="l"/>
+              </a:tabLst>
+              <a:defRPr sz="2000" b="1" kern="1200">
+                <a:solidFill>
+                  <a:schemeClr val="tx1"/>
+                </a:solidFill>
+                <a:latin typeface="+mn-lt"/>
+                <a:ea typeface="ＭＳ Ｐゴシック" charset="0"/>
+                <a:cs typeface="Geneva" charset="0"/>
+              </a:defRPr>
+            </a:lvl1pPr>
+            <a:lvl2pPr marL="3175" indent="0" algn="l" defTabSz="457200" rtl="0" eaLnBrk="1" fontAlgn="base" hangingPunct="1">
+              <a:spcBef>
+                <a:spcPts val="0"/>
+              </a:spcBef>
+              <a:spcAft>
+                <a:spcPts val="1200"/>
+              </a:spcAft>
+              <a:buFont typeface="Arial" panose="020B0604020202020204" pitchFamily="34" charset="0"/>
+              <a:buNone/>
+              <a:defRPr sz="1800" b="1" kern="1200">
+                <a:solidFill>
+                  <a:schemeClr val="tx1"/>
+                </a:solidFill>
+                <a:latin typeface="+mn-lt"/>
+                <a:ea typeface="Geneva" charset="0"/>
+                <a:cs typeface="Geneva" charset="0"/>
+              </a:defRPr>
+            </a:lvl2pPr>
+            <a:lvl3pPr marL="228600" indent="-228600" algn="l" defTabSz="457200" rtl="0" eaLnBrk="1" fontAlgn="base" hangingPunct="1">
+              <a:spcBef>
+                <a:spcPct val="20000"/>
+              </a:spcBef>
+              <a:spcAft>
+                <a:spcPct val="0"/>
+              </a:spcAft>
+              <a:buFont typeface="Arial" panose="020B0604020202020204" pitchFamily="34" charset="0"/>
+              <a:buChar char="•"/>
+              <a:defRPr sz="1800" kern="1200">
+                <a:solidFill>
+                  <a:schemeClr val="tx1"/>
+                </a:solidFill>
+                <a:latin typeface="+mn-lt"/>
+                <a:ea typeface="Geneva" charset="0"/>
+                <a:cs typeface="Geneva" charset="0"/>
+              </a:defRPr>
+            </a:lvl3pPr>
+            <a:lvl4pPr marL="514350" indent="-230188" algn="l" defTabSz="457200" rtl="0" eaLnBrk="1" fontAlgn="base" hangingPunct="1">
+              <a:spcBef>
+                <a:spcPct val="20000"/>
+              </a:spcBef>
+              <a:spcAft>
+                <a:spcPct val="0"/>
+              </a:spcAft>
+              <a:buFont typeface="Lucida Grande"/>
+              <a:buChar char="-"/>
+              <a:tabLst/>
+              <a:defRPr sz="1800" kern="1200">
+                <a:solidFill>
+                  <a:schemeClr val="tx1"/>
+                </a:solidFill>
+                <a:latin typeface="+mn-lt"/>
+                <a:ea typeface="Geneva" charset="0"/>
+                <a:cs typeface="Geneva" charset="0"/>
+              </a:defRPr>
+            </a:lvl4pPr>
+            <a:lvl5pPr marL="747713" indent="-228600" algn="l" defTabSz="457200" rtl="0" eaLnBrk="1" fontAlgn="base" hangingPunct="1">
+              <a:spcBef>
+                <a:spcPct val="20000"/>
+              </a:spcBef>
+              <a:spcAft>
+                <a:spcPct val="0"/>
+              </a:spcAft>
+              <a:buFont typeface="Lucida Grande"/>
+              <a:buChar char="·"/>
+              <a:defRPr sz="1800" kern="1200">
+                <a:solidFill>
+                  <a:schemeClr val="tx1"/>
+                </a:solidFill>
+                <a:latin typeface="+mn-lt"/>
+                <a:ea typeface="Geneva" charset="0"/>
+                <a:cs typeface="Geneva" charset="0"/>
+              </a:defRPr>
+            </a:lvl5pPr>
+            <a:lvl6pPr marL="2514600" indent="-228600" algn="l" defTabSz="457200" rtl="0" eaLnBrk="1" latinLnBrk="0" hangingPunct="1">
+              <a:spcBef>
+                <a:spcPct val="20000"/>
+              </a:spcBef>
+              <a:buFont typeface="Arial"/>
+              <a:buChar char="•"/>
+              <a:defRPr sz="2000" kern="1200">
+                <a:solidFill>
+                  <a:schemeClr val="tx1"/>
+                </a:solidFill>
+                <a:latin typeface="+mn-lt"/>
+                <a:ea typeface="+mn-ea"/>
+                <a:cs typeface="+mn-cs"/>
+              </a:defRPr>
+            </a:lvl6pPr>
+            <a:lvl7pPr marL="2971800" indent="-228600" algn="l" defTabSz="457200" rtl="0" eaLnBrk="1" latinLnBrk="0" hangingPunct="1">
+              <a:spcBef>
+                <a:spcPct val="20000"/>
+              </a:spcBef>
+              <a:buFont typeface="Arial"/>
+              <a:buChar char="•"/>
+              <a:defRPr sz="2000" kern="1200">
+                <a:solidFill>
+                  <a:schemeClr val="tx1"/>
+                </a:solidFill>
+                <a:latin typeface="+mn-lt"/>
+                <a:ea typeface="+mn-ea"/>
+                <a:cs typeface="+mn-cs"/>
+              </a:defRPr>
+            </a:lvl7pPr>
+            <a:lvl8pPr marL="3429000" indent="-228600" algn="l" defTabSz="457200" rtl="0" eaLnBrk="1" latinLnBrk="0" hangingPunct="1">
+              <a:spcBef>
+                <a:spcPct val="20000"/>
+              </a:spcBef>
+              <a:buFont typeface="Arial"/>
+              <a:buChar char="•"/>
+              <a:defRPr sz="2000" kern="1200">
+                <a:solidFill>
+                  <a:schemeClr val="tx1"/>
+                </a:solidFill>
+                <a:latin typeface="+mn-lt"/>
+                <a:ea typeface="+mn-ea"/>
+                <a:cs typeface="+mn-cs"/>
+              </a:defRPr>
+            </a:lvl8pPr>
+            <a:lvl9pPr marL="3886200" indent="-228600" algn="l" defTabSz="457200" rtl="0" eaLnBrk="1" latinLnBrk="0" hangingPunct="1">
+              <a:spcBef>
+                <a:spcPct val="20000"/>
+              </a:spcBef>
+              <a:buFont typeface="Arial"/>
+              <a:buChar char="•"/>
+              <a:defRPr sz="2000" kern="1200">
+                <a:solidFill>
+                  <a:schemeClr val="tx1"/>
+                </a:solidFill>
+                <a:latin typeface="+mn-lt"/>
+                <a:ea typeface="+mn-ea"/>
+                <a:cs typeface="+mn-cs"/>
+              </a:defRPr>
+            </a:lvl9pPr>
+          </a:lstStyle>
+          <a:p>
+            <a:pPr marL="342900" indent="-342900">
+              <a:buFont typeface="Arial" panose="020B0604020202020204" pitchFamily="34" charset="0"/>
+              <a:buChar char="•"/>
+            </a:pPr>
+            <a:endParaRPr lang="en-US" dirty="0"/>
+          </a:p>
+          <a:p>
+            <a:pPr marL="342900" indent="-342900">
+              <a:buFont typeface="Arial" panose="020B0604020202020204" pitchFamily="34" charset="0"/>
+              <a:buChar char="•"/>
+            </a:pPr>
+            <a:r>
+              <a:rPr lang="en-US" dirty="0"/>
+              <a:t>System will be developed under ROS environment. </a:t>
+            </a:r>
+          </a:p>
+          <a:p>
+            <a:pPr marL="342900" indent="-342900">
+              <a:buFont typeface="Arial" panose="020B0604020202020204" pitchFamily="34" charset="0"/>
+              <a:buChar char="•"/>
+            </a:pPr>
+            <a:endParaRPr lang="en-US" dirty="0"/>
+          </a:p>
+          <a:p>
+            <a:pPr marL="342900" indent="-342900">
+              <a:buFont typeface="Arial" panose="020B0604020202020204" pitchFamily="34" charset="0"/>
+              <a:buChar char="•"/>
+            </a:pPr>
+            <a:r>
+              <a:rPr lang="en-US" dirty="0"/>
+              <a:t>Validation will be conducted using unified datasets exploiting different scenarios, and having a ground truth.</a:t>
+            </a:r>
+          </a:p>
+          <a:p>
+            <a:pPr marL="342900" indent="-342900">
+              <a:buFont typeface="Arial" panose="020B0604020202020204" pitchFamily="34" charset="0"/>
+              <a:buChar char="•"/>
+            </a:pPr>
+            <a:endParaRPr lang="en-US" dirty="0"/>
+          </a:p>
+          <a:p>
+            <a:pPr marL="342900" indent="-342900">
+              <a:buFont typeface="Arial" panose="020B0604020202020204" pitchFamily="34" charset="0"/>
+              <a:buChar char="•"/>
+            </a:pPr>
+            <a:r>
+              <a:rPr lang="en-US" dirty="0"/>
+              <a:t>Datasets selected are KITTI and TUM RGB-D.</a:t>
+            </a:r>
+          </a:p>
+          <a:p>
+            <a:pPr marL="682625" indent="-342900">
+              <a:buFont typeface="Arial" panose="020B0604020202020204" pitchFamily="34" charset="0"/>
+              <a:buChar char="•"/>
+              <a:tabLst>
+                <a:tab pos="515938" algn="l"/>
+              </a:tabLst>
+            </a:pPr>
+            <a:r>
+              <a:rPr lang="en-US" b="0" dirty="0"/>
+              <a:t>Covering indoor/outdoor static/dynamic conditions. </a:t>
+            </a:r>
+          </a:p>
+        </p:txBody>
+      </p:sp>
+    </p:spTree>
+    <p:extLst>
+      <p:ext uri="{BB962C8B-B14F-4D97-AF65-F5344CB8AC3E}">
+        <p14:creationId xmlns:p14="http://schemas.microsoft.com/office/powerpoint/2010/main" val="2884775656"/>
+      </p:ext>
+    </p:extLst>
+  </p:cSld>
+  <p:clrMapOvr>
+    <a:masterClrMapping/>
+  </p:clrMapOvr>
+</p:sld>
+</file>
+
+<file path=ppt/slides/slide11.xml><?xml version="1.0" encoding="utf-8"?>
+<p:sld xmlns:a="http://schemas.openxmlformats.org/drawingml/2006/main" xmlns:r="http://schemas.openxmlformats.org/officeDocument/2006/relationships" xmlns:p="http://schemas.openxmlformats.org/presentationml/2006/main">
+  <p:cSld>
+    <p:spTree>
+      <p:nvGrpSpPr>
+        <p:cNvPr id="1" name=""/>
+        <p:cNvGrpSpPr/>
+        <p:nvPr/>
+      </p:nvGrpSpPr>
+      <p:grpSpPr>
+        <a:xfrm>
+          <a:off x="0" y="0"/>
+          <a:ext cx="0" cy="0"/>
+          <a:chOff x="0" y="0"/>
+          <a:chExt cx="0" cy="0"/>
+        </a:xfrm>
+      </p:grpSpPr>
+      <p:sp>
+        <p:nvSpPr>
           <p:cNvPr id="13" name="Text Placeholder 12">
             <a:extLst>
               <a:ext uri="{FF2B5EF4-FFF2-40B4-BE49-F238E27FC236}">
@@ -20050,7 +23188,7 @@
 </p:sld>
 </file>
 
-<file path=ppt/slides/slide11.xml><?xml version="1.0" encoding="utf-8"?>
+<file path=ppt/slides/slide12.xml><?xml version="1.0" encoding="utf-8"?>
 <p:sld xmlns:a="http://schemas.openxmlformats.org/drawingml/2006/main" xmlns:r="http://schemas.openxmlformats.org/officeDocument/2006/relationships" xmlns:p="http://schemas.openxmlformats.org/presentationml/2006/main">
   <p:cSld>
     <p:spTree>
@@ -20174,7 +23312,7 @@
 </p:sld>
 </file>
 
-<file path=ppt/slides/slide12.xml><?xml version="1.0" encoding="utf-8"?>
+<file path=ppt/slides/slide13.xml><?xml version="1.0" encoding="utf-8"?>
 <p:sld xmlns:a="http://schemas.openxmlformats.org/drawingml/2006/main" xmlns:r="http://schemas.openxmlformats.org/officeDocument/2006/relationships" xmlns:p="http://schemas.openxmlformats.org/presentationml/2006/main">
   <p:cSld>
     <p:spTree>
@@ -20300,7 +23438,7 @@
 </p:sld>
 </file>
 
-<file path=ppt/slides/slide13.xml><?xml version="1.0" encoding="utf-8"?>
+<file path=ppt/slides/slide14.xml><?xml version="1.0" encoding="utf-8"?>
 <p:sld xmlns:a="http://schemas.openxmlformats.org/drawingml/2006/main" xmlns:r="http://schemas.openxmlformats.org/officeDocument/2006/relationships" xmlns:p="http://schemas.openxmlformats.org/presentationml/2006/main">
   <p:cSld>
     <p:spTree>
@@ -20851,7 +23989,7 @@
           <p:nvPr>
             <p:extLst>
               <p:ext uri="{D42A27DB-BD31-4B8C-83A1-F6EECF244321}">
-                <p14:modId xmlns:p14="http://schemas.microsoft.com/office/powerpoint/2010/main" val="1714788623"/>
+                <p14:modId xmlns:p14="http://schemas.microsoft.com/office/powerpoint/2010/main" val="3807098568"/>
               </p:ext>
             </p:extLst>
           </p:nvPr>
@@ -21322,9 +24460,47 @@
               <a:buFont typeface="Arial" panose="020B0604020202020204" pitchFamily="34" charset="0"/>
               <a:buChar char="•"/>
             </a:pPr>
+            <a:endParaRPr lang="en-US" dirty="0"/>
+          </a:p>
+          <a:p>
+            <a:pPr marL="342900" indent="-342900">
+              <a:buFont typeface="Arial" panose="020B0604020202020204" pitchFamily="34" charset="0"/>
+              <a:buChar char="•"/>
+            </a:pPr>
             <a:r>
               <a:rPr lang="en-US" dirty="0"/>
-              <a:t>Top-level Procedure:</a:t>
+              <a:t>Baseline performance is the performance of both RTAB-Map and ORB-SLAM2 on the selected datasets.</a:t>
+            </a:r>
+          </a:p>
+          <a:p>
+            <a:pPr marL="682625" lvl="1" indent="-342900">
+              <a:buFont typeface="Arial" panose="020B0604020202020204" pitchFamily="34" charset="0"/>
+              <a:buChar char="•"/>
+            </a:pPr>
+            <a:r>
+              <a:rPr lang="en-US" b="0" dirty="0">
+                <a:solidFill>
+                  <a:srgbClr val="00B050"/>
+                </a:solidFill>
+              </a:rPr>
+              <a:t>KITTI (for outdoor), and TUM RGB-D (for indoor)</a:t>
+            </a:r>
+          </a:p>
+          <a:p>
+            <a:pPr marL="342900" indent="-342900">
+              <a:buFont typeface="Arial" panose="020B0604020202020204" pitchFamily="34" charset="0"/>
+              <a:buChar char="•"/>
+            </a:pPr>
+            <a:endParaRPr lang="en-US" dirty="0"/>
+          </a:p>
+          <a:p>
+            <a:pPr marL="342900" indent="-342900">
+              <a:buFont typeface="Arial" panose="020B0604020202020204" pitchFamily="34" charset="0"/>
+              <a:buChar char="•"/>
+            </a:pPr>
+            <a:r>
+              <a:rPr lang="en-US" dirty="0"/>
+              <a:t>Accuracy performance metrics are available in a number of studies, and can be replicated during the course of the research work.</a:t>
             </a:r>
           </a:p>
         </p:txBody>
@@ -21597,17 +24773,108 @@
             </a:lvl9pPr>
           </a:lstStyle>
           <a:p>
-            <a:pPr marL="342900" indent="-342900">
+            <a:pPr marL="342900" indent="-342900" algn="just">
               <a:buFont typeface="Arial" panose="020B0604020202020204" pitchFamily="34" charset="0"/>
               <a:buChar char="•"/>
             </a:pPr>
             <a:r>
               <a:rPr lang="en-US" dirty="0"/>
-              <a:t>Top-level Procedure:</a:t>
+              <a:t>RTAB-map only perform local optimization on camera poses to minimize the re-projection error between matched 3D points in world coordinate frame and the camera observation.</a:t>
             </a:r>
+          </a:p>
+          <a:p>
+            <a:pPr marL="342900" indent="-342900" algn="just">
+              <a:buFont typeface="Arial" panose="020B0604020202020204" pitchFamily="34" charset="0"/>
+              <a:buChar char="•"/>
+            </a:pPr>
+            <a:endParaRPr lang="en-US" dirty="0"/>
+          </a:p>
+          <a:p>
+            <a:pPr marL="342900" indent="-342900" algn="just">
+              <a:buFont typeface="Arial" panose="020B0604020202020204" pitchFamily="34" charset="0"/>
+              <a:buChar char="•"/>
+            </a:pPr>
+            <a:endParaRPr lang="en-US" dirty="0"/>
+          </a:p>
+          <a:p>
+            <a:pPr marL="342900" indent="-342900" algn="just">
+              <a:buFont typeface="Arial" panose="020B0604020202020204" pitchFamily="34" charset="0"/>
+              <a:buChar char="•"/>
+            </a:pPr>
+            <a:r>
+              <a:rPr lang="en-US" dirty="0"/>
+              <a:t>ORB-SLAM2 optimize the feature points in the map, and can provide more accurate depth information for feature points in keyframes. </a:t>
+            </a:r>
+          </a:p>
+          <a:p>
+            <a:pPr marL="342900" indent="-342900" algn="just">
+              <a:buFont typeface="Arial" panose="020B0604020202020204" pitchFamily="34" charset="0"/>
+              <a:buChar char="•"/>
+            </a:pPr>
+            <a:endParaRPr lang="en-US" dirty="0"/>
           </a:p>
         </p:txBody>
       </p:sp>
+      <p:pic>
+        <p:nvPicPr>
+          <p:cNvPr id="2" name="Picture 1">
+            <a:extLst>
+              <a:ext uri="{FF2B5EF4-FFF2-40B4-BE49-F238E27FC236}">
+                <a16:creationId xmlns:a16="http://schemas.microsoft.com/office/drawing/2014/main" id="{2929E67F-EAC4-4B39-9A49-B4A9782F3F1C}"/>
+              </a:ext>
+            </a:extLst>
+          </p:cNvPr>
+          <p:cNvPicPr>
+            <a:picLocks noChangeAspect="1"/>
+          </p:cNvPicPr>
+          <p:nvPr/>
+        </p:nvPicPr>
+        <p:blipFill>
+          <a:blip r:embed="rId7"/>
+          <a:stretch>
+            <a:fillRect/>
+          </a:stretch>
+        </p:blipFill>
+        <p:spPr>
+          <a:xfrm>
+            <a:off x="1458530" y="3602462"/>
+            <a:ext cx="6226937" cy="970354"/>
+          </a:xfrm>
+          <a:prstGeom prst="rect">
+            <a:avLst/>
+          </a:prstGeom>
+        </p:spPr>
+      </p:pic>
+      <p:pic>
+        <p:nvPicPr>
+          <p:cNvPr id="6" name="Picture 5">
+            <a:extLst>
+              <a:ext uri="{FF2B5EF4-FFF2-40B4-BE49-F238E27FC236}">
+                <a16:creationId xmlns:a16="http://schemas.microsoft.com/office/drawing/2014/main" id="{5709527C-21ED-499A-A8A2-F828B69848BD}"/>
+              </a:ext>
+            </a:extLst>
+          </p:cNvPr>
+          <p:cNvPicPr>
+            <a:picLocks noChangeAspect="1"/>
+          </p:cNvPicPr>
+          <p:nvPr/>
+        </p:nvPicPr>
+        <p:blipFill>
+          <a:blip r:embed="rId8"/>
+          <a:stretch>
+            <a:fillRect/>
+          </a:stretch>
+        </p:blipFill>
+        <p:spPr>
+          <a:xfrm>
+            <a:off x="887099" y="5818443"/>
+            <a:ext cx="7722227" cy="936525"/>
+          </a:xfrm>
+          <a:prstGeom prst="rect">
+            <a:avLst/>
+          </a:prstGeom>
+        </p:spPr>
+      </p:pic>
     </p:spTree>
     <p:extLst>
       <p:ext uri="{BB962C8B-B14F-4D97-AF65-F5344CB8AC3E}">
@@ -21676,13 +24943,7 @@
             </a:extLst>
           </p:cNvPr>
           <p:cNvGraphicFramePr/>
-          <p:nvPr>
-            <p:extLst>
-              <p:ext uri="{D42A27DB-BD31-4B8C-83A1-F6EECF244321}">
-                <p14:modId xmlns:p14="http://schemas.microsoft.com/office/powerpoint/2010/main" val="681127614"/>
-              </p:ext>
-            </p:extLst>
-          </p:nvPr>
+          <p:nvPr/>
         </p:nvGraphicFramePr>
         <p:xfrm>
           <a:off x="396484" y="1188492"/>
@@ -21883,60 +25144,58 @@
             <a:endParaRPr lang="en-US" dirty="0"/>
           </a:p>
           <a:p>
-            <a:pPr marL="342900" indent="-342900">
+            <a:pPr marL="342900" indent="-342900" algn="just">
               <a:buFont typeface="Arial" panose="020B0604020202020204" pitchFamily="34" charset="0"/>
               <a:buChar char="•"/>
             </a:pPr>
             <a:r>
               <a:rPr lang="en-US" dirty="0"/>
-              <a:t>System will be developed under ROS environment. </a:t>
+              <a:t>In this work, we will utilize the optimized keyframe generated by ORB-SLAM2 inside the RTAB-Map pipeline.</a:t>
             </a:r>
           </a:p>
           <a:p>
-            <a:pPr marL="342900" indent="-342900">
+            <a:pPr marL="342900" indent="-342900" algn="just">
               <a:buFont typeface="Arial" panose="020B0604020202020204" pitchFamily="34" charset="0"/>
               <a:buChar char="•"/>
             </a:pPr>
             <a:endParaRPr lang="en-US" dirty="0"/>
           </a:p>
           <a:p>
-            <a:pPr marL="342900" indent="-342900">
+            <a:pPr marL="342900" indent="-342900" algn="just">
               <a:buFont typeface="Arial" panose="020B0604020202020204" pitchFamily="34" charset="0"/>
               <a:buChar char="•"/>
             </a:pPr>
             <a:r>
               <a:rPr lang="en-US" dirty="0"/>
-              <a:t>Validation will be conducted using unified datasets exploiting different scenarios, and having a ground truth.</a:t>
+              <a:t>Objectives are to achieve: </a:t>
             </a:r>
           </a:p>
           <a:p>
-            <a:pPr marL="342900" indent="-342900">
-              <a:buFont typeface="Arial" panose="020B0604020202020204" pitchFamily="34" charset="0"/>
-              <a:buChar char="•"/>
-            </a:pPr>
-            <a:endParaRPr lang="en-US" dirty="0"/>
-          </a:p>
-          <a:p>
-            <a:pPr marL="342900" indent="-342900">
-              <a:buFont typeface="Arial" panose="020B0604020202020204" pitchFamily="34" charset="0"/>
-              <a:buChar char="•"/>
+            <a:pPr marL="682625" lvl="1" indent="-342900" algn="just">
+              <a:buFont typeface="+mj-lt"/>
+              <a:buAutoNum type="arabicPeriod"/>
             </a:pPr>
             <a:r>
-              <a:rPr lang="en-US" dirty="0"/>
-              <a:t>Datasets selected are KITTI and TUM RGB-D.</a:t>
+              <a:rPr lang="en-US" b="0" dirty="0">
+                <a:solidFill>
+                  <a:srgbClr val="00B050"/>
+                </a:solidFill>
+              </a:rPr>
+              <a:t>Better trajectory accuracy</a:t>
             </a:r>
           </a:p>
           <a:p>
-            <a:pPr marL="682625" indent="-342900">
-              <a:buFont typeface="Arial" panose="020B0604020202020204" pitchFamily="34" charset="0"/>
-              <a:buChar char="•"/>
-              <a:tabLst>
-                <a:tab pos="515938" algn="l"/>
-              </a:tabLst>
+            <a:pPr marL="682625" lvl="1" indent="-342900" algn="just">
+              <a:buFont typeface="+mj-lt"/>
+              <a:buAutoNum type="arabicPeriod"/>
             </a:pPr>
             <a:r>
-              <a:rPr lang="en-US" b="0" dirty="0"/>
-              <a:t>Covering indoor/outdoor static/dynamic conditions. </a:t>
+              <a:rPr lang="en-US" b="0" dirty="0">
+                <a:solidFill>
+                  <a:srgbClr val="00B050"/>
+                </a:solidFill>
+              </a:rPr>
+              <a:t>More reliable point cloud map</a:t>
             </a:r>
           </a:p>
         </p:txBody>
@@ -21944,7 +25203,7 @@
     </p:spTree>
     <p:extLst>
       <p:ext uri="{BB962C8B-B14F-4D97-AF65-F5344CB8AC3E}">
-        <p14:creationId xmlns:p14="http://schemas.microsoft.com/office/powerpoint/2010/main" val="2884775656"/>
+        <p14:creationId xmlns:p14="http://schemas.microsoft.com/office/powerpoint/2010/main" val="2520671360"/>
       </p:ext>
     </p:extLst>
   </p:cSld>

</xml_diff>

<commit_message>
finished all the ppt
</commit_message>
<xml_diff>
--- a/Presentation/CMPUT631-ProjectProposal-V0P1.pptx
+++ b/Presentation/CMPUT631-ProjectProposal-V0P1.pptx
@@ -5,26 +5,30 @@
     <p:sldMasterId id="2147483648" r:id="rId1"/>
   </p:sldMasterIdLst>
   <p:notesMasterIdLst>
-    <p:notesMasterId r:id="rId16"/>
+    <p:notesMasterId r:id="rId20"/>
   </p:notesMasterIdLst>
   <p:handoutMasterIdLst>
-    <p:handoutMasterId r:id="rId17"/>
+    <p:handoutMasterId r:id="rId21"/>
   </p:handoutMasterIdLst>
   <p:sldIdLst>
     <p:sldId id="256" r:id="rId2"/>
     <p:sldId id="257" r:id="rId3"/>
     <p:sldId id="259" r:id="rId4"/>
     <p:sldId id="260" r:id="rId5"/>
-    <p:sldId id="258" r:id="rId6"/>
-    <p:sldId id="266" r:id="rId7"/>
-    <p:sldId id="272" r:id="rId8"/>
-    <p:sldId id="270" r:id="rId9"/>
-    <p:sldId id="273" r:id="rId10"/>
-    <p:sldId id="271" r:id="rId11"/>
-    <p:sldId id="262" r:id="rId12"/>
-    <p:sldId id="263" r:id="rId13"/>
-    <p:sldId id="264" r:id="rId14"/>
-    <p:sldId id="265" r:id="rId15"/>
+    <p:sldId id="276" r:id="rId6"/>
+    <p:sldId id="274" r:id="rId7"/>
+    <p:sldId id="275" r:id="rId8"/>
+    <p:sldId id="258" r:id="rId9"/>
+    <p:sldId id="277" r:id="rId10"/>
+    <p:sldId id="266" r:id="rId11"/>
+    <p:sldId id="272" r:id="rId12"/>
+    <p:sldId id="270" r:id="rId13"/>
+    <p:sldId id="273" r:id="rId14"/>
+    <p:sldId id="271" r:id="rId15"/>
+    <p:sldId id="262" r:id="rId16"/>
+    <p:sldId id="263" r:id="rId17"/>
+    <p:sldId id="264" r:id="rId18"/>
+    <p:sldId id="265" r:id="rId19"/>
   </p:sldIdLst>
   <p:sldSz cx="9144000" cy="6858000" type="screen4x3"/>
   <p:notesSz cx="6858000" cy="9144000"/>
@@ -22713,1282 +22717,6 @@
           <p:nvPr>
             <p:extLst>
               <p:ext uri="{D42A27DB-BD31-4B8C-83A1-F6EECF244321}">
-                <p14:modId xmlns:p14="http://schemas.microsoft.com/office/powerpoint/2010/main" val="681127614"/>
-              </p:ext>
-            </p:extLst>
-          </p:nvPr>
-        </p:nvGraphicFramePr>
-        <p:xfrm>
-          <a:off x="396484" y="1188492"/>
-          <a:ext cx="8351031" cy="840346"/>
-        </p:xfrm>
-        <a:graphic>
-          <a:graphicData uri="http://schemas.openxmlformats.org/drawingml/2006/diagram">
-            <dgm:relIds xmlns:dgm="http://schemas.openxmlformats.org/drawingml/2006/diagram" xmlns:r="http://schemas.openxmlformats.org/officeDocument/2006/relationships" r:dm="rId2" r:lo="rId3" r:qs="rId4" r:cs="rId5"/>
-          </a:graphicData>
-        </a:graphic>
-      </p:graphicFrame>
-      <p:sp>
-        <p:nvSpPr>
-          <p:cNvPr id="8" name="Text Placeholder 12">
-            <a:extLst>
-              <a:ext uri="{FF2B5EF4-FFF2-40B4-BE49-F238E27FC236}">
-                <a16:creationId xmlns:a16="http://schemas.microsoft.com/office/drawing/2014/main" id="{9885164F-EB21-49BB-B210-AD5A1F91677F}"/>
-              </a:ext>
-            </a:extLst>
-          </p:cNvPr>
-          <p:cNvSpPr txBox="1">
-            <a:spLocks/>
-          </p:cNvSpPr>
-          <p:nvPr/>
-        </p:nvSpPr>
-        <p:spPr>
-          <a:xfrm>
-            <a:off x="966788" y="2253803"/>
-            <a:ext cx="7562850" cy="4171627"/>
-          </a:xfrm>
-          <a:prstGeom prst="rect">
-            <a:avLst/>
-          </a:prstGeom>
-        </p:spPr>
-        <p:txBody>
-          <a:bodyPr vert="horz"/>
-          <a:lstStyle>
-            <a:lvl1pPr marL="0" indent="0" algn="l" defTabSz="457200" rtl="0" eaLnBrk="1" fontAlgn="base" hangingPunct="1">
-              <a:spcBef>
-                <a:spcPts val="1200"/>
-              </a:spcBef>
-              <a:spcAft>
-                <a:spcPts val="600"/>
-              </a:spcAft>
-              <a:buFont typeface="Arial" panose="020B0604020202020204" pitchFamily="34" charset="0"/>
-              <a:buNone/>
-              <a:tabLst>
-                <a:tab pos="230188" algn="l"/>
-              </a:tabLst>
-              <a:defRPr sz="2000" b="1" kern="1200">
-                <a:solidFill>
-                  <a:schemeClr val="tx1"/>
-                </a:solidFill>
-                <a:latin typeface="+mn-lt"/>
-                <a:ea typeface="ＭＳ Ｐゴシック" charset="0"/>
-                <a:cs typeface="Geneva" charset="0"/>
-              </a:defRPr>
-            </a:lvl1pPr>
-            <a:lvl2pPr marL="3175" indent="0" algn="l" defTabSz="457200" rtl="0" eaLnBrk="1" fontAlgn="base" hangingPunct="1">
-              <a:spcBef>
-                <a:spcPts val="0"/>
-              </a:spcBef>
-              <a:spcAft>
-                <a:spcPts val="1200"/>
-              </a:spcAft>
-              <a:buFont typeface="Arial" panose="020B0604020202020204" pitchFamily="34" charset="0"/>
-              <a:buNone/>
-              <a:defRPr sz="1800" b="1" kern="1200">
-                <a:solidFill>
-                  <a:schemeClr val="tx1"/>
-                </a:solidFill>
-                <a:latin typeface="+mn-lt"/>
-                <a:ea typeface="Geneva" charset="0"/>
-                <a:cs typeface="Geneva" charset="0"/>
-              </a:defRPr>
-            </a:lvl2pPr>
-            <a:lvl3pPr marL="228600" indent="-228600" algn="l" defTabSz="457200" rtl="0" eaLnBrk="1" fontAlgn="base" hangingPunct="1">
-              <a:spcBef>
-                <a:spcPct val="20000"/>
-              </a:spcBef>
-              <a:spcAft>
-                <a:spcPct val="0"/>
-              </a:spcAft>
-              <a:buFont typeface="Arial" panose="020B0604020202020204" pitchFamily="34" charset="0"/>
-              <a:buChar char="•"/>
-              <a:defRPr sz="1800" kern="1200">
-                <a:solidFill>
-                  <a:schemeClr val="tx1"/>
-                </a:solidFill>
-                <a:latin typeface="+mn-lt"/>
-                <a:ea typeface="Geneva" charset="0"/>
-                <a:cs typeface="Geneva" charset="0"/>
-              </a:defRPr>
-            </a:lvl3pPr>
-            <a:lvl4pPr marL="514350" indent="-230188" algn="l" defTabSz="457200" rtl="0" eaLnBrk="1" fontAlgn="base" hangingPunct="1">
-              <a:spcBef>
-                <a:spcPct val="20000"/>
-              </a:spcBef>
-              <a:spcAft>
-                <a:spcPct val="0"/>
-              </a:spcAft>
-              <a:buFont typeface="Lucida Grande"/>
-              <a:buChar char="-"/>
-              <a:tabLst/>
-              <a:defRPr sz="1800" kern="1200">
-                <a:solidFill>
-                  <a:schemeClr val="tx1"/>
-                </a:solidFill>
-                <a:latin typeface="+mn-lt"/>
-                <a:ea typeface="Geneva" charset="0"/>
-                <a:cs typeface="Geneva" charset="0"/>
-              </a:defRPr>
-            </a:lvl4pPr>
-            <a:lvl5pPr marL="747713" indent="-228600" algn="l" defTabSz="457200" rtl="0" eaLnBrk="1" fontAlgn="base" hangingPunct="1">
-              <a:spcBef>
-                <a:spcPct val="20000"/>
-              </a:spcBef>
-              <a:spcAft>
-                <a:spcPct val="0"/>
-              </a:spcAft>
-              <a:buFont typeface="Lucida Grande"/>
-              <a:buChar char="·"/>
-              <a:defRPr sz="1800" kern="1200">
-                <a:solidFill>
-                  <a:schemeClr val="tx1"/>
-                </a:solidFill>
-                <a:latin typeface="+mn-lt"/>
-                <a:ea typeface="Geneva" charset="0"/>
-                <a:cs typeface="Geneva" charset="0"/>
-              </a:defRPr>
-            </a:lvl5pPr>
-            <a:lvl6pPr marL="2514600" indent="-228600" algn="l" defTabSz="457200" rtl="0" eaLnBrk="1" latinLnBrk="0" hangingPunct="1">
-              <a:spcBef>
-                <a:spcPct val="20000"/>
-              </a:spcBef>
-              <a:buFont typeface="Arial"/>
-              <a:buChar char="•"/>
-              <a:defRPr sz="2000" kern="1200">
-                <a:solidFill>
-                  <a:schemeClr val="tx1"/>
-                </a:solidFill>
-                <a:latin typeface="+mn-lt"/>
-                <a:ea typeface="+mn-ea"/>
-                <a:cs typeface="+mn-cs"/>
-              </a:defRPr>
-            </a:lvl6pPr>
-            <a:lvl7pPr marL="2971800" indent="-228600" algn="l" defTabSz="457200" rtl="0" eaLnBrk="1" latinLnBrk="0" hangingPunct="1">
-              <a:spcBef>
-                <a:spcPct val="20000"/>
-              </a:spcBef>
-              <a:buFont typeface="Arial"/>
-              <a:buChar char="•"/>
-              <a:defRPr sz="2000" kern="1200">
-                <a:solidFill>
-                  <a:schemeClr val="tx1"/>
-                </a:solidFill>
-                <a:latin typeface="+mn-lt"/>
-                <a:ea typeface="+mn-ea"/>
-                <a:cs typeface="+mn-cs"/>
-              </a:defRPr>
-            </a:lvl7pPr>
-            <a:lvl8pPr marL="3429000" indent="-228600" algn="l" defTabSz="457200" rtl="0" eaLnBrk="1" latinLnBrk="0" hangingPunct="1">
-              <a:spcBef>
-                <a:spcPct val="20000"/>
-              </a:spcBef>
-              <a:buFont typeface="Arial"/>
-              <a:buChar char="•"/>
-              <a:defRPr sz="2000" kern="1200">
-                <a:solidFill>
-                  <a:schemeClr val="tx1"/>
-                </a:solidFill>
-                <a:latin typeface="+mn-lt"/>
-                <a:ea typeface="+mn-ea"/>
-                <a:cs typeface="+mn-cs"/>
-              </a:defRPr>
-            </a:lvl8pPr>
-            <a:lvl9pPr marL="3886200" indent="-228600" algn="l" defTabSz="457200" rtl="0" eaLnBrk="1" latinLnBrk="0" hangingPunct="1">
-              <a:spcBef>
-                <a:spcPct val="20000"/>
-              </a:spcBef>
-              <a:buFont typeface="Arial"/>
-              <a:buChar char="•"/>
-              <a:defRPr sz="2000" kern="1200">
-                <a:solidFill>
-                  <a:schemeClr val="tx1"/>
-                </a:solidFill>
-                <a:latin typeface="+mn-lt"/>
-                <a:ea typeface="+mn-ea"/>
-                <a:cs typeface="+mn-cs"/>
-              </a:defRPr>
-            </a:lvl9pPr>
-          </a:lstStyle>
-          <a:p>
-            <a:pPr marL="342900" indent="-342900">
-              <a:buFont typeface="Arial" panose="020B0604020202020204" pitchFamily="34" charset="0"/>
-              <a:buChar char="•"/>
-            </a:pPr>
-            <a:endParaRPr lang="en-US" dirty="0"/>
-          </a:p>
-          <a:p>
-            <a:pPr marL="342900" indent="-342900">
-              <a:buFont typeface="Arial" panose="020B0604020202020204" pitchFamily="34" charset="0"/>
-              <a:buChar char="•"/>
-            </a:pPr>
-            <a:r>
-              <a:rPr lang="en-US" dirty="0"/>
-              <a:t>System will be developed under ROS environment. </a:t>
-            </a:r>
-          </a:p>
-          <a:p>
-            <a:pPr marL="342900" indent="-342900">
-              <a:buFont typeface="Arial" panose="020B0604020202020204" pitchFamily="34" charset="0"/>
-              <a:buChar char="•"/>
-            </a:pPr>
-            <a:endParaRPr lang="en-US" dirty="0"/>
-          </a:p>
-          <a:p>
-            <a:pPr marL="342900" indent="-342900">
-              <a:buFont typeface="Arial" panose="020B0604020202020204" pitchFamily="34" charset="0"/>
-              <a:buChar char="•"/>
-            </a:pPr>
-            <a:r>
-              <a:rPr lang="en-US" dirty="0"/>
-              <a:t>Validation will be conducted using unified datasets exploiting different scenarios, and having a ground truth.</a:t>
-            </a:r>
-          </a:p>
-          <a:p>
-            <a:pPr marL="342900" indent="-342900">
-              <a:buFont typeface="Arial" panose="020B0604020202020204" pitchFamily="34" charset="0"/>
-              <a:buChar char="•"/>
-            </a:pPr>
-            <a:endParaRPr lang="en-US" dirty="0"/>
-          </a:p>
-          <a:p>
-            <a:pPr marL="342900" indent="-342900">
-              <a:buFont typeface="Arial" panose="020B0604020202020204" pitchFamily="34" charset="0"/>
-              <a:buChar char="•"/>
-            </a:pPr>
-            <a:r>
-              <a:rPr lang="en-US" dirty="0"/>
-              <a:t>Datasets selected are KITTI and TUM RGB-D.</a:t>
-            </a:r>
-          </a:p>
-          <a:p>
-            <a:pPr marL="682625" indent="-342900">
-              <a:buFont typeface="Arial" panose="020B0604020202020204" pitchFamily="34" charset="0"/>
-              <a:buChar char="•"/>
-              <a:tabLst>
-                <a:tab pos="515938" algn="l"/>
-              </a:tabLst>
-            </a:pPr>
-            <a:r>
-              <a:rPr lang="en-US" b="0" dirty="0"/>
-              <a:t>Covering indoor/outdoor static/dynamic conditions. </a:t>
-            </a:r>
-          </a:p>
-        </p:txBody>
-      </p:sp>
-    </p:spTree>
-    <p:extLst>
-      <p:ext uri="{BB962C8B-B14F-4D97-AF65-F5344CB8AC3E}">
-        <p14:creationId xmlns:p14="http://schemas.microsoft.com/office/powerpoint/2010/main" val="2884775656"/>
-      </p:ext>
-    </p:extLst>
-  </p:cSld>
-  <p:clrMapOvr>
-    <a:masterClrMapping/>
-  </p:clrMapOvr>
-</p:sld>
-</file>
-
-<file path=ppt/slides/slide11.xml><?xml version="1.0" encoding="utf-8"?>
-<p:sld xmlns:a="http://schemas.openxmlformats.org/drawingml/2006/main" xmlns:r="http://schemas.openxmlformats.org/officeDocument/2006/relationships" xmlns:p="http://schemas.openxmlformats.org/presentationml/2006/main">
-  <p:cSld>
-    <p:spTree>
-      <p:nvGrpSpPr>
-        <p:cNvPr id="1" name=""/>
-        <p:cNvGrpSpPr/>
-        <p:nvPr/>
-      </p:nvGrpSpPr>
-      <p:grpSpPr>
-        <a:xfrm>
-          <a:off x="0" y="0"/>
-          <a:ext cx="0" cy="0"/>
-          <a:chOff x="0" y="0"/>
-          <a:chExt cx="0" cy="0"/>
-        </a:xfrm>
-      </p:grpSpPr>
-      <p:sp>
-        <p:nvSpPr>
-          <p:cNvPr id="13" name="Text Placeholder 12">
-            <a:extLst>
-              <a:ext uri="{FF2B5EF4-FFF2-40B4-BE49-F238E27FC236}">
-                <a16:creationId xmlns:a16="http://schemas.microsoft.com/office/drawing/2014/main" id="{03B27027-B59A-4E6B-B377-A7A8C7EF4555}"/>
-              </a:ext>
-            </a:extLst>
-          </p:cNvPr>
-          <p:cNvSpPr>
-            <a:spLocks noGrp="1"/>
-          </p:cNvSpPr>
-          <p:nvPr>
-            <p:ph type="body" sz="quarter" idx="16"/>
-          </p:nvPr>
-        </p:nvSpPr>
-        <p:spPr/>
-        <p:txBody>
-          <a:bodyPr/>
-          <a:lstStyle/>
-          <a:p>
-            <a:pPr marL="342900" indent="-342900">
-              <a:buFont typeface="Arial" panose="020B0604020202020204" pitchFamily="34" charset="0"/>
-              <a:buChar char="•"/>
-            </a:pPr>
-            <a:r>
-              <a:rPr lang="en-US" dirty="0"/>
-              <a:t>In this work, we focus on </a:t>
-            </a:r>
-            <a:r>
-              <a:rPr lang="en-US" dirty="0">
-                <a:solidFill>
-                  <a:srgbClr val="00B050"/>
-                </a:solidFill>
-              </a:rPr>
-              <a:t>Accuracy</a:t>
-            </a:r>
-            <a:r>
-              <a:rPr lang="en-US" dirty="0"/>
-              <a:t> enhancement.</a:t>
-            </a:r>
-          </a:p>
-          <a:p>
-            <a:pPr marL="342900" indent="-342900">
-              <a:buFont typeface="Arial" panose="020B0604020202020204" pitchFamily="34" charset="0"/>
-              <a:buChar char="•"/>
-            </a:pPr>
-            <a:r>
-              <a:rPr lang="en-US" dirty="0">
-                <a:solidFill>
-                  <a:srgbClr val="00B050"/>
-                </a:solidFill>
-              </a:rPr>
-              <a:t>Absolute Trajectory Error (ATE) </a:t>
-            </a:r>
-            <a:r>
-              <a:rPr lang="en-US" dirty="0"/>
-              <a:t>was adopted by many as a measure for accuracy, ATE is defined by:</a:t>
-            </a:r>
-          </a:p>
-          <a:p>
-            <a:endParaRPr lang="en-US" dirty="0"/>
-          </a:p>
-          <a:p>
-            <a:pPr marL="342900" indent="-342900">
-              <a:buFont typeface="Arial" panose="020B0604020202020204" pitchFamily="34" charset="0"/>
-              <a:buChar char="•"/>
-            </a:pPr>
-            <a:endParaRPr lang="en-US" dirty="0"/>
-          </a:p>
-          <a:p>
-            <a:pPr marL="342900" indent="-342900">
-              <a:buFont typeface="Arial" panose="020B0604020202020204" pitchFamily="34" charset="0"/>
-              <a:buChar char="•"/>
-            </a:pPr>
-            <a:r>
-              <a:rPr lang="en-US" dirty="0"/>
-              <a:t>To have a better representation of the error and its evolution, statistical measurements are applied to ATE.</a:t>
-            </a:r>
-          </a:p>
-          <a:p>
-            <a:pPr marL="682625" lvl="1" indent="-342900">
-              <a:buFont typeface="Arial" panose="020B0604020202020204" pitchFamily="34" charset="0"/>
-              <a:buChar char="•"/>
-            </a:pPr>
-            <a:r>
-              <a:rPr lang="en-US" b="0" dirty="0"/>
-              <a:t>Max / Min ATE Error</a:t>
-            </a:r>
-          </a:p>
-          <a:p>
-            <a:pPr marL="682625" lvl="1" indent="-342900">
-              <a:buFont typeface="Arial" panose="020B0604020202020204" pitchFamily="34" charset="0"/>
-              <a:buChar char="•"/>
-            </a:pPr>
-            <a:r>
-              <a:rPr lang="en-US" b="0" dirty="0"/>
-              <a:t>Root Mean Square Error (RMSE)</a:t>
-            </a:r>
-          </a:p>
-          <a:p>
-            <a:pPr marL="682625" lvl="1" indent="-342900">
-              <a:buFont typeface="Arial" panose="020B0604020202020204" pitchFamily="34" charset="0"/>
-              <a:buChar char="•"/>
-            </a:pPr>
-            <a:r>
-              <a:rPr lang="en-US" b="0" dirty="0"/>
-              <a:t>Mean, median, variance, and std. deviation.</a:t>
-            </a:r>
-          </a:p>
-        </p:txBody>
-      </p:sp>
-      <p:sp>
-        <p:nvSpPr>
-          <p:cNvPr id="12" name="Title 11">
-            <a:extLst>
-              <a:ext uri="{FF2B5EF4-FFF2-40B4-BE49-F238E27FC236}">
-                <a16:creationId xmlns:a16="http://schemas.microsoft.com/office/drawing/2014/main" id="{2DD2AFE4-63BE-45E4-B15C-024DB8D8D5D6}"/>
-              </a:ext>
-            </a:extLst>
-          </p:cNvPr>
-          <p:cNvSpPr>
-            <a:spLocks noGrp="1"/>
-          </p:cNvSpPr>
-          <p:nvPr>
-            <p:ph type="title"/>
-          </p:nvPr>
-        </p:nvSpPr>
-        <p:spPr/>
-        <p:txBody>
-          <a:bodyPr/>
-          <a:lstStyle/>
-          <a:p>
-            <a:r>
-              <a:rPr lang="en-US" dirty="0"/>
-              <a:t>Performance Evaluation</a:t>
-            </a:r>
-          </a:p>
-        </p:txBody>
-      </p:sp>
-      <p:pic>
-        <p:nvPicPr>
-          <p:cNvPr id="2" name="Picture 1">
-            <a:extLst>
-              <a:ext uri="{FF2B5EF4-FFF2-40B4-BE49-F238E27FC236}">
-                <a16:creationId xmlns:a16="http://schemas.microsoft.com/office/drawing/2014/main" id="{22FDD36D-E47C-47C4-A9B0-FB048698E3BB}"/>
-              </a:ext>
-            </a:extLst>
-          </p:cNvPr>
-          <p:cNvPicPr>
-            <a:picLocks noChangeAspect="1"/>
-          </p:cNvPicPr>
-          <p:nvPr/>
-        </p:nvPicPr>
-        <p:blipFill>
-          <a:blip r:embed="rId2"/>
-          <a:stretch>
-            <a:fillRect/>
-          </a:stretch>
-        </p:blipFill>
-        <p:spPr>
-          <a:xfrm>
-            <a:off x="2176093" y="3086294"/>
-            <a:ext cx="4791813" cy="685411"/>
-          </a:xfrm>
-          <a:prstGeom prst="rect">
-            <a:avLst/>
-          </a:prstGeom>
-        </p:spPr>
-      </p:pic>
-    </p:spTree>
-    <p:extLst>
-      <p:ext uri="{BB962C8B-B14F-4D97-AF65-F5344CB8AC3E}">
-        <p14:creationId xmlns:p14="http://schemas.microsoft.com/office/powerpoint/2010/main" val="3404325906"/>
-      </p:ext>
-    </p:extLst>
-  </p:cSld>
-  <p:clrMapOvr>
-    <a:masterClrMapping/>
-  </p:clrMapOvr>
-</p:sld>
-</file>
-
-<file path=ppt/slides/slide12.xml><?xml version="1.0" encoding="utf-8"?>
-<p:sld xmlns:a="http://schemas.openxmlformats.org/drawingml/2006/main" xmlns:r="http://schemas.openxmlformats.org/officeDocument/2006/relationships" xmlns:p="http://schemas.openxmlformats.org/presentationml/2006/main">
-  <p:cSld>
-    <p:spTree>
-      <p:nvGrpSpPr>
-        <p:cNvPr id="1" name=""/>
-        <p:cNvGrpSpPr/>
-        <p:nvPr/>
-      </p:nvGrpSpPr>
-      <p:grpSpPr>
-        <a:xfrm>
-          <a:off x="0" y="0"/>
-          <a:ext cx="0" cy="0"/>
-          <a:chOff x="0" y="0"/>
-          <a:chExt cx="0" cy="0"/>
-        </a:xfrm>
-      </p:grpSpPr>
-      <p:sp>
-        <p:nvSpPr>
-          <p:cNvPr id="13" name="Text Placeholder 12">
-            <a:extLst>
-              <a:ext uri="{FF2B5EF4-FFF2-40B4-BE49-F238E27FC236}">
-                <a16:creationId xmlns:a16="http://schemas.microsoft.com/office/drawing/2014/main" id="{03B27027-B59A-4E6B-B377-A7A8C7EF4555}"/>
-              </a:ext>
-            </a:extLst>
-          </p:cNvPr>
-          <p:cNvSpPr>
-            <a:spLocks noGrp="1"/>
-          </p:cNvSpPr>
-          <p:nvPr>
-            <p:ph type="body" sz="quarter" idx="16"/>
-          </p:nvPr>
-        </p:nvSpPr>
-        <p:spPr/>
-        <p:txBody>
-          <a:bodyPr/>
-          <a:lstStyle/>
-          <a:p>
-            <a:pPr marL="342900" indent="-342900">
-              <a:buFont typeface="Arial" panose="020B0604020202020204" pitchFamily="34" charset="0"/>
-              <a:buChar char="•"/>
-            </a:pPr>
-            <a:r>
-              <a:rPr lang="en-US" dirty="0"/>
-              <a:t>Extension of the boundaries of both Algorithms.</a:t>
-            </a:r>
-          </a:p>
-          <a:p>
-            <a:pPr marL="342900" indent="-342900">
-              <a:buFont typeface="Arial" panose="020B0604020202020204" pitchFamily="34" charset="0"/>
-              <a:buChar char="•"/>
-            </a:pPr>
-            <a:endParaRPr lang="en-US" dirty="0"/>
-          </a:p>
-          <a:p>
-            <a:pPr marL="342900" indent="-342900">
-              <a:buFont typeface="Arial" panose="020B0604020202020204" pitchFamily="34" charset="0"/>
-              <a:buChar char="•"/>
-            </a:pPr>
-            <a:r>
-              <a:rPr lang="en-US" dirty="0"/>
-              <a:t>More robust and reliable SLAM solution.</a:t>
-            </a:r>
-          </a:p>
-          <a:p>
-            <a:pPr marL="342900" indent="-342900">
-              <a:buFont typeface="Arial" panose="020B0604020202020204" pitchFamily="34" charset="0"/>
-              <a:buChar char="•"/>
-            </a:pPr>
-            <a:endParaRPr lang="en-US" dirty="0"/>
-          </a:p>
-          <a:p>
-            <a:pPr marL="342900" indent="-342900">
-              <a:buFont typeface="Arial" panose="020B0604020202020204" pitchFamily="34" charset="0"/>
-              <a:buChar char="•"/>
-            </a:pPr>
-            <a:r>
-              <a:rPr lang="en-US" dirty="0"/>
-              <a:t>Serve the ultimate objective of having an out-of-box SLAM system able to work under challenging conditions.</a:t>
-            </a:r>
-          </a:p>
-        </p:txBody>
-      </p:sp>
-      <p:sp>
-        <p:nvSpPr>
-          <p:cNvPr id="12" name="Title 11">
-            <a:extLst>
-              <a:ext uri="{FF2B5EF4-FFF2-40B4-BE49-F238E27FC236}">
-                <a16:creationId xmlns:a16="http://schemas.microsoft.com/office/drawing/2014/main" id="{2DD2AFE4-63BE-45E4-B15C-024DB8D8D5D6}"/>
-              </a:ext>
-            </a:extLst>
-          </p:cNvPr>
-          <p:cNvSpPr>
-            <a:spLocks noGrp="1"/>
-          </p:cNvSpPr>
-          <p:nvPr>
-            <p:ph type="title"/>
-          </p:nvPr>
-        </p:nvSpPr>
-        <p:spPr/>
-        <p:txBody>
-          <a:bodyPr/>
-          <a:lstStyle/>
-          <a:p>
-            <a:r>
-              <a:rPr lang="en-US" dirty="0"/>
-              <a:t>Significance of Proposed Research</a:t>
-            </a:r>
-          </a:p>
-        </p:txBody>
-      </p:sp>
-    </p:spTree>
-    <p:extLst>
-      <p:ext uri="{BB962C8B-B14F-4D97-AF65-F5344CB8AC3E}">
-        <p14:creationId xmlns:p14="http://schemas.microsoft.com/office/powerpoint/2010/main" val="244355130"/>
-      </p:ext>
-    </p:extLst>
-  </p:cSld>
-  <p:clrMapOvr>
-    <a:masterClrMapping/>
-  </p:clrMapOvr>
-</p:sld>
-</file>
-
-<file path=ppt/slides/slide13.xml><?xml version="1.0" encoding="utf-8"?>
-<p:sld xmlns:a="http://schemas.openxmlformats.org/drawingml/2006/main" xmlns:r="http://schemas.openxmlformats.org/officeDocument/2006/relationships" xmlns:p="http://schemas.openxmlformats.org/presentationml/2006/main">
-  <p:cSld>
-    <p:spTree>
-      <p:nvGrpSpPr>
-        <p:cNvPr id="1" name=""/>
-        <p:cNvGrpSpPr/>
-        <p:nvPr/>
-      </p:nvGrpSpPr>
-      <p:grpSpPr>
-        <a:xfrm>
-          <a:off x="0" y="0"/>
-          <a:ext cx="0" cy="0"/>
-          <a:chOff x="0" y="0"/>
-          <a:chExt cx="0" cy="0"/>
-        </a:xfrm>
-      </p:grpSpPr>
-      <p:sp>
-        <p:nvSpPr>
-          <p:cNvPr id="7" name="Text Placeholder 6">
-            <a:extLst>
-              <a:ext uri="{FF2B5EF4-FFF2-40B4-BE49-F238E27FC236}">
-                <a16:creationId xmlns:a16="http://schemas.microsoft.com/office/drawing/2014/main" id="{BE99C30C-BE44-4C45-887C-EA882D81BA24}"/>
-              </a:ext>
-            </a:extLst>
-          </p:cNvPr>
-          <p:cNvSpPr>
-            <a:spLocks noGrp="1"/>
-          </p:cNvSpPr>
-          <p:nvPr>
-            <p:ph type="body" sz="quarter" idx="16"/>
-          </p:nvPr>
-        </p:nvSpPr>
-        <p:spPr/>
-        <p:txBody>
-          <a:bodyPr/>
-          <a:lstStyle/>
-          <a:p>
-            <a:pPr algn="ctr"/>
-            <a:endParaRPr lang="en-US" dirty="0"/>
-          </a:p>
-          <a:p>
-            <a:pPr algn="ctr"/>
-            <a:endParaRPr lang="en-US" sz="3600" dirty="0"/>
-          </a:p>
-          <a:p>
-            <a:pPr algn="ctr"/>
-            <a:endParaRPr lang="en-US" sz="3600" dirty="0"/>
-          </a:p>
-          <a:p>
-            <a:pPr algn="ctr"/>
-            <a:r>
-              <a:rPr lang="en-US" sz="3600" dirty="0"/>
-              <a:t>Questions</a:t>
-            </a:r>
-          </a:p>
-        </p:txBody>
-      </p:sp>
-      <p:sp>
-        <p:nvSpPr>
-          <p:cNvPr id="6" name="Title 5">
-            <a:extLst>
-              <a:ext uri="{FF2B5EF4-FFF2-40B4-BE49-F238E27FC236}">
-                <a16:creationId xmlns:a16="http://schemas.microsoft.com/office/drawing/2014/main" id="{2AE42E0C-A286-4DF9-9AD3-8A488542E5FB}"/>
-              </a:ext>
-            </a:extLst>
-          </p:cNvPr>
-          <p:cNvSpPr>
-            <a:spLocks noGrp="1"/>
-          </p:cNvSpPr>
-          <p:nvPr>
-            <p:ph type="title"/>
-          </p:nvPr>
-        </p:nvSpPr>
-        <p:spPr/>
-        <p:txBody>
-          <a:bodyPr/>
-          <a:lstStyle/>
-          <a:p>
-            <a:endParaRPr lang="en-US"/>
-          </a:p>
-        </p:txBody>
-      </p:sp>
-      <p:pic>
-        <p:nvPicPr>
-          <p:cNvPr id="9" name="Picture 8">
-            <a:extLst>
-              <a:ext uri="{FF2B5EF4-FFF2-40B4-BE49-F238E27FC236}">
-                <a16:creationId xmlns:a16="http://schemas.microsoft.com/office/drawing/2014/main" id="{94E071B9-C40E-4EEE-B916-BC333C5150A5}"/>
-              </a:ext>
-            </a:extLst>
-          </p:cNvPr>
-          <p:cNvPicPr>
-            <a:picLocks noChangeAspect="1"/>
-          </p:cNvPicPr>
-          <p:nvPr/>
-        </p:nvPicPr>
-        <p:blipFill>
-          <a:blip r:embed="rId2"/>
-          <a:stretch>
-            <a:fillRect/>
-          </a:stretch>
-        </p:blipFill>
-        <p:spPr>
-          <a:xfrm>
-            <a:off x="3518280" y="1608668"/>
-            <a:ext cx="2155065" cy="2155065"/>
-          </a:xfrm>
-          <a:prstGeom prst="rect">
-            <a:avLst/>
-          </a:prstGeom>
-        </p:spPr>
-      </p:pic>
-    </p:spTree>
-    <p:extLst>
-      <p:ext uri="{BB962C8B-B14F-4D97-AF65-F5344CB8AC3E}">
-        <p14:creationId xmlns:p14="http://schemas.microsoft.com/office/powerpoint/2010/main" val="2003370727"/>
-      </p:ext>
-    </p:extLst>
-  </p:cSld>
-  <p:clrMapOvr>
-    <a:masterClrMapping/>
-  </p:clrMapOvr>
-</p:sld>
-</file>
-
-<file path=ppt/slides/slide14.xml><?xml version="1.0" encoding="utf-8"?>
-<p:sld xmlns:a="http://schemas.openxmlformats.org/drawingml/2006/main" xmlns:r="http://schemas.openxmlformats.org/officeDocument/2006/relationships" xmlns:p="http://schemas.openxmlformats.org/presentationml/2006/main">
-  <p:cSld>
-    <p:spTree>
-      <p:nvGrpSpPr>
-        <p:cNvPr id="1" name=""/>
-        <p:cNvGrpSpPr/>
-        <p:nvPr/>
-      </p:nvGrpSpPr>
-      <p:grpSpPr>
-        <a:xfrm>
-          <a:off x="0" y="0"/>
-          <a:ext cx="0" cy="0"/>
-          <a:chOff x="0" y="0"/>
-          <a:chExt cx="0" cy="0"/>
-        </a:xfrm>
-      </p:grpSpPr>
-      <p:sp>
-        <p:nvSpPr>
-          <p:cNvPr id="7" name="Text Placeholder 6">
-            <a:extLst>
-              <a:ext uri="{FF2B5EF4-FFF2-40B4-BE49-F238E27FC236}">
-                <a16:creationId xmlns:a16="http://schemas.microsoft.com/office/drawing/2014/main" id="{BE99C30C-BE44-4C45-887C-EA882D81BA24}"/>
-              </a:ext>
-            </a:extLst>
-          </p:cNvPr>
-          <p:cNvSpPr>
-            <a:spLocks noGrp="1"/>
-          </p:cNvSpPr>
-          <p:nvPr>
-            <p:ph type="body" sz="quarter" idx="16"/>
-          </p:nvPr>
-        </p:nvSpPr>
-        <p:spPr/>
-        <p:txBody>
-          <a:bodyPr/>
-          <a:lstStyle/>
-          <a:p>
-            <a:pPr algn="ctr"/>
-            <a:endParaRPr lang="en-US" dirty="0"/>
-          </a:p>
-          <a:p>
-            <a:pPr algn="ctr"/>
-            <a:endParaRPr lang="en-US" sz="3600" dirty="0"/>
-          </a:p>
-          <a:p>
-            <a:pPr algn="ctr"/>
-            <a:r>
-              <a:rPr lang="en-US" sz="3600" dirty="0"/>
-              <a:t>Thank You !</a:t>
-            </a:r>
-          </a:p>
-        </p:txBody>
-      </p:sp>
-      <p:sp>
-        <p:nvSpPr>
-          <p:cNvPr id="6" name="Title 5">
-            <a:extLst>
-              <a:ext uri="{FF2B5EF4-FFF2-40B4-BE49-F238E27FC236}">
-                <a16:creationId xmlns:a16="http://schemas.microsoft.com/office/drawing/2014/main" id="{2AE42E0C-A286-4DF9-9AD3-8A488542E5FB}"/>
-              </a:ext>
-            </a:extLst>
-          </p:cNvPr>
-          <p:cNvSpPr>
-            <a:spLocks noGrp="1"/>
-          </p:cNvSpPr>
-          <p:nvPr>
-            <p:ph type="title"/>
-          </p:nvPr>
-        </p:nvSpPr>
-        <p:spPr/>
-        <p:txBody>
-          <a:bodyPr/>
-          <a:lstStyle/>
-          <a:p>
-            <a:endParaRPr lang="en-US"/>
-          </a:p>
-        </p:txBody>
-      </p:sp>
-    </p:spTree>
-    <p:extLst>
-      <p:ext uri="{BB962C8B-B14F-4D97-AF65-F5344CB8AC3E}">
-        <p14:creationId xmlns:p14="http://schemas.microsoft.com/office/powerpoint/2010/main" val="1554159479"/>
-      </p:ext>
-    </p:extLst>
-  </p:cSld>
-  <p:clrMapOvr>
-    <a:masterClrMapping/>
-  </p:clrMapOvr>
-</p:sld>
-</file>
-
-<file path=ppt/slides/slide2.xml><?xml version="1.0" encoding="utf-8"?>
-<p:sld xmlns:a="http://schemas.openxmlformats.org/drawingml/2006/main" xmlns:r="http://schemas.openxmlformats.org/officeDocument/2006/relationships" xmlns:p="http://schemas.openxmlformats.org/presentationml/2006/main">
-  <p:cSld>
-    <p:spTree>
-      <p:nvGrpSpPr>
-        <p:cNvPr id="1" name=""/>
-        <p:cNvGrpSpPr/>
-        <p:nvPr/>
-      </p:nvGrpSpPr>
-      <p:grpSpPr>
-        <a:xfrm>
-          <a:off x="0" y="0"/>
-          <a:ext cx="0" cy="0"/>
-          <a:chOff x="0" y="0"/>
-          <a:chExt cx="0" cy="0"/>
-        </a:xfrm>
-      </p:grpSpPr>
-      <p:sp>
-        <p:nvSpPr>
-          <p:cNvPr id="13" name="Text Placeholder 12">
-            <a:extLst>
-              <a:ext uri="{FF2B5EF4-FFF2-40B4-BE49-F238E27FC236}">
-                <a16:creationId xmlns:a16="http://schemas.microsoft.com/office/drawing/2014/main" id="{03B27027-B59A-4E6B-B377-A7A8C7EF4555}"/>
-              </a:ext>
-            </a:extLst>
-          </p:cNvPr>
-          <p:cNvSpPr>
-            <a:spLocks noGrp="1"/>
-          </p:cNvSpPr>
-          <p:nvPr>
-            <p:ph type="body" sz="quarter" idx="16"/>
-          </p:nvPr>
-        </p:nvSpPr>
-        <p:spPr/>
-        <p:txBody>
-          <a:bodyPr/>
-          <a:lstStyle/>
-          <a:p>
-            <a:pPr marL="342900" indent="-342900">
-              <a:buFont typeface="Arial" panose="020B0604020202020204" pitchFamily="34" charset="0"/>
-              <a:buChar char="•"/>
-            </a:pPr>
-            <a:r>
-              <a:rPr lang="en-US" dirty="0"/>
-              <a:t>Introduction</a:t>
-            </a:r>
-          </a:p>
-          <a:p>
-            <a:pPr marL="342900" indent="-342900">
-              <a:buFont typeface="Arial" panose="020B0604020202020204" pitchFamily="34" charset="0"/>
-              <a:buChar char="•"/>
-            </a:pPr>
-            <a:r>
-              <a:rPr lang="en-US" dirty="0"/>
-              <a:t>Problem Definition</a:t>
-            </a:r>
-          </a:p>
-          <a:p>
-            <a:pPr marL="342900" indent="-342900">
-              <a:buFont typeface="Arial" panose="020B0604020202020204" pitchFamily="34" charset="0"/>
-              <a:buChar char="•"/>
-            </a:pPr>
-            <a:r>
-              <a:rPr lang="en-US" dirty="0"/>
-              <a:t>Literature Review</a:t>
-            </a:r>
-          </a:p>
-          <a:p>
-            <a:pPr marL="342900" indent="-342900">
-              <a:buFont typeface="Arial" panose="020B0604020202020204" pitchFamily="34" charset="0"/>
-              <a:buChar char="•"/>
-            </a:pPr>
-            <a:r>
-              <a:rPr lang="en-US" dirty="0"/>
-              <a:t>Methodology and Procedure</a:t>
-            </a:r>
-          </a:p>
-          <a:p>
-            <a:pPr marL="342900" indent="-342900">
-              <a:buFont typeface="Arial" panose="020B0604020202020204" pitchFamily="34" charset="0"/>
-              <a:buChar char="•"/>
-            </a:pPr>
-            <a:r>
-              <a:rPr lang="en-US" dirty="0"/>
-              <a:t>Performance Evaluation</a:t>
-            </a:r>
-          </a:p>
-          <a:p>
-            <a:pPr marL="342900" indent="-342900">
-              <a:buFont typeface="Arial" panose="020B0604020202020204" pitchFamily="34" charset="0"/>
-              <a:buChar char="•"/>
-            </a:pPr>
-            <a:r>
-              <a:rPr lang="en-US" dirty="0"/>
-              <a:t>Significance of Proposed Research</a:t>
-            </a:r>
-          </a:p>
-        </p:txBody>
-      </p:sp>
-      <p:sp>
-        <p:nvSpPr>
-          <p:cNvPr id="12" name="Title 11">
-            <a:extLst>
-              <a:ext uri="{FF2B5EF4-FFF2-40B4-BE49-F238E27FC236}">
-                <a16:creationId xmlns:a16="http://schemas.microsoft.com/office/drawing/2014/main" id="{2DD2AFE4-63BE-45E4-B15C-024DB8D8D5D6}"/>
-              </a:ext>
-            </a:extLst>
-          </p:cNvPr>
-          <p:cNvSpPr>
-            <a:spLocks noGrp="1"/>
-          </p:cNvSpPr>
-          <p:nvPr>
-            <p:ph type="title"/>
-          </p:nvPr>
-        </p:nvSpPr>
-        <p:spPr/>
-        <p:txBody>
-          <a:bodyPr/>
-          <a:lstStyle/>
-          <a:p>
-            <a:r>
-              <a:rPr lang="en-US" dirty="0"/>
-              <a:t>Agenda</a:t>
-            </a:r>
-          </a:p>
-        </p:txBody>
-      </p:sp>
-    </p:spTree>
-    <p:extLst>
-      <p:ext uri="{BB962C8B-B14F-4D97-AF65-F5344CB8AC3E}">
-        <p14:creationId xmlns:p14="http://schemas.microsoft.com/office/powerpoint/2010/main" val="2822485740"/>
-      </p:ext>
-    </p:extLst>
-  </p:cSld>
-  <p:clrMapOvr>
-    <a:masterClrMapping/>
-  </p:clrMapOvr>
-</p:sld>
-</file>
-
-<file path=ppt/slides/slide3.xml><?xml version="1.0" encoding="utf-8"?>
-<p:sld xmlns:a="http://schemas.openxmlformats.org/drawingml/2006/main" xmlns:r="http://schemas.openxmlformats.org/officeDocument/2006/relationships" xmlns:p="http://schemas.openxmlformats.org/presentationml/2006/main">
-  <p:cSld>
-    <p:spTree>
-      <p:nvGrpSpPr>
-        <p:cNvPr id="1" name=""/>
-        <p:cNvGrpSpPr/>
-        <p:nvPr/>
-      </p:nvGrpSpPr>
-      <p:grpSpPr>
-        <a:xfrm>
-          <a:off x="0" y="0"/>
-          <a:ext cx="0" cy="0"/>
-          <a:chOff x="0" y="0"/>
-          <a:chExt cx="0" cy="0"/>
-        </a:xfrm>
-      </p:grpSpPr>
-      <p:sp>
-        <p:nvSpPr>
-          <p:cNvPr id="13" name="Text Placeholder 12">
-            <a:extLst>
-              <a:ext uri="{FF2B5EF4-FFF2-40B4-BE49-F238E27FC236}">
-                <a16:creationId xmlns:a16="http://schemas.microsoft.com/office/drawing/2014/main" id="{03B27027-B59A-4E6B-B377-A7A8C7EF4555}"/>
-              </a:ext>
-            </a:extLst>
-          </p:cNvPr>
-          <p:cNvSpPr>
-            <a:spLocks noGrp="1"/>
-          </p:cNvSpPr>
-          <p:nvPr>
-            <p:ph type="body" sz="quarter" idx="16"/>
-          </p:nvPr>
-        </p:nvSpPr>
-        <p:spPr/>
-        <p:txBody>
-          <a:bodyPr/>
-          <a:lstStyle/>
-          <a:p>
-            <a:pPr marL="342900" indent="-342900">
-              <a:buFont typeface="Arial" panose="020B0604020202020204" pitchFamily="34" charset="0"/>
-              <a:buChar char="•"/>
-            </a:pPr>
-            <a:endParaRPr lang="en-US" dirty="0"/>
-          </a:p>
-        </p:txBody>
-      </p:sp>
-      <p:sp>
-        <p:nvSpPr>
-          <p:cNvPr id="12" name="Title 11">
-            <a:extLst>
-              <a:ext uri="{FF2B5EF4-FFF2-40B4-BE49-F238E27FC236}">
-                <a16:creationId xmlns:a16="http://schemas.microsoft.com/office/drawing/2014/main" id="{2DD2AFE4-63BE-45E4-B15C-024DB8D8D5D6}"/>
-              </a:ext>
-            </a:extLst>
-          </p:cNvPr>
-          <p:cNvSpPr>
-            <a:spLocks noGrp="1"/>
-          </p:cNvSpPr>
-          <p:nvPr>
-            <p:ph type="title"/>
-          </p:nvPr>
-        </p:nvSpPr>
-        <p:spPr/>
-        <p:txBody>
-          <a:bodyPr/>
-          <a:lstStyle/>
-          <a:p>
-            <a:r>
-              <a:rPr lang="en-US" dirty="0"/>
-              <a:t>Introduction</a:t>
-            </a:r>
-          </a:p>
-        </p:txBody>
-      </p:sp>
-    </p:spTree>
-    <p:extLst>
-      <p:ext uri="{BB962C8B-B14F-4D97-AF65-F5344CB8AC3E}">
-        <p14:creationId xmlns:p14="http://schemas.microsoft.com/office/powerpoint/2010/main" val="2538341258"/>
-      </p:ext>
-    </p:extLst>
-  </p:cSld>
-  <p:clrMapOvr>
-    <a:masterClrMapping/>
-  </p:clrMapOvr>
-</p:sld>
-</file>
-
-<file path=ppt/slides/slide4.xml><?xml version="1.0" encoding="utf-8"?>
-<p:sld xmlns:a="http://schemas.openxmlformats.org/drawingml/2006/main" xmlns:r="http://schemas.openxmlformats.org/officeDocument/2006/relationships" xmlns:p="http://schemas.openxmlformats.org/presentationml/2006/main">
-  <p:cSld>
-    <p:spTree>
-      <p:nvGrpSpPr>
-        <p:cNvPr id="1" name=""/>
-        <p:cNvGrpSpPr/>
-        <p:nvPr/>
-      </p:nvGrpSpPr>
-      <p:grpSpPr>
-        <a:xfrm>
-          <a:off x="0" y="0"/>
-          <a:ext cx="0" cy="0"/>
-          <a:chOff x="0" y="0"/>
-          <a:chExt cx="0" cy="0"/>
-        </a:xfrm>
-      </p:grpSpPr>
-      <p:sp>
-        <p:nvSpPr>
-          <p:cNvPr id="13" name="Text Placeholder 12">
-            <a:extLst>
-              <a:ext uri="{FF2B5EF4-FFF2-40B4-BE49-F238E27FC236}">
-                <a16:creationId xmlns:a16="http://schemas.microsoft.com/office/drawing/2014/main" id="{03B27027-B59A-4E6B-B377-A7A8C7EF4555}"/>
-              </a:ext>
-            </a:extLst>
-          </p:cNvPr>
-          <p:cNvSpPr>
-            <a:spLocks noGrp="1"/>
-          </p:cNvSpPr>
-          <p:nvPr>
-            <p:ph type="body" sz="quarter" idx="16"/>
-          </p:nvPr>
-        </p:nvSpPr>
-        <p:spPr/>
-        <p:txBody>
-          <a:bodyPr/>
-          <a:lstStyle/>
-          <a:p>
-            <a:pPr marL="342900" indent="-342900">
-              <a:buFont typeface="Arial" panose="020B0604020202020204" pitchFamily="34" charset="0"/>
-              <a:buChar char="•"/>
-            </a:pPr>
-            <a:endParaRPr lang="en-US" dirty="0"/>
-          </a:p>
-        </p:txBody>
-      </p:sp>
-      <p:sp>
-        <p:nvSpPr>
-          <p:cNvPr id="12" name="Title 11">
-            <a:extLst>
-              <a:ext uri="{FF2B5EF4-FFF2-40B4-BE49-F238E27FC236}">
-                <a16:creationId xmlns:a16="http://schemas.microsoft.com/office/drawing/2014/main" id="{2DD2AFE4-63BE-45E4-B15C-024DB8D8D5D6}"/>
-              </a:ext>
-            </a:extLst>
-          </p:cNvPr>
-          <p:cNvSpPr>
-            <a:spLocks noGrp="1"/>
-          </p:cNvSpPr>
-          <p:nvPr>
-            <p:ph type="title"/>
-          </p:nvPr>
-        </p:nvSpPr>
-        <p:spPr/>
-        <p:txBody>
-          <a:bodyPr/>
-          <a:lstStyle/>
-          <a:p>
-            <a:r>
-              <a:rPr lang="en-US" dirty="0"/>
-              <a:t>Problem Definition</a:t>
-            </a:r>
-          </a:p>
-        </p:txBody>
-      </p:sp>
-    </p:spTree>
-    <p:extLst>
-      <p:ext uri="{BB962C8B-B14F-4D97-AF65-F5344CB8AC3E}">
-        <p14:creationId xmlns:p14="http://schemas.microsoft.com/office/powerpoint/2010/main" val="3490201183"/>
-      </p:ext>
-    </p:extLst>
-  </p:cSld>
-  <p:clrMapOvr>
-    <a:masterClrMapping/>
-  </p:clrMapOvr>
-</p:sld>
-</file>
-
-<file path=ppt/slides/slide5.xml><?xml version="1.0" encoding="utf-8"?>
-<p:sld xmlns:a="http://schemas.openxmlformats.org/drawingml/2006/main" xmlns:r="http://schemas.openxmlformats.org/officeDocument/2006/relationships" xmlns:p="http://schemas.openxmlformats.org/presentationml/2006/main">
-  <p:cSld>
-    <p:spTree>
-      <p:nvGrpSpPr>
-        <p:cNvPr id="1" name=""/>
-        <p:cNvGrpSpPr/>
-        <p:nvPr/>
-      </p:nvGrpSpPr>
-      <p:grpSpPr>
-        <a:xfrm>
-          <a:off x="0" y="0"/>
-          <a:ext cx="0" cy="0"/>
-          <a:chOff x="0" y="0"/>
-          <a:chExt cx="0" cy="0"/>
-        </a:xfrm>
-      </p:grpSpPr>
-      <p:sp>
-        <p:nvSpPr>
-          <p:cNvPr id="13" name="Text Placeholder 12">
-            <a:extLst>
-              <a:ext uri="{FF2B5EF4-FFF2-40B4-BE49-F238E27FC236}">
-                <a16:creationId xmlns:a16="http://schemas.microsoft.com/office/drawing/2014/main" id="{03B27027-B59A-4E6B-B377-A7A8C7EF4555}"/>
-              </a:ext>
-            </a:extLst>
-          </p:cNvPr>
-          <p:cNvSpPr>
-            <a:spLocks noGrp="1"/>
-          </p:cNvSpPr>
-          <p:nvPr>
-            <p:ph type="body" sz="quarter" idx="16"/>
-          </p:nvPr>
-        </p:nvSpPr>
-        <p:spPr/>
-        <p:txBody>
-          <a:bodyPr/>
-          <a:lstStyle/>
-          <a:p>
-            <a:pPr marL="342900" indent="-342900">
-              <a:buFont typeface="Arial" panose="020B0604020202020204" pitchFamily="34" charset="0"/>
-              <a:buChar char="•"/>
-            </a:pPr>
-            <a:endParaRPr lang="en-US" dirty="0"/>
-          </a:p>
-        </p:txBody>
-      </p:sp>
-      <p:sp>
-        <p:nvSpPr>
-          <p:cNvPr id="12" name="Title 11">
-            <a:extLst>
-              <a:ext uri="{FF2B5EF4-FFF2-40B4-BE49-F238E27FC236}">
-                <a16:creationId xmlns:a16="http://schemas.microsoft.com/office/drawing/2014/main" id="{2DD2AFE4-63BE-45E4-B15C-024DB8D8D5D6}"/>
-              </a:ext>
-            </a:extLst>
-          </p:cNvPr>
-          <p:cNvSpPr>
-            <a:spLocks noGrp="1"/>
-          </p:cNvSpPr>
-          <p:nvPr>
-            <p:ph type="title"/>
-          </p:nvPr>
-        </p:nvSpPr>
-        <p:spPr/>
-        <p:txBody>
-          <a:bodyPr/>
-          <a:lstStyle/>
-          <a:p>
-            <a:r>
-              <a:rPr lang="en-US" dirty="0"/>
-              <a:t>Literature Review</a:t>
-            </a:r>
-          </a:p>
-        </p:txBody>
-      </p:sp>
-    </p:spTree>
-    <p:extLst>
-      <p:ext uri="{BB962C8B-B14F-4D97-AF65-F5344CB8AC3E}">
-        <p14:creationId xmlns:p14="http://schemas.microsoft.com/office/powerpoint/2010/main" val="2932802091"/>
-      </p:ext>
-    </p:extLst>
-  </p:cSld>
-  <p:clrMapOvr>
-    <a:masterClrMapping/>
-  </p:clrMapOvr>
-</p:sld>
-</file>
-
-<file path=ppt/slides/slide6.xml><?xml version="1.0" encoding="utf-8"?>
-<p:sld xmlns:a="http://schemas.openxmlformats.org/drawingml/2006/main" xmlns:r="http://schemas.openxmlformats.org/officeDocument/2006/relationships" xmlns:p="http://schemas.openxmlformats.org/presentationml/2006/main">
-  <p:cSld>
-    <p:spTree>
-      <p:nvGrpSpPr>
-        <p:cNvPr id="1" name=""/>
-        <p:cNvGrpSpPr/>
-        <p:nvPr/>
-      </p:nvGrpSpPr>
-      <p:grpSpPr>
-        <a:xfrm>
-          <a:off x="0" y="0"/>
-          <a:ext cx="0" cy="0"/>
-          <a:chOff x="0" y="0"/>
-          <a:chExt cx="0" cy="0"/>
-        </a:xfrm>
-      </p:grpSpPr>
-      <p:sp>
-        <p:nvSpPr>
-          <p:cNvPr id="12" name="Title 11">
-            <a:extLst>
-              <a:ext uri="{FF2B5EF4-FFF2-40B4-BE49-F238E27FC236}">
-                <a16:creationId xmlns:a16="http://schemas.microsoft.com/office/drawing/2014/main" id="{2DD2AFE4-63BE-45E4-B15C-024DB8D8D5D6}"/>
-              </a:ext>
-            </a:extLst>
-          </p:cNvPr>
-          <p:cNvSpPr>
-            <a:spLocks noGrp="1"/>
-          </p:cNvSpPr>
-          <p:nvPr>
-            <p:ph type="title"/>
-          </p:nvPr>
-        </p:nvSpPr>
-        <p:spPr/>
-        <p:txBody>
-          <a:bodyPr/>
-          <a:lstStyle/>
-          <a:p>
-            <a:r>
-              <a:rPr lang="en-US" dirty="0"/>
-              <a:t>Methodology and Procedure</a:t>
-            </a:r>
-          </a:p>
-        </p:txBody>
-      </p:sp>
-      <p:graphicFrame>
-        <p:nvGraphicFramePr>
-          <p:cNvPr id="5" name="Diagram 4">
-            <a:extLst>
-              <a:ext uri="{FF2B5EF4-FFF2-40B4-BE49-F238E27FC236}">
-                <a16:creationId xmlns:a16="http://schemas.microsoft.com/office/drawing/2014/main" id="{B1338040-89B1-474B-AE2E-9438B2C640BA}"/>
-              </a:ext>
-            </a:extLst>
-          </p:cNvPr>
-          <p:cNvGraphicFramePr/>
-          <p:nvPr>
-            <p:extLst>
-              <p:ext uri="{D42A27DB-BD31-4B8C-83A1-F6EECF244321}">
                 <p14:modId xmlns:p14="http://schemas.microsoft.com/office/powerpoint/2010/main" val="3807098568"/>
               </p:ext>
             </p:extLst>
@@ -24207,7 +22935,7 @@
 </p:sld>
 </file>
 
-<file path=ppt/slides/slide7.xml><?xml version="1.0" encoding="utf-8"?>
+<file path=ppt/slides/slide11.xml><?xml version="1.0" encoding="utf-8"?>
 <p:sld xmlns:a="http://schemas.openxmlformats.org/drawingml/2006/main" xmlns:r="http://schemas.openxmlformats.org/officeDocument/2006/relationships" xmlns:p="http://schemas.openxmlformats.org/presentationml/2006/main">
   <p:cSld>
     <p:spTree>
@@ -24518,7 +23246,7 @@
 </p:sld>
 </file>
 
-<file path=ppt/slides/slide8.xml><?xml version="1.0" encoding="utf-8"?>
+<file path=ppt/slides/slide12.xml><?xml version="1.0" encoding="utf-8"?>
 <p:sld xmlns:a="http://schemas.openxmlformats.org/drawingml/2006/main" xmlns:r="http://schemas.openxmlformats.org/officeDocument/2006/relationships" xmlns:p="http://schemas.openxmlformats.org/presentationml/2006/main">
   <p:cSld>
     <p:spTree>
@@ -24888,7 +23616,7 @@
 </p:sld>
 </file>
 
-<file path=ppt/slides/slide9.xml><?xml version="1.0" encoding="utf-8"?>
+<file path=ppt/slides/slide13.xml><?xml version="1.0" encoding="utf-8"?>
 <p:sld xmlns:a="http://schemas.openxmlformats.org/drawingml/2006/main" xmlns:r="http://schemas.openxmlformats.org/officeDocument/2006/relationships" xmlns:p="http://schemas.openxmlformats.org/presentationml/2006/main">
   <p:cSld>
     <p:spTree>
@@ -25204,6 +23932,3202 @@
     <p:extLst>
       <p:ext uri="{BB962C8B-B14F-4D97-AF65-F5344CB8AC3E}">
         <p14:creationId xmlns:p14="http://schemas.microsoft.com/office/powerpoint/2010/main" val="2520671360"/>
+      </p:ext>
+    </p:extLst>
+  </p:cSld>
+  <p:clrMapOvr>
+    <a:masterClrMapping/>
+  </p:clrMapOvr>
+</p:sld>
+</file>
+
+<file path=ppt/slides/slide14.xml><?xml version="1.0" encoding="utf-8"?>
+<p:sld xmlns:a="http://schemas.openxmlformats.org/drawingml/2006/main" xmlns:r="http://schemas.openxmlformats.org/officeDocument/2006/relationships" xmlns:p="http://schemas.openxmlformats.org/presentationml/2006/main">
+  <p:cSld>
+    <p:spTree>
+      <p:nvGrpSpPr>
+        <p:cNvPr id="1" name=""/>
+        <p:cNvGrpSpPr/>
+        <p:nvPr/>
+      </p:nvGrpSpPr>
+      <p:grpSpPr>
+        <a:xfrm>
+          <a:off x="0" y="0"/>
+          <a:ext cx="0" cy="0"/>
+          <a:chOff x="0" y="0"/>
+          <a:chExt cx="0" cy="0"/>
+        </a:xfrm>
+      </p:grpSpPr>
+      <p:sp>
+        <p:nvSpPr>
+          <p:cNvPr id="12" name="Title 11">
+            <a:extLst>
+              <a:ext uri="{FF2B5EF4-FFF2-40B4-BE49-F238E27FC236}">
+                <a16:creationId xmlns:a16="http://schemas.microsoft.com/office/drawing/2014/main" id="{2DD2AFE4-63BE-45E4-B15C-024DB8D8D5D6}"/>
+              </a:ext>
+            </a:extLst>
+          </p:cNvPr>
+          <p:cNvSpPr>
+            <a:spLocks noGrp="1"/>
+          </p:cNvSpPr>
+          <p:nvPr>
+            <p:ph type="title"/>
+          </p:nvPr>
+        </p:nvSpPr>
+        <p:spPr/>
+        <p:txBody>
+          <a:bodyPr/>
+          <a:lstStyle/>
+          <a:p>
+            <a:r>
+              <a:rPr lang="en-US" dirty="0"/>
+              <a:t>Methodology and Procedure</a:t>
+            </a:r>
+          </a:p>
+        </p:txBody>
+      </p:sp>
+      <p:graphicFrame>
+        <p:nvGraphicFramePr>
+          <p:cNvPr id="5" name="Diagram 4">
+            <a:extLst>
+              <a:ext uri="{FF2B5EF4-FFF2-40B4-BE49-F238E27FC236}">
+                <a16:creationId xmlns:a16="http://schemas.microsoft.com/office/drawing/2014/main" id="{B1338040-89B1-474B-AE2E-9438B2C640BA}"/>
+              </a:ext>
+            </a:extLst>
+          </p:cNvPr>
+          <p:cNvGraphicFramePr/>
+          <p:nvPr>
+            <p:extLst>
+              <p:ext uri="{D42A27DB-BD31-4B8C-83A1-F6EECF244321}">
+                <p14:modId xmlns:p14="http://schemas.microsoft.com/office/powerpoint/2010/main" val="681127614"/>
+              </p:ext>
+            </p:extLst>
+          </p:nvPr>
+        </p:nvGraphicFramePr>
+        <p:xfrm>
+          <a:off x="396484" y="1188492"/>
+          <a:ext cx="8351031" cy="840346"/>
+        </p:xfrm>
+        <a:graphic>
+          <a:graphicData uri="http://schemas.openxmlformats.org/drawingml/2006/diagram">
+            <dgm:relIds xmlns:dgm="http://schemas.openxmlformats.org/drawingml/2006/diagram" xmlns:r="http://schemas.openxmlformats.org/officeDocument/2006/relationships" r:dm="rId2" r:lo="rId3" r:qs="rId4" r:cs="rId5"/>
+          </a:graphicData>
+        </a:graphic>
+      </p:graphicFrame>
+      <p:sp>
+        <p:nvSpPr>
+          <p:cNvPr id="8" name="Text Placeholder 12">
+            <a:extLst>
+              <a:ext uri="{FF2B5EF4-FFF2-40B4-BE49-F238E27FC236}">
+                <a16:creationId xmlns:a16="http://schemas.microsoft.com/office/drawing/2014/main" id="{9885164F-EB21-49BB-B210-AD5A1F91677F}"/>
+              </a:ext>
+            </a:extLst>
+          </p:cNvPr>
+          <p:cNvSpPr txBox="1">
+            <a:spLocks/>
+          </p:cNvSpPr>
+          <p:nvPr/>
+        </p:nvSpPr>
+        <p:spPr>
+          <a:xfrm>
+            <a:off x="966788" y="2253803"/>
+            <a:ext cx="7562850" cy="4171627"/>
+          </a:xfrm>
+          <a:prstGeom prst="rect">
+            <a:avLst/>
+          </a:prstGeom>
+        </p:spPr>
+        <p:txBody>
+          <a:bodyPr vert="horz"/>
+          <a:lstStyle>
+            <a:lvl1pPr marL="0" indent="0" algn="l" defTabSz="457200" rtl="0" eaLnBrk="1" fontAlgn="base" hangingPunct="1">
+              <a:spcBef>
+                <a:spcPts val="1200"/>
+              </a:spcBef>
+              <a:spcAft>
+                <a:spcPts val="600"/>
+              </a:spcAft>
+              <a:buFont typeface="Arial" panose="020B0604020202020204" pitchFamily="34" charset="0"/>
+              <a:buNone/>
+              <a:tabLst>
+                <a:tab pos="230188" algn="l"/>
+              </a:tabLst>
+              <a:defRPr sz="2000" b="1" kern="1200">
+                <a:solidFill>
+                  <a:schemeClr val="tx1"/>
+                </a:solidFill>
+                <a:latin typeface="+mn-lt"/>
+                <a:ea typeface="ＭＳ Ｐゴシック" charset="0"/>
+                <a:cs typeface="Geneva" charset="0"/>
+              </a:defRPr>
+            </a:lvl1pPr>
+            <a:lvl2pPr marL="3175" indent="0" algn="l" defTabSz="457200" rtl="0" eaLnBrk="1" fontAlgn="base" hangingPunct="1">
+              <a:spcBef>
+                <a:spcPts val="0"/>
+              </a:spcBef>
+              <a:spcAft>
+                <a:spcPts val="1200"/>
+              </a:spcAft>
+              <a:buFont typeface="Arial" panose="020B0604020202020204" pitchFamily="34" charset="0"/>
+              <a:buNone/>
+              <a:defRPr sz="1800" b="1" kern="1200">
+                <a:solidFill>
+                  <a:schemeClr val="tx1"/>
+                </a:solidFill>
+                <a:latin typeface="+mn-lt"/>
+                <a:ea typeface="Geneva" charset="0"/>
+                <a:cs typeface="Geneva" charset="0"/>
+              </a:defRPr>
+            </a:lvl2pPr>
+            <a:lvl3pPr marL="228600" indent="-228600" algn="l" defTabSz="457200" rtl="0" eaLnBrk="1" fontAlgn="base" hangingPunct="1">
+              <a:spcBef>
+                <a:spcPct val="20000"/>
+              </a:spcBef>
+              <a:spcAft>
+                <a:spcPct val="0"/>
+              </a:spcAft>
+              <a:buFont typeface="Arial" panose="020B0604020202020204" pitchFamily="34" charset="0"/>
+              <a:buChar char="•"/>
+              <a:defRPr sz="1800" kern="1200">
+                <a:solidFill>
+                  <a:schemeClr val="tx1"/>
+                </a:solidFill>
+                <a:latin typeface="+mn-lt"/>
+                <a:ea typeface="Geneva" charset="0"/>
+                <a:cs typeface="Geneva" charset="0"/>
+              </a:defRPr>
+            </a:lvl3pPr>
+            <a:lvl4pPr marL="514350" indent="-230188" algn="l" defTabSz="457200" rtl="0" eaLnBrk="1" fontAlgn="base" hangingPunct="1">
+              <a:spcBef>
+                <a:spcPct val="20000"/>
+              </a:spcBef>
+              <a:spcAft>
+                <a:spcPct val="0"/>
+              </a:spcAft>
+              <a:buFont typeface="Lucida Grande"/>
+              <a:buChar char="-"/>
+              <a:tabLst/>
+              <a:defRPr sz="1800" kern="1200">
+                <a:solidFill>
+                  <a:schemeClr val="tx1"/>
+                </a:solidFill>
+                <a:latin typeface="+mn-lt"/>
+                <a:ea typeface="Geneva" charset="0"/>
+                <a:cs typeface="Geneva" charset="0"/>
+              </a:defRPr>
+            </a:lvl4pPr>
+            <a:lvl5pPr marL="747713" indent="-228600" algn="l" defTabSz="457200" rtl="0" eaLnBrk="1" fontAlgn="base" hangingPunct="1">
+              <a:spcBef>
+                <a:spcPct val="20000"/>
+              </a:spcBef>
+              <a:spcAft>
+                <a:spcPct val="0"/>
+              </a:spcAft>
+              <a:buFont typeface="Lucida Grande"/>
+              <a:buChar char="·"/>
+              <a:defRPr sz="1800" kern="1200">
+                <a:solidFill>
+                  <a:schemeClr val="tx1"/>
+                </a:solidFill>
+                <a:latin typeface="+mn-lt"/>
+                <a:ea typeface="Geneva" charset="0"/>
+                <a:cs typeface="Geneva" charset="0"/>
+              </a:defRPr>
+            </a:lvl5pPr>
+            <a:lvl6pPr marL="2514600" indent="-228600" algn="l" defTabSz="457200" rtl="0" eaLnBrk="1" latinLnBrk="0" hangingPunct="1">
+              <a:spcBef>
+                <a:spcPct val="20000"/>
+              </a:spcBef>
+              <a:buFont typeface="Arial"/>
+              <a:buChar char="•"/>
+              <a:defRPr sz="2000" kern="1200">
+                <a:solidFill>
+                  <a:schemeClr val="tx1"/>
+                </a:solidFill>
+                <a:latin typeface="+mn-lt"/>
+                <a:ea typeface="+mn-ea"/>
+                <a:cs typeface="+mn-cs"/>
+              </a:defRPr>
+            </a:lvl6pPr>
+            <a:lvl7pPr marL="2971800" indent="-228600" algn="l" defTabSz="457200" rtl="0" eaLnBrk="1" latinLnBrk="0" hangingPunct="1">
+              <a:spcBef>
+                <a:spcPct val="20000"/>
+              </a:spcBef>
+              <a:buFont typeface="Arial"/>
+              <a:buChar char="•"/>
+              <a:defRPr sz="2000" kern="1200">
+                <a:solidFill>
+                  <a:schemeClr val="tx1"/>
+                </a:solidFill>
+                <a:latin typeface="+mn-lt"/>
+                <a:ea typeface="+mn-ea"/>
+                <a:cs typeface="+mn-cs"/>
+              </a:defRPr>
+            </a:lvl7pPr>
+            <a:lvl8pPr marL="3429000" indent="-228600" algn="l" defTabSz="457200" rtl="0" eaLnBrk="1" latinLnBrk="0" hangingPunct="1">
+              <a:spcBef>
+                <a:spcPct val="20000"/>
+              </a:spcBef>
+              <a:buFont typeface="Arial"/>
+              <a:buChar char="•"/>
+              <a:defRPr sz="2000" kern="1200">
+                <a:solidFill>
+                  <a:schemeClr val="tx1"/>
+                </a:solidFill>
+                <a:latin typeface="+mn-lt"/>
+                <a:ea typeface="+mn-ea"/>
+                <a:cs typeface="+mn-cs"/>
+              </a:defRPr>
+            </a:lvl8pPr>
+            <a:lvl9pPr marL="3886200" indent="-228600" algn="l" defTabSz="457200" rtl="0" eaLnBrk="1" latinLnBrk="0" hangingPunct="1">
+              <a:spcBef>
+                <a:spcPct val="20000"/>
+              </a:spcBef>
+              <a:buFont typeface="Arial"/>
+              <a:buChar char="•"/>
+              <a:defRPr sz="2000" kern="1200">
+                <a:solidFill>
+                  <a:schemeClr val="tx1"/>
+                </a:solidFill>
+                <a:latin typeface="+mn-lt"/>
+                <a:ea typeface="+mn-ea"/>
+                <a:cs typeface="+mn-cs"/>
+              </a:defRPr>
+            </a:lvl9pPr>
+          </a:lstStyle>
+          <a:p>
+            <a:pPr marL="342900" indent="-342900">
+              <a:buFont typeface="Arial" panose="020B0604020202020204" pitchFamily="34" charset="0"/>
+              <a:buChar char="•"/>
+            </a:pPr>
+            <a:endParaRPr lang="en-US" dirty="0"/>
+          </a:p>
+          <a:p>
+            <a:pPr marL="342900" indent="-342900">
+              <a:buFont typeface="Arial" panose="020B0604020202020204" pitchFamily="34" charset="0"/>
+              <a:buChar char="•"/>
+            </a:pPr>
+            <a:r>
+              <a:rPr lang="en-US" dirty="0"/>
+              <a:t>System will be developed under ROS environment. </a:t>
+            </a:r>
+          </a:p>
+          <a:p>
+            <a:pPr marL="342900" indent="-342900">
+              <a:buFont typeface="Arial" panose="020B0604020202020204" pitchFamily="34" charset="0"/>
+              <a:buChar char="•"/>
+            </a:pPr>
+            <a:endParaRPr lang="en-US" dirty="0"/>
+          </a:p>
+          <a:p>
+            <a:pPr marL="342900" indent="-342900">
+              <a:buFont typeface="Arial" panose="020B0604020202020204" pitchFamily="34" charset="0"/>
+              <a:buChar char="•"/>
+            </a:pPr>
+            <a:r>
+              <a:rPr lang="en-US" dirty="0"/>
+              <a:t>Validation will be conducted using unified datasets exploiting different scenarios, and having a ground truth.</a:t>
+            </a:r>
+          </a:p>
+          <a:p>
+            <a:pPr marL="342900" indent="-342900">
+              <a:buFont typeface="Arial" panose="020B0604020202020204" pitchFamily="34" charset="0"/>
+              <a:buChar char="•"/>
+            </a:pPr>
+            <a:endParaRPr lang="en-US" dirty="0"/>
+          </a:p>
+          <a:p>
+            <a:pPr marL="342900" indent="-342900">
+              <a:buFont typeface="Arial" panose="020B0604020202020204" pitchFamily="34" charset="0"/>
+              <a:buChar char="•"/>
+            </a:pPr>
+            <a:r>
+              <a:rPr lang="en-US" dirty="0"/>
+              <a:t>Datasets selected are KITTI and TUM RGB-D.</a:t>
+            </a:r>
+          </a:p>
+          <a:p>
+            <a:pPr marL="682625" indent="-342900">
+              <a:buFont typeface="Arial" panose="020B0604020202020204" pitchFamily="34" charset="0"/>
+              <a:buChar char="•"/>
+              <a:tabLst>
+                <a:tab pos="515938" algn="l"/>
+              </a:tabLst>
+            </a:pPr>
+            <a:r>
+              <a:rPr lang="en-US" b="0" dirty="0"/>
+              <a:t>Covering indoor/outdoor static/dynamic conditions. </a:t>
+            </a:r>
+          </a:p>
+        </p:txBody>
+      </p:sp>
+    </p:spTree>
+    <p:extLst>
+      <p:ext uri="{BB962C8B-B14F-4D97-AF65-F5344CB8AC3E}">
+        <p14:creationId xmlns:p14="http://schemas.microsoft.com/office/powerpoint/2010/main" val="2884775656"/>
+      </p:ext>
+    </p:extLst>
+  </p:cSld>
+  <p:clrMapOvr>
+    <a:masterClrMapping/>
+  </p:clrMapOvr>
+</p:sld>
+</file>
+
+<file path=ppt/slides/slide15.xml><?xml version="1.0" encoding="utf-8"?>
+<p:sld xmlns:a="http://schemas.openxmlformats.org/drawingml/2006/main" xmlns:r="http://schemas.openxmlformats.org/officeDocument/2006/relationships" xmlns:p="http://schemas.openxmlformats.org/presentationml/2006/main">
+  <p:cSld>
+    <p:spTree>
+      <p:nvGrpSpPr>
+        <p:cNvPr id="1" name=""/>
+        <p:cNvGrpSpPr/>
+        <p:nvPr/>
+      </p:nvGrpSpPr>
+      <p:grpSpPr>
+        <a:xfrm>
+          <a:off x="0" y="0"/>
+          <a:ext cx="0" cy="0"/>
+          <a:chOff x="0" y="0"/>
+          <a:chExt cx="0" cy="0"/>
+        </a:xfrm>
+      </p:grpSpPr>
+      <p:sp>
+        <p:nvSpPr>
+          <p:cNvPr id="13" name="Text Placeholder 12">
+            <a:extLst>
+              <a:ext uri="{FF2B5EF4-FFF2-40B4-BE49-F238E27FC236}">
+                <a16:creationId xmlns:a16="http://schemas.microsoft.com/office/drawing/2014/main" id="{03B27027-B59A-4E6B-B377-A7A8C7EF4555}"/>
+              </a:ext>
+            </a:extLst>
+          </p:cNvPr>
+          <p:cNvSpPr>
+            <a:spLocks noGrp="1"/>
+          </p:cNvSpPr>
+          <p:nvPr>
+            <p:ph type="body" sz="quarter" idx="16"/>
+          </p:nvPr>
+        </p:nvSpPr>
+        <p:spPr/>
+        <p:txBody>
+          <a:bodyPr/>
+          <a:lstStyle/>
+          <a:p>
+            <a:pPr marL="342900" indent="-342900">
+              <a:buFont typeface="Arial" panose="020B0604020202020204" pitchFamily="34" charset="0"/>
+              <a:buChar char="•"/>
+            </a:pPr>
+            <a:r>
+              <a:rPr lang="en-US" dirty="0"/>
+              <a:t>In this work, we focus on </a:t>
+            </a:r>
+            <a:r>
+              <a:rPr lang="en-US" dirty="0">
+                <a:solidFill>
+                  <a:srgbClr val="00B050"/>
+                </a:solidFill>
+              </a:rPr>
+              <a:t>Accuracy</a:t>
+            </a:r>
+            <a:r>
+              <a:rPr lang="en-US" dirty="0"/>
+              <a:t> enhancement.</a:t>
+            </a:r>
+          </a:p>
+          <a:p>
+            <a:pPr marL="342900" indent="-342900">
+              <a:buFont typeface="Arial" panose="020B0604020202020204" pitchFamily="34" charset="0"/>
+              <a:buChar char="•"/>
+            </a:pPr>
+            <a:r>
+              <a:rPr lang="en-US" dirty="0">
+                <a:solidFill>
+                  <a:srgbClr val="00B050"/>
+                </a:solidFill>
+              </a:rPr>
+              <a:t>Absolute Trajectory Error (ATE) </a:t>
+            </a:r>
+            <a:r>
+              <a:rPr lang="en-US" dirty="0"/>
+              <a:t>was adopted by many as a measure for accuracy, ATE is defined by:</a:t>
+            </a:r>
+          </a:p>
+          <a:p>
+            <a:endParaRPr lang="en-US" dirty="0"/>
+          </a:p>
+          <a:p>
+            <a:pPr marL="342900" indent="-342900">
+              <a:buFont typeface="Arial" panose="020B0604020202020204" pitchFamily="34" charset="0"/>
+              <a:buChar char="•"/>
+            </a:pPr>
+            <a:endParaRPr lang="en-US" dirty="0"/>
+          </a:p>
+          <a:p>
+            <a:pPr marL="342900" indent="-342900">
+              <a:buFont typeface="Arial" panose="020B0604020202020204" pitchFamily="34" charset="0"/>
+              <a:buChar char="•"/>
+            </a:pPr>
+            <a:r>
+              <a:rPr lang="en-US" dirty="0"/>
+              <a:t>To have a better representation of the error and its evolution, statistical measurements are applied to ATE.</a:t>
+            </a:r>
+          </a:p>
+          <a:p>
+            <a:pPr marL="682625" lvl="1" indent="-342900">
+              <a:buFont typeface="Arial" panose="020B0604020202020204" pitchFamily="34" charset="0"/>
+              <a:buChar char="•"/>
+            </a:pPr>
+            <a:r>
+              <a:rPr lang="en-US" b="0" dirty="0"/>
+              <a:t>Max / Min ATE Error</a:t>
+            </a:r>
+          </a:p>
+          <a:p>
+            <a:pPr marL="682625" lvl="1" indent="-342900">
+              <a:buFont typeface="Arial" panose="020B0604020202020204" pitchFamily="34" charset="0"/>
+              <a:buChar char="•"/>
+            </a:pPr>
+            <a:r>
+              <a:rPr lang="en-US" b="0" dirty="0"/>
+              <a:t>Root Mean Square Error (RMSE)</a:t>
+            </a:r>
+          </a:p>
+          <a:p>
+            <a:pPr marL="682625" lvl="1" indent="-342900">
+              <a:buFont typeface="Arial" panose="020B0604020202020204" pitchFamily="34" charset="0"/>
+              <a:buChar char="•"/>
+            </a:pPr>
+            <a:r>
+              <a:rPr lang="en-US" b="0" dirty="0"/>
+              <a:t>Mean, median, variance, and std. deviation.</a:t>
+            </a:r>
+          </a:p>
+        </p:txBody>
+      </p:sp>
+      <p:sp>
+        <p:nvSpPr>
+          <p:cNvPr id="12" name="Title 11">
+            <a:extLst>
+              <a:ext uri="{FF2B5EF4-FFF2-40B4-BE49-F238E27FC236}">
+                <a16:creationId xmlns:a16="http://schemas.microsoft.com/office/drawing/2014/main" id="{2DD2AFE4-63BE-45E4-B15C-024DB8D8D5D6}"/>
+              </a:ext>
+            </a:extLst>
+          </p:cNvPr>
+          <p:cNvSpPr>
+            <a:spLocks noGrp="1"/>
+          </p:cNvSpPr>
+          <p:nvPr>
+            <p:ph type="title"/>
+          </p:nvPr>
+        </p:nvSpPr>
+        <p:spPr/>
+        <p:txBody>
+          <a:bodyPr/>
+          <a:lstStyle/>
+          <a:p>
+            <a:r>
+              <a:rPr lang="en-US" dirty="0"/>
+              <a:t>Performance Evaluation</a:t>
+            </a:r>
+          </a:p>
+        </p:txBody>
+      </p:sp>
+      <p:pic>
+        <p:nvPicPr>
+          <p:cNvPr id="2" name="Picture 1">
+            <a:extLst>
+              <a:ext uri="{FF2B5EF4-FFF2-40B4-BE49-F238E27FC236}">
+                <a16:creationId xmlns:a16="http://schemas.microsoft.com/office/drawing/2014/main" id="{22FDD36D-E47C-47C4-A9B0-FB048698E3BB}"/>
+              </a:ext>
+            </a:extLst>
+          </p:cNvPr>
+          <p:cNvPicPr>
+            <a:picLocks noChangeAspect="1"/>
+          </p:cNvPicPr>
+          <p:nvPr/>
+        </p:nvPicPr>
+        <p:blipFill>
+          <a:blip r:embed="rId2"/>
+          <a:stretch>
+            <a:fillRect/>
+          </a:stretch>
+        </p:blipFill>
+        <p:spPr>
+          <a:xfrm>
+            <a:off x="2176093" y="3086294"/>
+            <a:ext cx="4791813" cy="685411"/>
+          </a:xfrm>
+          <a:prstGeom prst="rect">
+            <a:avLst/>
+          </a:prstGeom>
+        </p:spPr>
+      </p:pic>
+    </p:spTree>
+    <p:extLst>
+      <p:ext uri="{BB962C8B-B14F-4D97-AF65-F5344CB8AC3E}">
+        <p14:creationId xmlns:p14="http://schemas.microsoft.com/office/powerpoint/2010/main" val="3404325906"/>
+      </p:ext>
+    </p:extLst>
+  </p:cSld>
+  <p:clrMapOvr>
+    <a:masterClrMapping/>
+  </p:clrMapOvr>
+</p:sld>
+</file>
+
+<file path=ppt/slides/slide16.xml><?xml version="1.0" encoding="utf-8"?>
+<p:sld xmlns:a="http://schemas.openxmlformats.org/drawingml/2006/main" xmlns:r="http://schemas.openxmlformats.org/officeDocument/2006/relationships" xmlns:p="http://schemas.openxmlformats.org/presentationml/2006/main">
+  <p:cSld>
+    <p:spTree>
+      <p:nvGrpSpPr>
+        <p:cNvPr id="1" name=""/>
+        <p:cNvGrpSpPr/>
+        <p:nvPr/>
+      </p:nvGrpSpPr>
+      <p:grpSpPr>
+        <a:xfrm>
+          <a:off x="0" y="0"/>
+          <a:ext cx="0" cy="0"/>
+          <a:chOff x="0" y="0"/>
+          <a:chExt cx="0" cy="0"/>
+        </a:xfrm>
+      </p:grpSpPr>
+      <p:sp>
+        <p:nvSpPr>
+          <p:cNvPr id="13" name="Text Placeholder 12">
+            <a:extLst>
+              <a:ext uri="{FF2B5EF4-FFF2-40B4-BE49-F238E27FC236}">
+                <a16:creationId xmlns:a16="http://schemas.microsoft.com/office/drawing/2014/main" id="{03B27027-B59A-4E6B-B377-A7A8C7EF4555}"/>
+              </a:ext>
+            </a:extLst>
+          </p:cNvPr>
+          <p:cNvSpPr>
+            <a:spLocks noGrp="1"/>
+          </p:cNvSpPr>
+          <p:nvPr>
+            <p:ph type="body" sz="quarter" idx="16"/>
+          </p:nvPr>
+        </p:nvSpPr>
+        <p:spPr/>
+        <p:txBody>
+          <a:bodyPr/>
+          <a:lstStyle/>
+          <a:p>
+            <a:pPr marL="342900" indent="-342900">
+              <a:buFont typeface="Arial" panose="020B0604020202020204" pitchFamily="34" charset="0"/>
+              <a:buChar char="•"/>
+            </a:pPr>
+            <a:r>
+              <a:rPr lang="en-US" dirty="0"/>
+              <a:t>Extension of the boundaries of both Algorithms.</a:t>
+            </a:r>
+          </a:p>
+          <a:p>
+            <a:pPr marL="342900" indent="-342900">
+              <a:buFont typeface="Arial" panose="020B0604020202020204" pitchFamily="34" charset="0"/>
+              <a:buChar char="•"/>
+            </a:pPr>
+            <a:endParaRPr lang="en-US" dirty="0"/>
+          </a:p>
+          <a:p>
+            <a:pPr marL="342900" indent="-342900">
+              <a:buFont typeface="Arial" panose="020B0604020202020204" pitchFamily="34" charset="0"/>
+              <a:buChar char="•"/>
+            </a:pPr>
+            <a:r>
+              <a:rPr lang="en-US" dirty="0"/>
+              <a:t>More robust and reliable SLAM solution.</a:t>
+            </a:r>
+          </a:p>
+          <a:p>
+            <a:pPr marL="342900" indent="-342900">
+              <a:buFont typeface="Arial" panose="020B0604020202020204" pitchFamily="34" charset="0"/>
+              <a:buChar char="•"/>
+            </a:pPr>
+            <a:endParaRPr lang="en-US" dirty="0"/>
+          </a:p>
+          <a:p>
+            <a:pPr marL="342900" indent="-342900">
+              <a:buFont typeface="Arial" panose="020B0604020202020204" pitchFamily="34" charset="0"/>
+              <a:buChar char="•"/>
+            </a:pPr>
+            <a:r>
+              <a:rPr lang="en-US" dirty="0"/>
+              <a:t>Serve the ultimate objective of having an out-of-box SLAM system able to work under challenging conditions.</a:t>
+            </a:r>
+          </a:p>
+        </p:txBody>
+      </p:sp>
+      <p:sp>
+        <p:nvSpPr>
+          <p:cNvPr id="12" name="Title 11">
+            <a:extLst>
+              <a:ext uri="{FF2B5EF4-FFF2-40B4-BE49-F238E27FC236}">
+                <a16:creationId xmlns:a16="http://schemas.microsoft.com/office/drawing/2014/main" id="{2DD2AFE4-63BE-45E4-B15C-024DB8D8D5D6}"/>
+              </a:ext>
+            </a:extLst>
+          </p:cNvPr>
+          <p:cNvSpPr>
+            <a:spLocks noGrp="1"/>
+          </p:cNvSpPr>
+          <p:nvPr>
+            <p:ph type="title"/>
+          </p:nvPr>
+        </p:nvSpPr>
+        <p:spPr/>
+        <p:txBody>
+          <a:bodyPr/>
+          <a:lstStyle/>
+          <a:p>
+            <a:r>
+              <a:rPr lang="en-US" dirty="0"/>
+              <a:t>Significance of Proposed Research</a:t>
+            </a:r>
+          </a:p>
+        </p:txBody>
+      </p:sp>
+    </p:spTree>
+    <p:extLst>
+      <p:ext uri="{BB962C8B-B14F-4D97-AF65-F5344CB8AC3E}">
+        <p14:creationId xmlns:p14="http://schemas.microsoft.com/office/powerpoint/2010/main" val="244355130"/>
+      </p:ext>
+    </p:extLst>
+  </p:cSld>
+  <p:clrMapOvr>
+    <a:masterClrMapping/>
+  </p:clrMapOvr>
+</p:sld>
+</file>
+
+<file path=ppt/slides/slide17.xml><?xml version="1.0" encoding="utf-8"?>
+<p:sld xmlns:a="http://schemas.openxmlformats.org/drawingml/2006/main" xmlns:r="http://schemas.openxmlformats.org/officeDocument/2006/relationships" xmlns:p="http://schemas.openxmlformats.org/presentationml/2006/main">
+  <p:cSld>
+    <p:spTree>
+      <p:nvGrpSpPr>
+        <p:cNvPr id="1" name=""/>
+        <p:cNvGrpSpPr/>
+        <p:nvPr/>
+      </p:nvGrpSpPr>
+      <p:grpSpPr>
+        <a:xfrm>
+          <a:off x="0" y="0"/>
+          <a:ext cx="0" cy="0"/>
+          <a:chOff x="0" y="0"/>
+          <a:chExt cx="0" cy="0"/>
+        </a:xfrm>
+      </p:grpSpPr>
+      <p:sp>
+        <p:nvSpPr>
+          <p:cNvPr id="7" name="Text Placeholder 6">
+            <a:extLst>
+              <a:ext uri="{FF2B5EF4-FFF2-40B4-BE49-F238E27FC236}">
+                <a16:creationId xmlns:a16="http://schemas.microsoft.com/office/drawing/2014/main" id="{BE99C30C-BE44-4C45-887C-EA882D81BA24}"/>
+              </a:ext>
+            </a:extLst>
+          </p:cNvPr>
+          <p:cNvSpPr>
+            <a:spLocks noGrp="1"/>
+          </p:cNvSpPr>
+          <p:nvPr>
+            <p:ph type="body" sz="quarter" idx="16"/>
+          </p:nvPr>
+        </p:nvSpPr>
+        <p:spPr/>
+        <p:txBody>
+          <a:bodyPr/>
+          <a:lstStyle/>
+          <a:p>
+            <a:pPr algn="ctr"/>
+            <a:endParaRPr lang="en-US" dirty="0"/>
+          </a:p>
+          <a:p>
+            <a:pPr algn="ctr"/>
+            <a:endParaRPr lang="en-US" sz="3600" dirty="0"/>
+          </a:p>
+          <a:p>
+            <a:pPr algn="ctr"/>
+            <a:endParaRPr lang="en-US" sz="3600" dirty="0"/>
+          </a:p>
+          <a:p>
+            <a:pPr algn="ctr"/>
+            <a:r>
+              <a:rPr lang="en-US" sz="3600" dirty="0"/>
+              <a:t>Questions</a:t>
+            </a:r>
+          </a:p>
+        </p:txBody>
+      </p:sp>
+      <p:sp>
+        <p:nvSpPr>
+          <p:cNvPr id="6" name="Title 5">
+            <a:extLst>
+              <a:ext uri="{FF2B5EF4-FFF2-40B4-BE49-F238E27FC236}">
+                <a16:creationId xmlns:a16="http://schemas.microsoft.com/office/drawing/2014/main" id="{2AE42E0C-A286-4DF9-9AD3-8A488542E5FB}"/>
+              </a:ext>
+            </a:extLst>
+          </p:cNvPr>
+          <p:cNvSpPr>
+            <a:spLocks noGrp="1"/>
+          </p:cNvSpPr>
+          <p:nvPr>
+            <p:ph type="title"/>
+          </p:nvPr>
+        </p:nvSpPr>
+        <p:spPr/>
+        <p:txBody>
+          <a:bodyPr/>
+          <a:lstStyle/>
+          <a:p>
+            <a:endParaRPr lang="en-US"/>
+          </a:p>
+        </p:txBody>
+      </p:sp>
+      <p:pic>
+        <p:nvPicPr>
+          <p:cNvPr id="9" name="Picture 8">
+            <a:extLst>
+              <a:ext uri="{FF2B5EF4-FFF2-40B4-BE49-F238E27FC236}">
+                <a16:creationId xmlns:a16="http://schemas.microsoft.com/office/drawing/2014/main" id="{94E071B9-C40E-4EEE-B916-BC333C5150A5}"/>
+              </a:ext>
+            </a:extLst>
+          </p:cNvPr>
+          <p:cNvPicPr>
+            <a:picLocks noChangeAspect="1"/>
+          </p:cNvPicPr>
+          <p:nvPr/>
+        </p:nvPicPr>
+        <p:blipFill>
+          <a:blip r:embed="rId2"/>
+          <a:stretch>
+            <a:fillRect/>
+          </a:stretch>
+        </p:blipFill>
+        <p:spPr>
+          <a:xfrm>
+            <a:off x="3518280" y="1608668"/>
+            <a:ext cx="2155065" cy="2155065"/>
+          </a:xfrm>
+          <a:prstGeom prst="rect">
+            <a:avLst/>
+          </a:prstGeom>
+        </p:spPr>
+      </p:pic>
+    </p:spTree>
+    <p:extLst>
+      <p:ext uri="{BB962C8B-B14F-4D97-AF65-F5344CB8AC3E}">
+        <p14:creationId xmlns:p14="http://schemas.microsoft.com/office/powerpoint/2010/main" val="2003370727"/>
+      </p:ext>
+    </p:extLst>
+  </p:cSld>
+  <p:clrMapOvr>
+    <a:masterClrMapping/>
+  </p:clrMapOvr>
+</p:sld>
+</file>
+
+<file path=ppt/slides/slide18.xml><?xml version="1.0" encoding="utf-8"?>
+<p:sld xmlns:a="http://schemas.openxmlformats.org/drawingml/2006/main" xmlns:r="http://schemas.openxmlformats.org/officeDocument/2006/relationships" xmlns:p="http://schemas.openxmlformats.org/presentationml/2006/main">
+  <p:cSld>
+    <p:spTree>
+      <p:nvGrpSpPr>
+        <p:cNvPr id="1" name=""/>
+        <p:cNvGrpSpPr/>
+        <p:nvPr/>
+      </p:nvGrpSpPr>
+      <p:grpSpPr>
+        <a:xfrm>
+          <a:off x="0" y="0"/>
+          <a:ext cx="0" cy="0"/>
+          <a:chOff x="0" y="0"/>
+          <a:chExt cx="0" cy="0"/>
+        </a:xfrm>
+      </p:grpSpPr>
+      <p:sp>
+        <p:nvSpPr>
+          <p:cNvPr id="7" name="Text Placeholder 6">
+            <a:extLst>
+              <a:ext uri="{FF2B5EF4-FFF2-40B4-BE49-F238E27FC236}">
+                <a16:creationId xmlns:a16="http://schemas.microsoft.com/office/drawing/2014/main" id="{BE99C30C-BE44-4C45-887C-EA882D81BA24}"/>
+              </a:ext>
+            </a:extLst>
+          </p:cNvPr>
+          <p:cNvSpPr>
+            <a:spLocks noGrp="1"/>
+          </p:cNvSpPr>
+          <p:nvPr>
+            <p:ph type="body" sz="quarter" idx="16"/>
+          </p:nvPr>
+        </p:nvSpPr>
+        <p:spPr/>
+        <p:txBody>
+          <a:bodyPr/>
+          <a:lstStyle/>
+          <a:p>
+            <a:pPr algn="ctr"/>
+            <a:endParaRPr lang="en-US" dirty="0"/>
+          </a:p>
+          <a:p>
+            <a:pPr algn="ctr"/>
+            <a:endParaRPr lang="en-US" sz="3600" dirty="0"/>
+          </a:p>
+          <a:p>
+            <a:pPr algn="ctr"/>
+            <a:r>
+              <a:rPr lang="en-US" sz="3600" dirty="0"/>
+              <a:t>Thank You !</a:t>
+            </a:r>
+          </a:p>
+        </p:txBody>
+      </p:sp>
+      <p:sp>
+        <p:nvSpPr>
+          <p:cNvPr id="6" name="Title 5">
+            <a:extLst>
+              <a:ext uri="{FF2B5EF4-FFF2-40B4-BE49-F238E27FC236}">
+                <a16:creationId xmlns:a16="http://schemas.microsoft.com/office/drawing/2014/main" id="{2AE42E0C-A286-4DF9-9AD3-8A488542E5FB}"/>
+              </a:ext>
+            </a:extLst>
+          </p:cNvPr>
+          <p:cNvSpPr>
+            <a:spLocks noGrp="1"/>
+          </p:cNvSpPr>
+          <p:nvPr>
+            <p:ph type="title"/>
+          </p:nvPr>
+        </p:nvSpPr>
+        <p:spPr/>
+        <p:txBody>
+          <a:bodyPr/>
+          <a:lstStyle/>
+          <a:p>
+            <a:endParaRPr lang="en-US"/>
+          </a:p>
+        </p:txBody>
+      </p:sp>
+    </p:spTree>
+    <p:extLst>
+      <p:ext uri="{BB962C8B-B14F-4D97-AF65-F5344CB8AC3E}">
+        <p14:creationId xmlns:p14="http://schemas.microsoft.com/office/powerpoint/2010/main" val="1554159479"/>
+      </p:ext>
+    </p:extLst>
+  </p:cSld>
+  <p:clrMapOvr>
+    <a:masterClrMapping/>
+  </p:clrMapOvr>
+</p:sld>
+</file>
+
+<file path=ppt/slides/slide2.xml><?xml version="1.0" encoding="utf-8"?>
+<p:sld xmlns:a="http://schemas.openxmlformats.org/drawingml/2006/main" xmlns:r="http://schemas.openxmlformats.org/officeDocument/2006/relationships" xmlns:p="http://schemas.openxmlformats.org/presentationml/2006/main">
+  <p:cSld>
+    <p:spTree>
+      <p:nvGrpSpPr>
+        <p:cNvPr id="1" name=""/>
+        <p:cNvGrpSpPr/>
+        <p:nvPr/>
+      </p:nvGrpSpPr>
+      <p:grpSpPr>
+        <a:xfrm>
+          <a:off x="0" y="0"/>
+          <a:ext cx="0" cy="0"/>
+          <a:chOff x="0" y="0"/>
+          <a:chExt cx="0" cy="0"/>
+        </a:xfrm>
+      </p:grpSpPr>
+      <p:sp>
+        <p:nvSpPr>
+          <p:cNvPr id="13" name="Text Placeholder 12">
+            <a:extLst>
+              <a:ext uri="{FF2B5EF4-FFF2-40B4-BE49-F238E27FC236}">
+                <a16:creationId xmlns:a16="http://schemas.microsoft.com/office/drawing/2014/main" id="{03B27027-B59A-4E6B-B377-A7A8C7EF4555}"/>
+              </a:ext>
+            </a:extLst>
+          </p:cNvPr>
+          <p:cNvSpPr>
+            <a:spLocks noGrp="1"/>
+          </p:cNvSpPr>
+          <p:nvPr>
+            <p:ph type="body" sz="quarter" idx="16"/>
+          </p:nvPr>
+        </p:nvSpPr>
+        <p:spPr/>
+        <p:txBody>
+          <a:bodyPr/>
+          <a:lstStyle/>
+          <a:p>
+            <a:pPr marL="342900" indent="-342900">
+              <a:buFont typeface="Arial" panose="020B0604020202020204" pitchFamily="34" charset="0"/>
+              <a:buChar char="•"/>
+            </a:pPr>
+            <a:r>
+              <a:rPr lang="en-US" dirty="0"/>
+              <a:t>Introduction</a:t>
+            </a:r>
+          </a:p>
+          <a:p>
+            <a:pPr marL="342900" indent="-342900">
+              <a:buFont typeface="Arial" panose="020B0604020202020204" pitchFamily="34" charset="0"/>
+              <a:buChar char="•"/>
+            </a:pPr>
+            <a:r>
+              <a:rPr lang="en-US" dirty="0"/>
+              <a:t>Problem Definition</a:t>
+            </a:r>
+          </a:p>
+          <a:p>
+            <a:pPr marL="342900" indent="-342900">
+              <a:buFont typeface="Arial" panose="020B0604020202020204" pitchFamily="34" charset="0"/>
+              <a:buChar char="•"/>
+            </a:pPr>
+            <a:r>
+              <a:rPr lang="en-US" dirty="0"/>
+              <a:t>Literature Review</a:t>
+            </a:r>
+          </a:p>
+          <a:p>
+            <a:pPr marL="342900" indent="-342900">
+              <a:buFont typeface="Arial" panose="020B0604020202020204" pitchFamily="34" charset="0"/>
+              <a:buChar char="•"/>
+            </a:pPr>
+            <a:r>
+              <a:rPr lang="en-US" dirty="0"/>
+              <a:t>Methodology and Procedure</a:t>
+            </a:r>
+          </a:p>
+          <a:p>
+            <a:pPr marL="342900" indent="-342900">
+              <a:buFont typeface="Arial" panose="020B0604020202020204" pitchFamily="34" charset="0"/>
+              <a:buChar char="•"/>
+            </a:pPr>
+            <a:r>
+              <a:rPr lang="en-US" dirty="0"/>
+              <a:t>Performance Evaluation</a:t>
+            </a:r>
+          </a:p>
+          <a:p>
+            <a:pPr marL="342900" indent="-342900">
+              <a:buFont typeface="Arial" panose="020B0604020202020204" pitchFamily="34" charset="0"/>
+              <a:buChar char="•"/>
+            </a:pPr>
+            <a:r>
+              <a:rPr lang="en-US" dirty="0"/>
+              <a:t>Significance of Proposed Research</a:t>
+            </a:r>
+          </a:p>
+        </p:txBody>
+      </p:sp>
+      <p:sp>
+        <p:nvSpPr>
+          <p:cNvPr id="12" name="Title 11">
+            <a:extLst>
+              <a:ext uri="{FF2B5EF4-FFF2-40B4-BE49-F238E27FC236}">
+                <a16:creationId xmlns:a16="http://schemas.microsoft.com/office/drawing/2014/main" id="{2DD2AFE4-63BE-45E4-B15C-024DB8D8D5D6}"/>
+              </a:ext>
+            </a:extLst>
+          </p:cNvPr>
+          <p:cNvSpPr>
+            <a:spLocks noGrp="1"/>
+          </p:cNvSpPr>
+          <p:nvPr>
+            <p:ph type="title"/>
+          </p:nvPr>
+        </p:nvSpPr>
+        <p:spPr/>
+        <p:txBody>
+          <a:bodyPr/>
+          <a:lstStyle/>
+          <a:p>
+            <a:r>
+              <a:rPr lang="en-US" dirty="0"/>
+              <a:t>Agenda</a:t>
+            </a:r>
+          </a:p>
+        </p:txBody>
+      </p:sp>
+    </p:spTree>
+    <p:extLst>
+      <p:ext uri="{BB962C8B-B14F-4D97-AF65-F5344CB8AC3E}">
+        <p14:creationId xmlns:p14="http://schemas.microsoft.com/office/powerpoint/2010/main" val="2822485740"/>
+      </p:ext>
+    </p:extLst>
+  </p:cSld>
+  <p:clrMapOvr>
+    <a:masterClrMapping/>
+  </p:clrMapOvr>
+</p:sld>
+</file>
+
+<file path=ppt/slides/slide3.xml><?xml version="1.0" encoding="utf-8"?>
+<p:sld xmlns:a="http://schemas.openxmlformats.org/drawingml/2006/main" xmlns:r="http://schemas.openxmlformats.org/officeDocument/2006/relationships" xmlns:p="http://schemas.openxmlformats.org/presentationml/2006/main">
+  <p:cSld>
+    <p:spTree>
+      <p:nvGrpSpPr>
+        <p:cNvPr id="1" name=""/>
+        <p:cNvGrpSpPr/>
+        <p:nvPr/>
+      </p:nvGrpSpPr>
+      <p:grpSpPr>
+        <a:xfrm>
+          <a:off x="0" y="0"/>
+          <a:ext cx="0" cy="0"/>
+          <a:chOff x="0" y="0"/>
+          <a:chExt cx="0" cy="0"/>
+        </a:xfrm>
+      </p:grpSpPr>
+      <p:sp>
+        <p:nvSpPr>
+          <p:cNvPr id="13" name="Text Placeholder 12">
+            <a:extLst>
+              <a:ext uri="{FF2B5EF4-FFF2-40B4-BE49-F238E27FC236}">
+                <a16:creationId xmlns:a16="http://schemas.microsoft.com/office/drawing/2014/main" id="{03B27027-B59A-4E6B-B377-A7A8C7EF4555}"/>
+              </a:ext>
+            </a:extLst>
+          </p:cNvPr>
+          <p:cNvSpPr>
+            <a:spLocks noGrp="1"/>
+          </p:cNvSpPr>
+          <p:nvPr>
+            <p:ph type="body" sz="quarter" idx="16"/>
+          </p:nvPr>
+        </p:nvSpPr>
+        <p:spPr/>
+        <p:txBody>
+          <a:bodyPr/>
+          <a:lstStyle/>
+          <a:p>
+            <a:pPr marL="342900" indent="-342900">
+              <a:buFont typeface="Arial" panose="020B0604020202020204" pitchFamily="34" charset="0"/>
+              <a:buChar char="•"/>
+            </a:pPr>
+            <a:r>
+              <a:rPr lang="en-US" dirty="0"/>
+              <a:t>Wide Spectrum of Applications … </a:t>
+            </a:r>
+          </a:p>
+        </p:txBody>
+      </p:sp>
+      <p:sp>
+        <p:nvSpPr>
+          <p:cNvPr id="12" name="Title 11">
+            <a:extLst>
+              <a:ext uri="{FF2B5EF4-FFF2-40B4-BE49-F238E27FC236}">
+                <a16:creationId xmlns:a16="http://schemas.microsoft.com/office/drawing/2014/main" id="{2DD2AFE4-63BE-45E4-B15C-024DB8D8D5D6}"/>
+              </a:ext>
+            </a:extLst>
+          </p:cNvPr>
+          <p:cNvSpPr>
+            <a:spLocks noGrp="1"/>
+          </p:cNvSpPr>
+          <p:nvPr>
+            <p:ph type="title"/>
+          </p:nvPr>
+        </p:nvSpPr>
+        <p:spPr/>
+        <p:txBody>
+          <a:bodyPr/>
+          <a:lstStyle/>
+          <a:p>
+            <a:r>
+              <a:rPr lang="en-US" dirty="0"/>
+              <a:t>Introduction</a:t>
+            </a:r>
+          </a:p>
+        </p:txBody>
+      </p:sp>
+      <p:pic>
+        <p:nvPicPr>
+          <p:cNvPr id="23" name="Picture 22">
+            <a:extLst>
+              <a:ext uri="{FF2B5EF4-FFF2-40B4-BE49-F238E27FC236}">
+                <a16:creationId xmlns:a16="http://schemas.microsoft.com/office/drawing/2014/main" id="{5E4EE9F2-4C0F-4AB8-88B4-DD9F6149B7ED}"/>
+              </a:ext>
+            </a:extLst>
+          </p:cNvPr>
+          <p:cNvPicPr>
+            <a:picLocks noChangeAspect="1"/>
+          </p:cNvPicPr>
+          <p:nvPr/>
+        </p:nvPicPr>
+        <p:blipFill rotWithShape="1">
+          <a:blip r:embed="rId2" cstate="print">
+            <a:extLst>
+              <a:ext uri="{28A0092B-C50C-407E-A947-70E740481C1C}">
+                <a14:useLocalDpi xmlns:a14="http://schemas.microsoft.com/office/drawing/2010/main" val="0"/>
+              </a:ext>
+            </a:extLst>
+          </a:blip>
+          <a:srcRect t="29283" r="14386" b="11729"/>
+          <a:stretch/>
+        </p:blipFill>
+        <p:spPr>
+          <a:xfrm>
+            <a:off x="160602" y="2379898"/>
+            <a:ext cx="4635674" cy="1816274"/>
+          </a:xfrm>
+          <a:prstGeom prst="rect">
+            <a:avLst/>
+          </a:prstGeom>
+        </p:spPr>
+      </p:pic>
+      <p:sp>
+        <p:nvSpPr>
+          <p:cNvPr id="24" name="TextBox 23">
+            <a:extLst>
+              <a:ext uri="{FF2B5EF4-FFF2-40B4-BE49-F238E27FC236}">
+                <a16:creationId xmlns:a16="http://schemas.microsoft.com/office/drawing/2014/main" id="{6C09CC0B-8DAA-47CC-90B6-49B7666296A2}"/>
+              </a:ext>
+            </a:extLst>
+          </p:cNvPr>
+          <p:cNvSpPr txBox="1"/>
+          <p:nvPr/>
+        </p:nvSpPr>
+        <p:spPr>
+          <a:xfrm>
+            <a:off x="400557" y="4210365"/>
+            <a:ext cx="4150495" cy="253916"/>
+          </a:xfrm>
+          <a:prstGeom prst="rect">
+            <a:avLst/>
+          </a:prstGeom>
+          <a:noFill/>
+        </p:spPr>
+        <p:txBody>
+          <a:bodyPr wrap="none" rtlCol="0">
+            <a:spAutoFit/>
+          </a:bodyPr>
+          <a:lstStyle/>
+          <a:p>
+            <a:r>
+              <a:rPr lang="en-US" sz="1050" dirty="0">
+                <a:solidFill>
+                  <a:schemeClr val="bg1">
+                    <a:lumMod val="75000"/>
+                  </a:schemeClr>
+                </a:solidFill>
+              </a:rPr>
+              <a:t>https://www.amazon.com/Amazon-Prime-Air/b?node=8037720011</a:t>
+            </a:r>
+          </a:p>
+        </p:txBody>
+      </p:sp>
+      <p:pic>
+        <p:nvPicPr>
+          <p:cNvPr id="25" name="Picture 24">
+            <a:extLst>
+              <a:ext uri="{FF2B5EF4-FFF2-40B4-BE49-F238E27FC236}">
+                <a16:creationId xmlns:a16="http://schemas.microsoft.com/office/drawing/2014/main" id="{AB6173C3-6B14-4EA9-A228-FAB4895FB491}"/>
+              </a:ext>
+            </a:extLst>
+          </p:cNvPr>
+          <p:cNvPicPr>
+            <a:picLocks noChangeAspect="1"/>
+          </p:cNvPicPr>
+          <p:nvPr/>
+        </p:nvPicPr>
+        <p:blipFill rotWithShape="1">
+          <a:blip r:embed="rId3">
+            <a:extLst>
+              <a:ext uri="{28A0092B-C50C-407E-A947-70E740481C1C}">
+                <a14:useLocalDpi xmlns:a14="http://schemas.microsoft.com/office/drawing/2010/main" val="0"/>
+              </a:ext>
+            </a:extLst>
+          </a:blip>
+          <a:srcRect t="17203" b="10378"/>
+          <a:stretch/>
+        </p:blipFill>
+        <p:spPr>
+          <a:xfrm>
+            <a:off x="139589" y="4700573"/>
+            <a:ext cx="4260552" cy="1603332"/>
+          </a:xfrm>
+          <a:prstGeom prst="rect">
+            <a:avLst/>
+          </a:prstGeom>
+        </p:spPr>
+      </p:pic>
+      <p:sp>
+        <p:nvSpPr>
+          <p:cNvPr id="26" name="TextBox 25">
+            <a:extLst>
+              <a:ext uri="{FF2B5EF4-FFF2-40B4-BE49-F238E27FC236}">
+                <a16:creationId xmlns:a16="http://schemas.microsoft.com/office/drawing/2014/main" id="{FE625613-656D-43E7-81EB-617F1093B189}"/>
+              </a:ext>
+            </a:extLst>
+          </p:cNvPr>
+          <p:cNvSpPr txBox="1"/>
+          <p:nvPr/>
+        </p:nvSpPr>
+        <p:spPr>
+          <a:xfrm>
+            <a:off x="450296" y="6334780"/>
+            <a:ext cx="3950120" cy="253916"/>
+          </a:xfrm>
+          <a:prstGeom prst="rect">
+            <a:avLst/>
+          </a:prstGeom>
+          <a:noFill/>
+        </p:spPr>
+        <p:txBody>
+          <a:bodyPr wrap="none" rtlCol="0">
+            <a:spAutoFit/>
+          </a:bodyPr>
+          <a:lstStyle/>
+          <a:p>
+            <a:r>
+              <a:rPr lang="en-US" sz="1050" dirty="0">
+                <a:solidFill>
+                  <a:schemeClr val="bg1">
+                    <a:lumMod val="75000"/>
+                  </a:schemeClr>
+                </a:solidFill>
+              </a:rPr>
+              <a:t>http://www.dji.com/newsroom/news/tags/phantom-2-vision-plus</a:t>
+            </a:r>
+          </a:p>
+        </p:txBody>
+      </p:sp>
+      <p:pic>
+        <p:nvPicPr>
+          <p:cNvPr id="27" name="Picture 26">
+            <a:extLst>
+              <a:ext uri="{FF2B5EF4-FFF2-40B4-BE49-F238E27FC236}">
+                <a16:creationId xmlns:a16="http://schemas.microsoft.com/office/drawing/2014/main" id="{F381F757-E3CE-409B-99BC-91DE2BB38939}"/>
+              </a:ext>
+            </a:extLst>
+          </p:cNvPr>
+          <p:cNvPicPr>
+            <a:picLocks noChangeAspect="1"/>
+          </p:cNvPicPr>
+          <p:nvPr/>
+        </p:nvPicPr>
+        <p:blipFill rotWithShape="1">
+          <a:blip r:embed="rId4">
+            <a:extLst>
+              <a:ext uri="{28A0092B-C50C-407E-A947-70E740481C1C}">
+                <a14:useLocalDpi xmlns:a14="http://schemas.microsoft.com/office/drawing/2010/main" val="0"/>
+              </a:ext>
+            </a:extLst>
+          </a:blip>
+          <a:srcRect l="20129" t="25851" b="5988"/>
+          <a:stretch/>
+        </p:blipFill>
+        <p:spPr>
+          <a:xfrm>
+            <a:off x="4877945" y="2379897"/>
+            <a:ext cx="4124059" cy="1855113"/>
+          </a:xfrm>
+          <a:prstGeom prst="rect">
+            <a:avLst/>
+          </a:prstGeom>
+        </p:spPr>
+      </p:pic>
+      <p:sp>
+        <p:nvSpPr>
+          <p:cNvPr id="28" name="Rectangle 27">
+            <a:extLst>
+              <a:ext uri="{FF2B5EF4-FFF2-40B4-BE49-F238E27FC236}">
+                <a16:creationId xmlns:a16="http://schemas.microsoft.com/office/drawing/2014/main" id="{54DCCA1E-2CAA-41A8-A87B-8A4BF67A7C3B}"/>
+              </a:ext>
+            </a:extLst>
+          </p:cNvPr>
+          <p:cNvSpPr/>
+          <p:nvPr/>
+        </p:nvSpPr>
+        <p:spPr>
+          <a:xfrm>
+            <a:off x="4877945" y="4199898"/>
+            <a:ext cx="4124059" cy="415498"/>
+          </a:xfrm>
+          <a:prstGeom prst="rect">
+            <a:avLst/>
+          </a:prstGeom>
+        </p:spPr>
+        <p:txBody>
+          <a:bodyPr wrap="square">
+            <a:spAutoFit/>
+          </a:bodyPr>
+          <a:lstStyle/>
+          <a:p>
+            <a:pPr algn="ctr"/>
+            <a:r>
+              <a:rPr lang="en-US" sz="1050" dirty="0">
+                <a:solidFill>
+                  <a:schemeClr val="bg1">
+                    <a:lumMod val="75000"/>
+                  </a:schemeClr>
+                </a:solidFill>
+              </a:rPr>
+              <a:t>https://techcrunch.com/2016/08/11/teslas-autopilot-2-0-said-to-add-triple-camera-system-and-more-radar/</a:t>
+            </a:r>
+          </a:p>
+        </p:txBody>
+      </p:sp>
+      <p:pic>
+        <p:nvPicPr>
+          <p:cNvPr id="29" name="Picture 28">
+            <a:extLst>
+              <a:ext uri="{FF2B5EF4-FFF2-40B4-BE49-F238E27FC236}">
+                <a16:creationId xmlns:a16="http://schemas.microsoft.com/office/drawing/2014/main" id="{5DE502A1-8D0E-4ECA-823C-E5404F6B35A1}"/>
+              </a:ext>
+            </a:extLst>
+          </p:cNvPr>
+          <p:cNvPicPr>
+            <a:picLocks noChangeAspect="1"/>
+          </p:cNvPicPr>
+          <p:nvPr/>
+        </p:nvPicPr>
+        <p:blipFill>
+          <a:blip r:embed="rId5" cstate="print">
+            <a:extLst>
+              <a:ext uri="{28A0092B-C50C-407E-A947-70E740481C1C}">
+                <a14:useLocalDpi xmlns:a14="http://schemas.microsoft.com/office/drawing/2010/main" val="0"/>
+              </a:ext>
+            </a:extLst>
+          </a:blip>
+          <a:stretch>
+            <a:fillRect/>
+          </a:stretch>
+        </p:blipFill>
+        <p:spPr>
+          <a:xfrm>
+            <a:off x="4664865" y="4630980"/>
+            <a:ext cx="1637015" cy="1690802"/>
+          </a:xfrm>
+          <a:prstGeom prst="rect">
+            <a:avLst/>
+          </a:prstGeom>
+        </p:spPr>
+      </p:pic>
+      <p:sp>
+        <p:nvSpPr>
+          <p:cNvPr id="30" name="TextBox 29">
+            <a:extLst>
+              <a:ext uri="{FF2B5EF4-FFF2-40B4-BE49-F238E27FC236}">
+                <a16:creationId xmlns:a16="http://schemas.microsoft.com/office/drawing/2014/main" id="{CCE99E4C-F89B-41A6-9327-59A18E4B0D69}"/>
+              </a:ext>
+            </a:extLst>
+          </p:cNvPr>
+          <p:cNvSpPr txBox="1"/>
+          <p:nvPr/>
+        </p:nvSpPr>
+        <p:spPr>
+          <a:xfrm>
+            <a:off x="4596969" y="6304002"/>
+            <a:ext cx="1772806" cy="577081"/>
+          </a:xfrm>
+          <a:prstGeom prst="rect">
+            <a:avLst/>
+          </a:prstGeom>
+          <a:noFill/>
+        </p:spPr>
+        <p:txBody>
+          <a:bodyPr wrap="square" rtlCol="0">
+            <a:spAutoFit/>
+          </a:bodyPr>
+          <a:lstStyle/>
+          <a:p>
+            <a:pPr algn="ctr"/>
+            <a:r>
+              <a:rPr lang="en-US" sz="1050" dirty="0">
+                <a:solidFill>
+                  <a:schemeClr val="bg1">
+                    <a:lumMod val="75000"/>
+                  </a:schemeClr>
+                </a:solidFill>
+              </a:rPr>
+              <a:t>http://www.datixinc.com/will-robot-job-2050/bot-and-dolly-scout/</a:t>
+            </a:r>
+          </a:p>
+        </p:txBody>
+      </p:sp>
+      <p:pic>
+        <p:nvPicPr>
+          <p:cNvPr id="31" name="Picture 30">
+            <a:extLst>
+              <a:ext uri="{FF2B5EF4-FFF2-40B4-BE49-F238E27FC236}">
+                <a16:creationId xmlns:a16="http://schemas.microsoft.com/office/drawing/2014/main" id="{BFAD2367-61DB-4BFE-AA99-1D8C180AD4C5}"/>
+              </a:ext>
+            </a:extLst>
+          </p:cNvPr>
+          <p:cNvPicPr>
+            <a:picLocks noChangeAspect="1"/>
+          </p:cNvPicPr>
+          <p:nvPr/>
+        </p:nvPicPr>
+        <p:blipFill rotWithShape="1">
+          <a:blip r:embed="rId6">
+            <a:extLst>
+              <a:ext uri="{28A0092B-C50C-407E-A947-70E740481C1C}">
+                <a14:useLocalDpi xmlns:a14="http://schemas.microsoft.com/office/drawing/2010/main" val="0"/>
+              </a:ext>
+            </a:extLst>
+          </a:blip>
+          <a:srcRect l="18146" r="22253"/>
+          <a:stretch/>
+        </p:blipFill>
+        <p:spPr>
+          <a:xfrm>
+            <a:off x="6718495" y="4656760"/>
+            <a:ext cx="2047741" cy="1690957"/>
+          </a:xfrm>
+          <a:prstGeom prst="rect">
+            <a:avLst/>
+          </a:prstGeom>
+        </p:spPr>
+      </p:pic>
+      <p:sp>
+        <p:nvSpPr>
+          <p:cNvPr id="32" name="Rectangle 31">
+            <a:extLst>
+              <a:ext uri="{FF2B5EF4-FFF2-40B4-BE49-F238E27FC236}">
+                <a16:creationId xmlns:a16="http://schemas.microsoft.com/office/drawing/2014/main" id="{308E44D6-887B-4367-BEF7-92CF2D64C267}"/>
+              </a:ext>
+            </a:extLst>
+          </p:cNvPr>
+          <p:cNvSpPr/>
+          <p:nvPr/>
+        </p:nvSpPr>
+        <p:spPr>
+          <a:xfrm>
+            <a:off x="6718495" y="6347717"/>
+            <a:ext cx="2047741" cy="415498"/>
+          </a:xfrm>
+          <a:prstGeom prst="rect">
+            <a:avLst/>
+          </a:prstGeom>
+        </p:spPr>
+        <p:txBody>
+          <a:bodyPr wrap="square">
+            <a:spAutoFit/>
+          </a:bodyPr>
+          <a:lstStyle/>
+          <a:p>
+            <a:pPr algn="ctr"/>
+            <a:r>
+              <a:rPr lang="en-US" sz="1050" dirty="0">
+                <a:solidFill>
+                  <a:schemeClr val="bg1">
+                    <a:lumMod val="75000"/>
+                  </a:schemeClr>
+                </a:solidFill>
+              </a:rPr>
+              <a:t>https://www.ald.softbankrobotics.com/en/cool-robots/nao</a:t>
+            </a:r>
+          </a:p>
+        </p:txBody>
+      </p:sp>
+    </p:spTree>
+    <p:extLst>
+      <p:ext uri="{BB962C8B-B14F-4D97-AF65-F5344CB8AC3E}">
+        <p14:creationId xmlns:p14="http://schemas.microsoft.com/office/powerpoint/2010/main" val="2538341258"/>
+      </p:ext>
+    </p:extLst>
+  </p:cSld>
+  <p:clrMapOvr>
+    <a:masterClrMapping/>
+  </p:clrMapOvr>
+</p:sld>
+</file>
+
+<file path=ppt/slides/slide4.xml><?xml version="1.0" encoding="utf-8"?>
+<p:sld xmlns:a="http://schemas.openxmlformats.org/drawingml/2006/main" xmlns:r="http://schemas.openxmlformats.org/officeDocument/2006/relationships" xmlns:p="http://schemas.openxmlformats.org/presentationml/2006/main">
+  <p:cSld>
+    <p:spTree>
+      <p:nvGrpSpPr>
+        <p:cNvPr id="1" name=""/>
+        <p:cNvGrpSpPr/>
+        <p:nvPr/>
+      </p:nvGrpSpPr>
+      <p:grpSpPr>
+        <a:xfrm>
+          <a:off x="0" y="0"/>
+          <a:ext cx="0" cy="0"/>
+          <a:chOff x="0" y="0"/>
+          <a:chExt cx="0" cy="0"/>
+        </a:xfrm>
+      </p:grpSpPr>
+      <p:sp>
+        <p:nvSpPr>
+          <p:cNvPr id="13" name="Text Placeholder 12">
+            <a:extLst>
+              <a:ext uri="{FF2B5EF4-FFF2-40B4-BE49-F238E27FC236}">
+                <a16:creationId xmlns:a16="http://schemas.microsoft.com/office/drawing/2014/main" id="{03B27027-B59A-4E6B-B377-A7A8C7EF4555}"/>
+              </a:ext>
+            </a:extLst>
+          </p:cNvPr>
+          <p:cNvSpPr>
+            <a:spLocks noGrp="1"/>
+          </p:cNvSpPr>
+          <p:nvPr>
+            <p:ph type="body" sz="quarter" idx="16"/>
+          </p:nvPr>
+        </p:nvSpPr>
+        <p:spPr/>
+        <p:txBody>
+          <a:bodyPr/>
+          <a:lstStyle/>
+          <a:p>
+            <a:pPr marL="342900" indent="-342900">
+              <a:buFont typeface="Arial" panose="020B0604020202020204" pitchFamily="34" charset="0"/>
+              <a:buChar char="•"/>
+            </a:pPr>
+            <a:endParaRPr lang="en-US" dirty="0"/>
+          </a:p>
+          <a:p>
+            <a:pPr marL="342900" indent="-342900">
+              <a:buFont typeface="Arial" panose="020B0604020202020204" pitchFamily="34" charset="0"/>
+              <a:buChar char="•"/>
+            </a:pPr>
+            <a:endParaRPr lang="en-US" dirty="0"/>
+          </a:p>
+        </p:txBody>
+      </p:sp>
+      <p:sp>
+        <p:nvSpPr>
+          <p:cNvPr id="12" name="Title 11">
+            <a:extLst>
+              <a:ext uri="{FF2B5EF4-FFF2-40B4-BE49-F238E27FC236}">
+                <a16:creationId xmlns:a16="http://schemas.microsoft.com/office/drawing/2014/main" id="{2DD2AFE4-63BE-45E4-B15C-024DB8D8D5D6}"/>
+              </a:ext>
+            </a:extLst>
+          </p:cNvPr>
+          <p:cNvSpPr>
+            <a:spLocks noGrp="1"/>
+          </p:cNvSpPr>
+          <p:nvPr>
+            <p:ph type="title"/>
+          </p:nvPr>
+        </p:nvSpPr>
+        <p:spPr/>
+        <p:txBody>
+          <a:bodyPr/>
+          <a:lstStyle/>
+          <a:p>
+            <a:r>
+              <a:rPr lang="en-US" dirty="0"/>
+              <a:t>Introduction</a:t>
+            </a:r>
+          </a:p>
+        </p:txBody>
+      </p:sp>
+      <p:sp>
+        <p:nvSpPr>
+          <p:cNvPr id="7" name="Text Placeholder 12">
+            <a:extLst>
+              <a:ext uri="{FF2B5EF4-FFF2-40B4-BE49-F238E27FC236}">
+                <a16:creationId xmlns:a16="http://schemas.microsoft.com/office/drawing/2014/main" id="{B256B702-FF2B-4559-A27C-55D3DB9BA0F4}"/>
+              </a:ext>
+            </a:extLst>
+          </p:cNvPr>
+          <p:cNvSpPr txBox="1">
+            <a:spLocks/>
+          </p:cNvSpPr>
+          <p:nvPr/>
+        </p:nvSpPr>
+        <p:spPr>
+          <a:xfrm>
+            <a:off x="814388" y="1608667"/>
+            <a:ext cx="7562850" cy="4664363"/>
+          </a:xfrm>
+          <a:prstGeom prst="rect">
+            <a:avLst/>
+          </a:prstGeom>
+        </p:spPr>
+        <p:txBody>
+          <a:bodyPr vert="horz"/>
+          <a:lstStyle>
+            <a:lvl1pPr marL="0" indent="0" algn="l" defTabSz="457200" rtl="0" eaLnBrk="1" fontAlgn="base" hangingPunct="1">
+              <a:spcBef>
+                <a:spcPts val="1200"/>
+              </a:spcBef>
+              <a:spcAft>
+                <a:spcPts val="600"/>
+              </a:spcAft>
+              <a:buFont typeface="Arial" panose="020B0604020202020204" pitchFamily="34" charset="0"/>
+              <a:buNone/>
+              <a:tabLst>
+                <a:tab pos="230188" algn="l"/>
+              </a:tabLst>
+              <a:defRPr sz="2000" b="1" kern="1200">
+                <a:solidFill>
+                  <a:schemeClr val="tx1"/>
+                </a:solidFill>
+                <a:latin typeface="+mn-lt"/>
+                <a:ea typeface="ＭＳ Ｐゴシック" charset="0"/>
+                <a:cs typeface="Geneva" charset="0"/>
+              </a:defRPr>
+            </a:lvl1pPr>
+            <a:lvl2pPr marL="3175" indent="0" algn="l" defTabSz="457200" rtl="0" eaLnBrk="1" fontAlgn="base" hangingPunct="1">
+              <a:spcBef>
+                <a:spcPts val="0"/>
+              </a:spcBef>
+              <a:spcAft>
+                <a:spcPts val="1200"/>
+              </a:spcAft>
+              <a:buFont typeface="Arial" panose="020B0604020202020204" pitchFamily="34" charset="0"/>
+              <a:buNone/>
+              <a:defRPr sz="1800" b="1" kern="1200">
+                <a:solidFill>
+                  <a:schemeClr val="tx1"/>
+                </a:solidFill>
+                <a:latin typeface="+mn-lt"/>
+                <a:ea typeface="Geneva" charset="0"/>
+                <a:cs typeface="Geneva" charset="0"/>
+              </a:defRPr>
+            </a:lvl2pPr>
+            <a:lvl3pPr marL="228600" indent="-228600" algn="l" defTabSz="457200" rtl="0" eaLnBrk="1" fontAlgn="base" hangingPunct="1">
+              <a:spcBef>
+                <a:spcPct val="20000"/>
+              </a:spcBef>
+              <a:spcAft>
+                <a:spcPct val="0"/>
+              </a:spcAft>
+              <a:buFont typeface="Arial" panose="020B0604020202020204" pitchFamily="34" charset="0"/>
+              <a:buChar char="•"/>
+              <a:defRPr sz="1800" kern="1200">
+                <a:solidFill>
+                  <a:schemeClr val="tx1"/>
+                </a:solidFill>
+                <a:latin typeface="+mn-lt"/>
+                <a:ea typeface="Geneva" charset="0"/>
+                <a:cs typeface="Geneva" charset="0"/>
+              </a:defRPr>
+            </a:lvl3pPr>
+            <a:lvl4pPr marL="514350" indent="-230188" algn="l" defTabSz="457200" rtl="0" eaLnBrk="1" fontAlgn="base" hangingPunct="1">
+              <a:spcBef>
+                <a:spcPct val="20000"/>
+              </a:spcBef>
+              <a:spcAft>
+                <a:spcPct val="0"/>
+              </a:spcAft>
+              <a:buFont typeface="Lucida Grande"/>
+              <a:buChar char="-"/>
+              <a:tabLst/>
+              <a:defRPr sz="1800" kern="1200">
+                <a:solidFill>
+                  <a:schemeClr val="tx1"/>
+                </a:solidFill>
+                <a:latin typeface="+mn-lt"/>
+                <a:ea typeface="Geneva" charset="0"/>
+                <a:cs typeface="Geneva" charset="0"/>
+              </a:defRPr>
+            </a:lvl4pPr>
+            <a:lvl5pPr marL="747713" indent="-228600" algn="l" defTabSz="457200" rtl="0" eaLnBrk="1" fontAlgn="base" hangingPunct="1">
+              <a:spcBef>
+                <a:spcPct val="20000"/>
+              </a:spcBef>
+              <a:spcAft>
+                <a:spcPct val="0"/>
+              </a:spcAft>
+              <a:buFont typeface="Lucida Grande"/>
+              <a:buChar char="·"/>
+              <a:defRPr sz="1800" kern="1200">
+                <a:solidFill>
+                  <a:schemeClr val="tx1"/>
+                </a:solidFill>
+                <a:latin typeface="+mn-lt"/>
+                <a:ea typeface="Geneva" charset="0"/>
+                <a:cs typeface="Geneva" charset="0"/>
+              </a:defRPr>
+            </a:lvl5pPr>
+            <a:lvl6pPr marL="2514600" indent="-228600" algn="l" defTabSz="457200" rtl="0" eaLnBrk="1" latinLnBrk="0" hangingPunct="1">
+              <a:spcBef>
+                <a:spcPct val="20000"/>
+              </a:spcBef>
+              <a:buFont typeface="Arial"/>
+              <a:buChar char="•"/>
+              <a:defRPr sz="2000" kern="1200">
+                <a:solidFill>
+                  <a:schemeClr val="tx1"/>
+                </a:solidFill>
+                <a:latin typeface="+mn-lt"/>
+                <a:ea typeface="+mn-ea"/>
+                <a:cs typeface="+mn-cs"/>
+              </a:defRPr>
+            </a:lvl6pPr>
+            <a:lvl7pPr marL="2971800" indent="-228600" algn="l" defTabSz="457200" rtl="0" eaLnBrk="1" latinLnBrk="0" hangingPunct="1">
+              <a:spcBef>
+                <a:spcPct val="20000"/>
+              </a:spcBef>
+              <a:buFont typeface="Arial"/>
+              <a:buChar char="•"/>
+              <a:defRPr sz="2000" kern="1200">
+                <a:solidFill>
+                  <a:schemeClr val="tx1"/>
+                </a:solidFill>
+                <a:latin typeface="+mn-lt"/>
+                <a:ea typeface="+mn-ea"/>
+                <a:cs typeface="+mn-cs"/>
+              </a:defRPr>
+            </a:lvl7pPr>
+            <a:lvl8pPr marL="3429000" indent="-228600" algn="l" defTabSz="457200" rtl="0" eaLnBrk="1" latinLnBrk="0" hangingPunct="1">
+              <a:spcBef>
+                <a:spcPct val="20000"/>
+              </a:spcBef>
+              <a:buFont typeface="Arial"/>
+              <a:buChar char="•"/>
+              <a:defRPr sz="2000" kern="1200">
+                <a:solidFill>
+                  <a:schemeClr val="tx1"/>
+                </a:solidFill>
+                <a:latin typeface="+mn-lt"/>
+                <a:ea typeface="+mn-ea"/>
+                <a:cs typeface="+mn-cs"/>
+              </a:defRPr>
+            </a:lvl8pPr>
+            <a:lvl9pPr marL="3886200" indent="-228600" algn="l" defTabSz="457200" rtl="0" eaLnBrk="1" latinLnBrk="0" hangingPunct="1">
+              <a:spcBef>
+                <a:spcPct val="20000"/>
+              </a:spcBef>
+              <a:buFont typeface="Arial"/>
+              <a:buChar char="•"/>
+              <a:defRPr sz="2000" kern="1200">
+                <a:solidFill>
+                  <a:schemeClr val="tx1"/>
+                </a:solidFill>
+                <a:latin typeface="+mn-lt"/>
+                <a:ea typeface="+mn-ea"/>
+                <a:cs typeface="+mn-cs"/>
+              </a:defRPr>
+            </a:lvl9pPr>
+          </a:lstStyle>
+          <a:p>
+            <a:pPr marL="342900" indent="-342900">
+              <a:buFont typeface="Arial" panose="020B0604020202020204" pitchFamily="34" charset="0"/>
+              <a:buChar char="•"/>
+            </a:pPr>
+            <a:r>
+              <a:rPr lang="en-US" dirty="0"/>
+              <a:t>Wide spectrum of applications in many industries and disciplines </a:t>
+            </a:r>
+            <a:r>
+              <a:rPr lang="en-US" dirty="0">
+                <a:solidFill>
+                  <a:srgbClr val="00B050"/>
+                </a:solidFill>
+              </a:rPr>
+              <a:t>sharing the similar needs in terms of perception</a:t>
+            </a:r>
+            <a:r>
+              <a:rPr lang="en-US" dirty="0"/>
+              <a:t> of the world. </a:t>
+            </a:r>
+          </a:p>
+          <a:p>
+            <a:pPr marL="342900" indent="-342900">
+              <a:buFont typeface="Arial" panose="020B0604020202020204" pitchFamily="34" charset="0"/>
+              <a:buChar char="•"/>
+            </a:pPr>
+            <a:endParaRPr lang="en-US" dirty="0"/>
+          </a:p>
+          <a:p>
+            <a:pPr marL="342900" indent="-342900">
+              <a:buFont typeface="Arial" panose="020B0604020202020204" pitchFamily="34" charset="0"/>
+              <a:buChar char="•"/>
+            </a:pPr>
+            <a:r>
+              <a:rPr lang="en-US" dirty="0">
+                <a:solidFill>
+                  <a:srgbClr val="00B050"/>
+                </a:solidFill>
+              </a:rPr>
+              <a:t>Perception</a:t>
+            </a:r>
+            <a:r>
+              <a:rPr lang="en-US" dirty="0"/>
+              <a:t> of the world became possible and feasible by the introduction of different types of </a:t>
+            </a:r>
+            <a:r>
+              <a:rPr lang="en-US" dirty="0">
+                <a:solidFill>
+                  <a:srgbClr val="00B050"/>
+                </a:solidFill>
+              </a:rPr>
+              <a:t>low-cost sensors </a:t>
+            </a:r>
+            <a:r>
+              <a:rPr lang="en-US" dirty="0"/>
+              <a:t>such as :</a:t>
+            </a:r>
+          </a:p>
+          <a:p>
+            <a:pPr marL="682625" lvl="1" indent="-342900">
+              <a:buFont typeface="Arial" panose="020B0604020202020204" pitchFamily="34" charset="0"/>
+              <a:buChar char="•"/>
+            </a:pPr>
+            <a:r>
+              <a:rPr lang="en-US" b="0" dirty="0"/>
+              <a:t>Cameras, </a:t>
+            </a:r>
+            <a:r>
+              <a:rPr lang="en-US" b="0" dirty="0" err="1"/>
+              <a:t>LiDARs</a:t>
+            </a:r>
+            <a:r>
+              <a:rPr lang="en-US" b="0" dirty="0"/>
+              <a:t>, Radars, IMUs, GPS, among many others</a:t>
+            </a:r>
+          </a:p>
+        </p:txBody>
+      </p:sp>
+    </p:spTree>
+    <p:extLst>
+      <p:ext uri="{BB962C8B-B14F-4D97-AF65-F5344CB8AC3E}">
+        <p14:creationId xmlns:p14="http://schemas.microsoft.com/office/powerpoint/2010/main" val="3490201183"/>
+      </p:ext>
+    </p:extLst>
+  </p:cSld>
+  <p:clrMapOvr>
+    <a:masterClrMapping/>
+  </p:clrMapOvr>
+</p:sld>
+</file>
+
+<file path=ppt/slides/slide5.xml><?xml version="1.0" encoding="utf-8"?>
+<p:sld xmlns:a="http://schemas.openxmlformats.org/drawingml/2006/main" xmlns:r="http://schemas.openxmlformats.org/officeDocument/2006/relationships" xmlns:p="http://schemas.openxmlformats.org/presentationml/2006/main">
+  <p:cSld>
+    <p:spTree>
+      <p:nvGrpSpPr>
+        <p:cNvPr id="1" name=""/>
+        <p:cNvGrpSpPr/>
+        <p:nvPr/>
+      </p:nvGrpSpPr>
+      <p:grpSpPr>
+        <a:xfrm>
+          <a:off x="0" y="0"/>
+          <a:ext cx="0" cy="0"/>
+          <a:chOff x="0" y="0"/>
+          <a:chExt cx="0" cy="0"/>
+        </a:xfrm>
+      </p:grpSpPr>
+      <p:sp>
+        <p:nvSpPr>
+          <p:cNvPr id="13" name="Text Placeholder 12">
+            <a:extLst>
+              <a:ext uri="{FF2B5EF4-FFF2-40B4-BE49-F238E27FC236}">
+                <a16:creationId xmlns:a16="http://schemas.microsoft.com/office/drawing/2014/main" id="{03B27027-B59A-4E6B-B377-A7A8C7EF4555}"/>
+              </a:ext>
+            </a:extLst>
+          </p:cNvPr>
+          <p:cNvSpPr>
+            <a:spLocks noGrp="1"/>
+          </p:cNvSpPr>
+          <p:nvPr>
+            <p:ph type="body" sz="quarter" idx="16"/>
+          </p:nvPr>
+        </p:nvSpPr>
+        <p:spPr/>
+        <p:txBody>
+          <a:bodyPr/>
+          <a:lstStyle/>
+          <a:p>
+            <a:pPr marL="342900" indent="-342900">
+              <a:buFont typeface="Arial" panose="020B0604020202020204" pitchFamily="34" charset="0"/>
+              <a:buChar char="•"/>
+            </a:pPr>
+            <a:r>
+              <a:rPr lang="en-US" dirty="0"/>
+              <a:t>Autonomous robotics are playing a vital role in all aspects of our lives and communities. </a:t>
+            </a:r>
+          </a:p>
+          <a:p>
+            <a:pPr marL="342900" indent="-342900">
+              <a:buFont typeface="Arial" panose="020B0604020202020204" pitchFamily="34" charset="0"/>
+              <a:buChar char="•"/>
+            </a:pPr>
+            <a:r>
+              <a:rPr lang="en-US" dirty="0"/>
+              <a:t>The ability of the robot to have </a:t>
+            </a:r>
+            <a:r>
+              <a:rPr lang="en-US" dirty="0">
+                <a:solidFill>
+                  <a:srgbClr val="00B050"/>
+                </a:solidFill>
+              </a:rPr>
+              <a:t>accurate perception </a:t>
+            </a:r>
+            <a:r>
+              <a:rPr lang="en-US" dirty="0"/>
+              <a:t>of the </a:t>
+            </a:r>
+            <a:r>
+              <a:rPr lang="en-US" dirty="0">
+                <a:solidFill>
+                  <a:srgbClr val="00B050"/>
+                </a:solidFill>
+              </a:rPr>
+              <a:t>surroundings</a:t>
+            </a:r>
+            <a:r>
+              <a:rPr lang="en-US" dirty="0"/>
+              <a:t> and sense of </a:t>
+            </a:r>
+            <a:r>
+              <a:rPr lang="en-US" dirty="0">
+                <a:solidFill>
+                  <a:srgbClr val="00B050"/>
+                </a:solidFill>
+              </a:rPr>
+              <a:t>location</a:t>
+            </a:r>
+            <a:r>
+              <a:rPr lang="en-US" dirty="0"/>
+              <a:t> is essential. </a:t>
+            </a:r>
+          </a:p>
+          <a:p>
+            <a:pPr marL="342900" indent="-342900">
+              <a:buFont typeface="Arial" panose="020B0604020202020204" pitchFamily="34" charset="0"/>
+              <a:buChar char="•"/>
+            </a:pPr>
+            <a:r>
+              <a:rPr lang="en-US" dirty="0">
+                <a:solidFill>
+                  <a:srgbClr val="00B050"/>
+                </a:solidFill>
+              </a:rPr>
+              <a:t>SLAM</a:t>
+            </a:r>
+            <a:r>
+              <a:rPr lang="en-US" dirty="0"/>
+              <a:t> was the answer to both question, as it provides a model of the environment, and localize the robot inside it.</a:t>
+            </a:r>
+          </a:p>
+          <a:p>
+            <a:pPr marL="342900" indent="-342900">
+              <a:buFont typeface="Arial" panose="020B0604020202020204" pitchFamily="34" charset="0"/>
+              <a:buChar char="•"/>
+            </a:pPr>
+            <a:endParaRPr lang="en-US" dirty="0"/>
+          </a:p>
+          <a:p>
+            <a:pPr marL="342900" indent="-342900">
+              <a:buFont typeface="Arial" panose="020B0604020202020204" pitchFamily="34" charset="0"/>
+              <a:buChar char="•"/>
+            </a:pPr>
+            <a:endParaRPr lang="en-US" dirty="0"/>
+          </a:p>
+        </p:txBody>
+      </p:sp>
+      <p:sp>
+        <p:nvSpPr>
+          <p:cNvPr id="12" name="Title 11">
+            <a:extLst>
+              <a:ext uri="{FF2B5EF4-FFF2-40B4-BE49-F238E27FC236}">
+                <a16:creationId xmlns:a16="http://schemas.microsoft.com/office/drawing/2014/main" id="{2DD2AFE4-63BE-45E4-B15C-024DB8D8D5D6}"/>
+              </a:ext>
+            </a:extLst>
+          </p:cNvPr>
+          <p:cNvSpPr>
+            <a:spLocks noGrp="1"/>
+          </p:cNvSpPr>
+          <p:nvPr>
+            <p:ph type="title"/>
+          </p:nvPr>
+        </p:nvSpPr>
+        <p:spPr/>
+        <p:txBody>
+          <a:bodyPr/>
+          <a:lstStyle/>
+          <a:p>
+            <a:r>
+              <a:rPr lang="en-US" dirty="0"/>
+              <a:t>Problem Definition</a:t>
+            </a:r>
+          </a:p>
+        </p:txBody>
+      </p:sp>
+      <p:pic>
+        <p:nvPicPr>
+          <p:cNvPr id="3" name="Picture 2">
+            <a:extLst>
+              <a:ext uri="{FF2B5EF4-FFF2-40B4-BE49-F238E27FC236}">
+                <a16:creationId xmlns:a16="http://schemas.microsoft.com/office/drawing/2014/main" id="{7D519AF9-8D2C-4EB4-9B2C-1F3F66F18A1D}"/>
+              </a:ext>
+            </a:extLst>
+          </p:cNvPr>
+          <p:cNvPicPr>
+            <a:picLocks noChangeAspect="1"/>
+          </p:cNvPicPr>
+          <p:nvPr/>
+        </p:nvPicPr>
+        <p:blipFill rotWithShape="1">
+          <a:blip r:embed="rId2"/>
+          <a:srcRect b="37187"/>
+          <a:stretch/>
+        </p:blipFill>
+        <p:spPr>
+          <a:xfrm>
+            <a:off x="2758926" y="4215611"/>
+            <a:ext cx="3626147" cy="2277695"/>
+          </a:xfrm>
+          <a:prstGeom prst="rect">
+            <a:avLst/>
+          </a:prstGeom>
+        </p:spPr>
+      </p:pic>
+      <p:sp>
+        <p:nvSpPr>
+          <p:cNvPr id="4" name="Rectangle 3">
+            <a:extLst>
+              <a:ext uri="{FF2B5EF4-FFF2-40B4-BE49-F238E27FC236}">
+                <a16:creationId xmlns:a16="http://schemas.microsoft.com/office/drawing/2014/main" id="{113E2864-22EC-4B62-B5EA-5737236A0885}"/>
+              </a:ext>
+            </a:extLst>
+          </p:cNvPr>
+          <p:cNvSpPr/>
+          <p:nvPr/>
+        </p:nvSpPr>
+        <p:spPr>
+          <a:xfrm>
+            <a:off x="2285999" y="6493306"/>
+            <a:ext cx="4572000" cy="253916"/>
+          </a:xfrm>
+          <a:prstGeom prst="rect">
+            <a:avLst/>
+          </a:prstGeom>
+        </p:spPr>
+        <p:txBody>
+          <a:bodyPr>
+            <a:spAutoFit/>
+          </a:bodyPr>
+          <a:lstStyle/>
+          <a:p>
+            <a:r>
+              <a:rPr lang="en-US" sz="1050" dirty="0">
+                <a:solidFill>
+                  <a:schemeClr val="bg1">
+                    <a:lumMod val="75000"/>
+                  </a:schemeClr>
+                </a:solidFill>
+                <a:hlinkClick r:id="rId3">
+                  <a:extLst>
+                    <a:ext uri="{A12FA001-AC4F-418D-AE19-62706E023703}">
+                      <ahyp:hlinkClr xmlns:ahyp="http://schemas.microsoft.com/office/drawing/2018/hyperlinkcolor" val="tx"/>
+                    </a:ext>
+                  </a:extLst>
+                </a:hlinkClick>
+              </a:rPr>
+              <a:t>https://paperswithcode.com/task/simultaneous-localization-and-mapping</a:t>
+            </a:r>
+            <a:endParaRPr lang="en-US" sz="1050" dirty="0">
+              <a:solidFill>
+                <a:schemeClr val="bg1">
+                  <a:lumMod val="75000"/>
+                </a:schemeClr>
+              </a:solidFill>
+            </a:endParaRPr>
+          </a:p>
+        </p:txBody>
+      </p:sp>
+    </p:spTree>
+    <p:extLst>
+      <p:ext uri="{BB962C8B-B14F-4D97-AF65-F5344CB8AC3E}">
+        <p14:creationId xmlns:p14="http://schemas.microsoft.com/office/powerpoint/2010/main" val="4153265438"/>
+      </p:ext>
+    </p:extLst>
+  </p:cSld>
+  <p:clrMapOvr>
+    <a:masterClrMapping/>
+  </p:clrMapOvr>
+</p:sld>
+</file>
+
+<file path=ppt/slides/slide6.xml><?xml version="1.0" encoding="utf-8"?>
+<p:sld xmlns:a="http://schemas.openxmlformats.org/drawingml/2006/main" xmlns:r="http://schemas.openxmlformats.org/officeDocument/2006/relationships" xmlns:p="http://schemas.openxmlformats.org/presentationml/2006/main">
+  <p:cSld>
+    <p:spTree>
+      <p:nvGrpSpPr>
+        <p:cNvPr id="1" name=""/>
+        <p:cNvGrpSpPr/>
+        <p:nvPr/>
+      </p:nvGrpSpPr>
+      <p:grpSpPr>
+        <a:xfrm>
+          <a:off x="0" y="0"/>
+          <a:ext cx="0" cy="0"/>
+          <a:chOff x="0" y="0"/>
+          <a:chExt cx="0" cy="0"/>
+        </a:xfrm>
+      </p:grpSpPr>
+      <p:sp>
+        <p:nvSpPr>
+          <p:cNvPr id="13" name="Text Placeholder 12">
+            <a:extLst>
+              <a:ext uri="{FF2B5EF4-FFF2-40B4-BE49-F238E27FC236}">
+                <a16:creationId xmlns:a16="http://schemas.microsoft.com/office/drawing/2014/main" id="{03B27027-B59A-4E6B-B377-A7A8C7EF4555}"/>
+              </a:ext>
+            </a:extLst>
+          </p:cNvPr>
+          <p:cNvSpPr>
+            <a:spLocks noGrp="1"/>
+          </p:cNvSpPr>
+          <p:nvPr>
+            <p:ph type="body" sz="quarter" idx="16"/>
+          </p:nvPr>
+        </p:nvSpPr>
+        <p:spPr/>
+        <p:txBody>
+          <a:bodyPr/>
+          <a:lstStyle/>
+          <a:p>
+            <a:pPr marL="342900" indent="-342900">
+              <a:buFont typeface="Arial" panose="020B0604020202020204" pitchFamily="34" charset="0"/>
+              <a:buChar char="•"/>
+            </a:pPr>
+            <a:r>
+              <a:rPr lang="en-US" dirty="0"/>
+              <a:t>Studies shown that, </a:t>
+            </a:r>
+            <a:r>
+              <a:rPr lang="en-US" dirty="0">
+                <a:solidFill>
+                  <a:srgbClr val="00B050"/>
+                </a:solidFill>
+              </a:rPr>
+              <a:t>RTAB-Map</a:t>
+            </a:r>
+            <a:r>
+              <a:rPr lang="en-US" dirty="0"/>
+              <a:t> and </a:t>
+            </a:r>
+            <a:r>
+              <a:rPr lang="en-US" dirty="0">
+                <a:solidFill>
+                  <a:srgbClr val="00B050"/>
+                </a:solidFill>
+              </a:rPr>
+              <a:t>ORB-SLAM 1&amp;2 </a:t>
+            </a:r>
+            <a:r>
+              <a:rPr lang="en-US" dirty="0"/>
+              <a:t>are two state-of-the-art algorithms solving the SLAM problem.</a:t>
+            </a:r>
+          </a:p>
+          <a:p>
+            <a:pPr marL="342900" indent="-342900">
+              <a:buFont typeface="Arial" panose="020B0604020202020204" pitchFamily="34" charset="0"/>
+              <a:buChar char="•"/>
+            </a:pPr>
+            <a:endParaRPr lang="en-US" dirty="0"/>
+          </a:p>
+          <a:p>
+            <a:pPr marL="342900" indent="-342900">
+              <a:buFont typeface="Arial" panose="020B0604020202020204" pitchFamily="34" charset="0"/>
+              <a:buChar char="•"/>
+            </a:pPr>
+            <a:r>
+              <a:rPr lang="en-US" dirty="0"/>
+              <a:t>Both algorithms </a:t>
+            </a:r>
+            <a:r>
+              <a:rPr lang="en-US" dirty="0">
+                <a:solidFill>
+                  <a:srgbClr val="00B050"/>
+                </a:solidFill>
+              </a:rPr>
+              <a:t>outperform</a:t>
+            </a:r>
+            <a:r>
+              <a:rPr lang="en-US" dirty="0"/>
+              <a:t> most of the classical and modern SLAM systems.</a:t>
+            </a:r>
+          </a:p>
+          <a:p>
+            <a:pPr marL="342900" indent="-342900">
+              <a:buFont typeface="Arial" panose="020B0604020202020204" pitchFamily="34" charset="0"/>
+              <a:buChar char="•"/>
+            </a:pPr>
+            <a:endParaRPr lang="en-US" dirty="0">
+              <a:solidFill>
+                <a:srgbClr val="FF0000"/>
+              </a:solidFill>
+            </a:endParaRPr>
+          </a:p>
+          <a:p>
+            <a:pPr marL="342900" indent="-342900">
+              <a:buFont typeface="Arial" panose="020B0604020202020204" pitchFamily="34" charset="0"/>
+              <a:buChar char="•"/>
+            </a:pPr>
+            <a:r>
+              <a:rPr lang="en-US" dirty="0">
+                <a:solidFill>
+                  <a:srgbClr val="FF0000"/>
+                </a:solidFill>
+              </a:rPr>
+              <a:t>However</a:t>
+            </a:r>
+            <a:r>
+              <a:rPr lang="en-US" dirty="0"/>
+              <a:t>, both suffer from performance issues under certain conditions and can provide </a:t>
+            </a:r>
+            <a:r>
+              <a:rPr lang="en-US" dirty="0">
+                <a:solidFill>
+                  <a:srgbClr val="FF0000"/>
+                </a:solidFill>
+              </a:rPr>
+              <a:t>wrong estimations</a:t>
+            </a:r>
+            <a:r>
+              <a:rPr lang="en-US" dirty="0"/>
+              <a:t> for both the trajectory and the mapping. </a:t>
+            </a:r>
+          </a:p>
+          <a:p>
+            <a:pPr marL="342900" indent="-342900">
+              <a:buFont typeface="Arial" panose="020B0604020202020204" pitchFamily="34" charset="0"/>
+              <a:buChar char="•"/>
+            </a:pPr>
+            <a:endParaRPr lang="en-US" dirty="0"/>
+          </a:p>
+        </p:txBody>
+      </p:sp>
+      <p:sp>
+        <p:nvSpPr>
+          <p:cNvPr id="12" name="Title 11">
+            <a:extLst>
+              <a:ext uri="{FF2B5EF4-FFF2-40B4-BE49-F238E27FC236}">
+                <a16:creationId xmlns:a16="http://schemas.microsoft.com/office/drawing/2014/main" id="{2DD2AFE4-63BE-45E4-B15C-024DB8D8D5D6}"/>
+              </a:ext>
+            </a:extLst>
+          </p:cNvPr>
+          <p:cNvSpPr>
+            <a:spLocks noGrp="1"/>
+          </p:cNvSpPr>
+          <p:nvPr>
+            <p:ph type="title"/>
+          </p:nvPr>
+        </p:nvSpPr>
+        <p:spPr/>
+        <p:txBody>
+          <a:bodyPr/>
+          <a:lstStyle/>
+          <a:p>
+            <a:r>
+              <a:rPr lang="en-US" dirty="0"/>
+              <a:t>Problem Definition</a:t>
+            </a:r>
+          </a:p>
+        </p:txBody>
+      </p:sp>
+    </p:spTree>
+    <p:extLst>
+      <p:ext uri="{BB962C8B-B14F-4D97-AF65-F5344CB8AC3E}">
+        <p14:creationId xmlns:p14="http://schemas.microsoft.com/office/powerpoint/2010/main" val="2636127668"/>
+      </p:ext>
+    </p:extLst>
+  </p:cSld>
+  <p:clrMapOvr>
+    <a:masterClrMapping/>
+  </p:clrMapOvr>
+</p:sld>
+</file>
+
+<file path=ppt/slides/slide7.xml><?xml version="1.0" encoding="utf-8"?>
+<p:sld xmlns:a="http://schemas.openxmlformats.org/drawingml/2006/main" xmlns:r="http://schemas.openxmlformats.org/officeDocument/2006/relationships" xmlns:p="http://schemas.openxmlformats.org/presentationml/2006/main">
+  <p:cSld>
+    <p:spTree>
+      <p:nvGrpSpPr>
+        <p:cNvPr id="1" name=""/>
+        <p:cNvGrpSpPr/>
+        <p:nvPr/>
+      </p:nvGrpSpPr>
+      <p:grpSpPr>
+        <a:xfrm>
+          <a:off x="0" y="0"/>
+          <a:ext cx="0" cy="0"/>
+          <a:chOff x="0" y="0"/>
+          <a:chExt cx="0" cy="0"/>
+        </a:xfrm>
+      </p:grpSpPr>
+      <p:sp>
+        <p:nvSpPr>
+          <p:cNvPr id="13" name="Text Placeholder 12">
+            <a:extLst>
+              <a:ext uri="{FF2B5EF4-FFF2-40B4-BE49-F238E27FC236}">
+                <a16:creationId xmlns:a16="http://schemas.microsoft.com/office/drawing/2014/main" id="{03B27027-B59A-4E6B-B377-A7A8C7EF4555}"/>
+              </a:ext>
+            </a:extLst>
+          </p:cNvPr>
+          <p:cNvSpPr>
+            <a:spLocks noGrp="1"/>
+          </p:cNvSpPr>
+          <p:nvPr>
+            <p:ph type="body" sz="quarter" idx="16"/>
+          </p:nvPr>
+        </p:nvSpPr>
+        <p:spPr/>
+        <p:txBody>
+          <a:bodyPr/>
+          <a:lstStyle/>
+          <a:p>
+            <a:pPr marL="342900" indent="-342900">
+              <a:buFont typeface="Arial" panose="020B0604020202020204" pitchFamily="34" charset="0"/>
+              <a:buChar char="•"/>
+            </a:pPr>
+            <a:r>
+              <a:rPr lang="en-US" dirty="0"/>
+              <a:t>Looking into the details of RTAB-Map and ORB-SLAM2, we can infer </a:t>
+            </a:r>
+            <a:r>
+              <a:rPr lang="en-US" dirty="0">
+                <a:solidFill>
+                  <a:srgbClr val="00B050"/>
+                </a:solidFill>
+              </a:rPr>
+              <a:t>potentials for Integration </a:t>
+            </a:r>
+            <a:r>
+              <a:rPr lang="en-US" dirty="0"/>
+              <a:t>for a more reliable solution.</a:t>
+            </a:r>
+          </a:p>
+          <a:p>
+            <a:pPr marL="347663" indent="-342900">
+              <a:buFont typeface="Arial" panose="020B0604020202020204" pitchFamily="34" charset="0"/>
+              <a:buChar char="•"/>
+            </a:pPr>
+            <a:endParaRPr lang="en-US" dirty="0"/>
+          </a:p>
+          <a:p>
+            <a:pPr marL="347663" indent="-342900">
+              <a:buFont typeface="Arial" panose="020B0604020202020204" pitchFamily="34" charset="0"/>
+              <a:buChar char="•"/>
+            </a:pPr>
+            <a:r>
+              <a:rPr lang="en-US" dirty="0"/>
+              <a:t>The original RTAB-Map pointed out the </a:t>
+            </a:r>
+            <a:r>
+              <a:rPr lang="en-US" dirty="0">
+                <a:solidFill>
+                  <a:srgbClr val="00B050"/>
+                </a:solidFill>
+              </a:rPr>
+              <a:t>possibility of integration and the performance gain </a:t>
+            </a:r>
+            <a:r>
+              <a:rPr lang="en-US" dirty="0"/>
+              <a:t>modestly. </a:t>
+            </a:r>
+          </a:p>
+          <a:p>
+            <a:pPr marL="347663" indent="-342900">
+              <a:buFont typeface="Arial" panose="020B0604020202020204" pitchFamily="34" charset="0"/>
+              <a:buChar char="•"/>
+            </a:pPr>
+            <a:endParaRPr lang="en-US" dirty="0"/>
+          </a:p>
+          <a:p>
+            <a:pPr marL="347663" indent="-342900">
+              <a:buFont typeface="Arial" panose="020B0604020202020204" pitchFamily="34" charset="0"/>
+              <a:buChar char="•"/>
+            </a:pPr>
+            <a:r>
+              <a:rPr lang="en-US" dirty="0"/>
+              <a:t>In this work, we explore the possibility of embedding the </a:t>
+            </a:r>
+            <a:r>
+              <a:rPr lang="en-US" dirty="0">
+                <a:solidFill>
+                  <a:srgbClr val="00B050"/>
+                </a:solidFill>
+              </a:rPr>
+              <a:t>depth information extracted from ORB-SLAM2 into RTAB-Map</a:t>
+            </a:r>
+            <a:r>
+              <a:rPr lang="en-US" dirty="0"/>
+              <a:t> for performance enhancement.</a:t>
+            </a:r>
+          </a:p>
+        </p:txBody>
+      </p:sp>
+      <p:sp>
+        <p:nvSpPr>
+          <p:cNvPr id="12" name="Title 11">
+            <a:extLst>
+              <a:ext uri="{FF2B5EF4-FFF2-40B4-BE49-F238E27FC236}">
+                <a16:creationId xmlns:a16="http://schemas.microsoft.com/office/drawing/2014/main" id="{2DD2AFE4-63BE-45E4-B15C-024DB8D8D5D6}"/>
+              </a:ext>
+            </a:extLst>
+          </p:cNvPr>
+          <p:cNvSpPr>
+            <a:spLocks noGrp="1"/>
+          </p:cNvSpPr>
+          <p:nvPr>
+            <p:ph type="title"/>
+          </p:nvPr>
+        </p:nvSpPr>
+        <p:spPr/>
+        <p:txBody>
+          <a:bodyPr/>
+          <a:lstStyle/>
+          <a:p>
+            <a:r>
+              <a:rPr lang="en-US" dirty="0"/>
+              <a:t>Problem Definition</a:t>
+            </a:r>
+          </a:p>
+        </p:txBody>
+      </p:sp>
+    </p:spTree>
+    <p:extLst>
+      <p:ext uri="{BB962C8B-B14F-4D97-AF65-F5344CB8AC3E}">
+        <p14:creationId xmlns:p14="http://schemas.microsoft.com/office/powerpoint/2010/main" val="2763257459"/>
+      </p:ext>
+    </p:extLst>
+  </p:cSld>
+  <p:clrMapOvr>
+    <a:masterClrMapping/>
+  </p:clrMapOvr>
+</p:sld>
+</file>
+
+<file path=ppt/slides/slide8.xml><?xml version="1.0" encoding="utf-8"?>
+<p:sld xmlns:a="http://schemas.openxmlformats.org/drawingml/2006/main" xmlns:r="http://schemas.openxmlformats.org/officeDocument/2006/relationships" xmlns:p="http://schemas.openxmlformats.org/presentationml/2006/main">
+  <p:cSld>
+    <p:spTree>
+      <p:nvGrpSpPr>
+        <p:cNvPr id="1" name=""/>
+        <p:cNvGrpSpPr/>
+        <p:nvPr/>
+      </p:nvGrpSpPr>
+      <p:grpSpPr>
+        <a:xfrm>
+          <a:off x="0" y="0"/>
+          <a:ext cx="0" cy="0"/>
+          <a:chOff x="0" y="0"/>
+          <a:chExt cx="0" cy="0"/>
+        </a:xfrm>
+      </p:grpSpPr>
+      <p:sp>
+        <p:nvSpPr>
+          <p:cNvPr id="13" name="Text Placeholder 12">
+            <a:extLst>
+              <a:ext uri="{FF2B5EF4-FFF2-40B4-BE49-F238E27FC236}">
+                <a16:creationId xmlns:a16="http://schemas.microsoft.com/office/drawing/2014/main" id="{03B27027-B59A-4E6B-B377-A7A8C7EF4555}"/>
+              </a:ext>
+            </a:extLst>
+          </p:cNvPr>
+          <p:cNvSpPr>
+            <a:spLocks noGrp="1"/>
+          </p:cNvSpPr>
+          <p:nvPr>
+            <p:ph type="body" sz="quarter" idx="16"/>
+          </p:nvPr>
+        </p:nvSpPr>
+        <p:spPr/>
+        <p:txBody>
+          <a:bodyPr/>
+          <a:lstStyle/>
+          <a:p>
+            <a:pPr marL="342900" indent="-342900">
+              <a:buFont typeface="Arial" panose="020B0604020202020204" pitchFamily="34" charset="0"/>
+              <a:buChar char="•"/>
+            </a:pPr>
+            <a:r>
+              <a:rPr lang="en-US" dirty="0"/>
+              <a:t>RTAB-Map</a:t>
+            </a:r>
+          </a:p>
+          <a:p>
+            <a:pPr marL="682625" lvl="1" indent="-342900">
+              <a:buFont typeface="Arial" panose="020B0604020202020204" pitchFamily="34" charset="0"/>
+              <a:buChar char="•"/>
+            </a:pPr>
+            <a:r>
+              <a:rPr lang="en-US" b="0" dirty="0"/>
+              <a:t>Open source graph-based SLAM, </a:t>
+            </a:r>
+            <a:r>
+              <a:rPr lang="en-US" b="0" dirty="0">
+                <a:solidFill>
+                  <a:srgbClr val="00B050"/>
+                </a:solidFill>
+              </a:rPr>
+              <a:t>deeply integrated to ROS</a:t>
+            </a:r>
+            <a:r>
+              <a:rPr lang="en-US" b="0" dirty="0"/>
+              <a:t>.</a:t>
+            </a:r>
+          </a:p>
+          <a:p>
+            <a:pPr marL="682625" lvl="1" indent="-342900">
+              <a:buFont typeface="Arial" panose="020B0604020202020204" pitchFamily="34" charset="0"/>
+              <a:buChar char="•"/>
+            </a:pPr>
+            <a:r>
+              <a:rPr lang="en-US" b="0" dirty="0">
+                <a:solidFill>
+                  <a:srgbClr val="00B050"/>
+                </a:solidFill>
+              </a:rPr>
+              <a:t>Mapping is separated </a:t>
+            </a:r>
+            <a:r>
+              <a:rPr lang="en-US" b="0" dirty="0"/>
+              <a:t>from Odometry for </a:t>
+            </a:r>
+            <a:r>
+              <a:rPr lang="en-US" b="0" dirty="0">
+                <a:solidFill>
+                  <a:srgbClr val="00B050"/>
+                </a:solidFill>
+              </a:rPr>
+              <a:t>efficiency</a:t>
+            </a:r>
+            <a:r>
+              <a:rPr lang="en-US" b="0" dirty="0"/>
+              <a:t>. </a:t>
+            </a:r>
+          </a:p>
+          <a:p>
+            <a:pPr marL="682625" lvl="1" indent="-342900">
+              <a:buFont typeface="Arial" panose="020B0604020202020204" pitchFamily="34" charset="0"/>
+              <a:buChar char="•"/>
+            </a:pPr>
+            <a:r>
+              <a:rPr lang="en-US" b="0" dirty="0"/>
+              <a:t>Map created directly from depth information </a:t>
+            </a:r>
+            <a:r>
+              <a:rPr lang="en-US" b="0" dirty="0">
+                <a:solidFill>
+                  <a:srgbClr val="FF0000"/>
+                </a:solidFill>
+              </a:rPr>
+              <a:t>without</a:t>
+            </a:r>
+            <a:r>
+              <a:rPr lang="en-US" b="0" dirty="0"/>
+              <a:t> optimization.</a:t>
+            </a:r>
+            <a:endParaRPr lang="en-US" dirty="0"/>
+          </a:p>
+          <a:p>
+            <a:pPr marL="342900" indent="-342900">
+              <a:buFont typeface="Arial" panose="020B0604020202020204" pitchFamily="34" charset="0"/>
+              <a:buChar char="•"/>
+            </a:pPr>
+            <a:r>
+              <a:rPr lang="en-US" dirty="0"/>
+              <a:t>ORB-SLAM</a:t>
+            </a:r>
+          </a:p>
+          <a:p>
+            <a:pPr marL="682625" lvl="1" indent="-342900">
+              <a:buFont typeface="Arial" panose="020B0604020202020204" pitchFamily="34" charset="0"/>
+              <a:buChar char="•"/>
+            </a:pPr>
+            <a:r>
+              <a:rPr lang="en-US" dirty="0"/>
+              <a:t>Ver. 1 </a:t>
+            </a:r>
+            <a:r>
+              <a:rPr lang="en-US" b="0" dirty="0">
+                <a:sym typeface="Wingdings" panose="05000000000000000000" pitchFamily="2" charset="2"/>
+              </a:rPr>
+              <a:t> Monocular only, while </a:t>
+            </a:r>
+            <a:r>
+              <a:rPr lang="en-US" dirty="0">
+                <a:sym typeface="Wingdings" panose="05000000000000000000" pitchFamily="2" charset="2"/>
+              </a:rPr>
+              <a:t>Ver. 2 </a:t>
+            </a:r>
+            <a:r>
+              <a:rPr lang="en-US" b="0" dirty="0">
+                <a:sym typeface="Wingdings" panose="05000000000000000000" pitchFamily="2" charset="2"/>
+              </a:rPr>
+              <a:t></a:t>
+            </a:r>
+            <a:r>
+              <a:rPr lang="en-US" b="0" dirty="0"/>
+              <a:t> Stereo and RGB-D</a:t>
+            </a:r>
+          </a:p>
+          <a:p>
+            <a:pPr marL="682625" lvl="1" indent="-342900">
+              <a:buFont typeface="Arial" panose="020B0604020202020204" pitchFamily="34" charset="0"/>
+              <a:buChar char="•"/>
+            </a:pPr>
+            <a:r>
+              <a:rPr lang="en-US" b="0" dirty="0"/>
+              <a:t>Optimization is done on camera poses and features points in the map </a:t>
+            </a:r>
+            <a:r>
+              <a:rPr lang="en-US" b="0" dirty="0">
+                <a:solidFill>
+                  <a:srgbClr val="00B050"/>
+                </a:solidFill>
+              </a:rPr>
+              <a:t>(two levels of optimization)</a:t>
+            </a:r>
+          </a:p>
+          <a:p>
+            <a:pPr marL="682625" lvl="1" indent="-342900">
+              <a:buFont typeface="Arial" panose="020B0604020202020204" pitchFamily="34" charset="0"/>
+              <a:buChar char="•"/>
+            </a:pPr>
+            <a:r>
+              <a:rPr lang="en-US" b="0" dirty="0">
+                <a:sym typeface="Wingdings" panose="05000000000000000000" pitchFamily="2" charset="2"/>
+              </a:rPr>
+              <a:t>ORB features are used in all stages (e.g. tracking, loop closure, ..)</a:t>
+            </a:r>
+          </a:p>
+          <a:p>
+            <a:pPr marL="682625" lvl="1" indent="-342900">
+              <a:buFont typeface="Arial" panose="020B0604020202020204" pitchFamily="34" charset="0"/>
+              <a:buChar char="•"/>
+            </a:pPr>
+            <a:r>
+              <a:rPr lang="en-US" b="0" dirty="0">
+                <a:sym typeface="Wingdings" panose="05000000000000000000" pitchFamily="2" charset="2"/>
+              </a:rPr>
+              <a:t>Running 3 </a:t>
+            </a:r>
+            <a:r>
+              <a:rPr lang="en-US" b="0" dirty="0">
+                <a:solidFill>
+                  <a:srgbClr val="00B050"/>
+                </a:solidFill>
+                <a:sym typeface="Wingdings" panose="05000000000000000000" pitchFamily="2" charset="2"/>
+              </a:rPr>
+              <a:t>parallel threads for efficiency </a:t>
+            </a:r>
+            <a:r>
+              <a:rPr lang="en-US" b="0" dirty="0">
+                <a:sym typeface="Wingdings" panose="05000000000000000000" pitchFamily="2" charset="2"/>
+              </a:rPr>
+              <a:t>(tracking, local mapping, and loop closure)</a:t>
+            </a:r>
+            <a:endParaRPr lang="en-US" b="0" dirty="0">
+              <a:solidFill>
+                <a:srgbClr val="00B050"/>
+              </a:solidFill>
+            </a:endParaRPr>
+          </a:p>
+        </p:txBody>
+      </p:sp>
+      <p:sp>
+        <p:nvSpPr>
+          <p:cNvPr id="12" name="Title 11">
+            <a:extLst>
+              <a:ext uri="{FF2B5EF4-FFF2-40B4-BE49-F238E27FC236}">
+                <a16:creationId xmlns:a16="http://schemas.microsoft.com/office/drawing/2014/main" id="{2DD2AFE4-63BE-45E4-B15C-024DB8D8D5D6}"/>
+              </a:ext>
+            </a:extLst>
+          </p:cNvPr>
+          <p:cNvSpPr>
+            <a:spLocks noGrp="1"/>
+          </p:cNvSpPr>
+          <p:nvPr>
+            <p:ph type="title"/>
+          </p:nvPr>
+        </p:nvSpPr>
+        <p:spPr/>
+        <p:txBody>
+          <a:bodyPr/>
+          <a:lstStyle/>
+          <a:p>
+            <a:r>
+              <a:rPr lang="en-US" dirty="0"/>
+              <a:t>Literature Review</a:t>
+            </a:r>
+          </a:p>
+        </p:txBody>
+      </p:sp>
+    </p:spTree>
+    <p:extLst>
+      <p:ext uri="{BB962C8B-B14F-4D97-AF65-F5344CB8AC3E}">
+        <p14:creationId xmlns:p14="http://schemas.microsoft.com/office/powerpoint/2010/main" val="2932802091"/>
+      </p:ext>
+    </p:extLst>
+  </p:cSld>
+  <p:clrMapOvr>
+    <a:masterClrMapping/>
+  </p:clrMapOvr>
+</p:sld>
+</file>
+
+<file path=ppt/slides/slide9.xml><?xml version="1.0" encoding="utf-8"?>
+<p:sld xmlns:a="http://schemas.openxmlformats.org/drawingml/2006/main" xmlns:r="http://schemas.openxmlformats.org/officeDocument/2006/relationships" xmlns:p="http://schemas.openxmlformats.org/presentationml/2006/main">
+  <p:cSld>
+    <p:spTree>
+      <p:nvGrpSpPr>
+        <p:cNvPr id="1" name=""/>
+        <p:cNvGrpSpPr/>
+        <p:nvPr/>
+      </p:nvGrpSpPr>
+      <p:grpSpPr>
+        <a:xfrm>
+          <a:off x="0" y="0"/>
+          <a:ext cx="0" cy="0"/>
+          <a:chOff x="0" y="0"/>
+          <a:chExt cx="0" cy="0"/>
+        </a:xfrm>
+      </p:grpSpPr>
+      <p:sp>
+        <p:nvSpPr>
+          <p:cNvPr id="13" name="Text Placeholder 12">
+            <a:extLst>
+              <a:ext uri="{FF2B5EF4-FFF2-40B4-BE49-F238E27FC236}">
+                <a16:creationId xmlns:a16="http://schemas.microsoft.com/office/drawing/2014/main" id="{03B27027-B59A-4E6B-B377-A7A8C7EF4555}"/>
+              </a:ext>
+            </a:extLst>
+          </p:cNvPr>
+          <p:cNvSpPr>
+            <a:spLocks noGrp="1"/>
+          </p:cNvSpPr>
+          <p:nvPr>
+            <p:ph type="body" sz="quarter" idx="16"/>
+          </p:nvPr>
+        </p:nvSpPr>
+        <p:spPr/>
+        <p:txBody>
+          <a:bodyPr/>
+          <a:lstStyle/>
+          <a:p>
+            <a:pPr marL="342900" indent="-342900">
+              <a:buFont typeface="Arial" panose="020B0604020202020204" pitchFamily="34" charset="0"/>
+              <a:buChar char="•"/>
+            </a:pPr>
+            <a:r>
+              <a:rPr lang="en-US" dirty="0"/>
+              <a:t>RTAB-Map vs. ORB-SLAM 2</a:t>
+            </a:r>
+          </a:p>
+        </p:txBody>
+      </p:sp>
+      <p:sp>
+        <p:nvSpPr>
+          <p:cNvPr id="12" name="Title 11">
+            <a:extLst>
+              <a:ext uri="{FF2B5EF4-FFF2-40B4-BE49-F238E27FC236}">
+                <a16:creationId xmlns:a16="http://schemas.microsoft.com/office/drawing/2014/main" id="{2DD2AFE4-63BE-45E4-B15C-024DB8D8D5D6}"/>
+              </a:ext>
+            </a:extLst>
+          </p:cNvPr>
+          <p:cNvSpPr>
+            <a:spLocks noGrp="1"/>
+          </p:cNvSpPr>
+          <p:nvPr>
+            <p:ph type="title"/>
+          </p:nvPr>
+        </p:nvSpPr>
+        <p:spPr/>
+        <p:txBody>
+          <a:bodyPr/>
+          <a:lstStyle/>
+          <a:p>
+            <a:r>
+              <a:rPr lang="en-US" dirty="0"/>
+              <a:t>Literature Review</a:t>
+            </a:r>
+          </a:p>
+        </p:txBody>
+      </p:sp>
+      <p:graphicFrame>
+        <p:nvGraphicFramePr>
+          <p:cNvPr id="2" name="Table 2">
+            <a:extLst>
+              <a:ext uri="{FF2B5EF4-FFF2-40B4-BE49-F238E27FC236}">
+                <a16:creationId xmlns:a16="http://schemas.microsoft.com/office/drawing/2014/main" id="{854250E6-FA62-4C99-9CE2-3B84274CF1B2}"/>
+              </a:ext>
+            </a:extLst>
+          </p:cNvPr>
+          <p:cNvGraphicFramePr>
+            <a:graphicFrameLocks noGrp="1"/>
+          </p:cNvGraphicFramePr>
+          <p:nvPr>
+            <p:extLst>
+              <p:ext uri="{D42A27DB-BD31-4B8C-83A1-F6EECF244321}">
+                <p14:modId xmlns:p14="http://schemas.microsoft.com/office/powerpoint/2010/main" val="3407882936"/>
+              </p:ext>
+            </p:extLst>
+          </p:nvPr>
+        </p:nvGraphicFramePr>
+        <p:xfrm>
+          <a:off x="274749" y="2131095"/>
+          <a:ext cx="8495764" cy="4207647"/>
+        </p:xfrm>
+        <a:graphic>
+          <a:graphicData uri="http://schemas.openxmlformats.org/drawingml/2006/table">
+            <a:tbl>
+              <a:tblPr firstRow="1" bandRow="1">
+                <a:tableStyleId>{BC89EF96-8CEA-46FF-86C4-4CE0E7609802}</a:tableStyleId>
+              </a:tblPr>
+              <a:tblGrid>
+                <a:gridCol w="1811628">
+                  <a:extLst>
+                    <a:ext uri="{9D8B030D-6E8A-4147-A177-3AD203B41FA5}">
+                      <a16:colId xmlns:a16="http://schemas.microsoft.com/office/drawing/2014/main" val="3508328808"/>
+                    </a:ext>
+                  </a:extLst>
+                </a:gridCol>
+                <a:gridCol w="3342068">
+                  <a:extLst>
+                    <a:ext uri="{9D8B030D-6E8A-4147-A177-3AD203B41FA5}">
+                      <a16:colId xmlns:a16="http://schemas.microsoft.com/office/drawing/2014/main" val="823931593"/>
+                    </a:ext>
+                  </a:extLst>
+                </a:gridCol>
+                <a:gridCol w="3342068">
+                  <a:extLst>
+                    <a:ext uri="{9D8B030D-6E8A-4147-A177-3AD203B41FA5}">
+                      <a16:colId xmlns:a16="http://schemas.microsoft.com/office/drawing/2014/main" val="3096973783"/>
+                    </a:ext>
+                  </a:extLst>
+                </a:gridCol>
+              </a:tblGrid>
+              <a:tr h="367167">
+                <a:tc>
+                  <a:txBody>
+                    <a:bodyPr/>
+                    <a:lstStyle/>
+                    <a:p>
+                      <a:endParaRPr lang="en-US" dirty="0"/>
+                    </a:p>
+                  </a:txBody>
+                  <a:tcPr/>
+                </a:tc>
+                <a:tc>
+                  <a:txBody>
+                    <a:bodyPr/>
+                    <a:lstStyle/>
+                    <a:p>
+                      <a:pPr algn="ctr"/>
+                      <a:r>
+                        <a:rPr lang="en-US" dirty="0"/>
+                        <a:t>RTAB-Map</a:t>
+                      </a:r>
+                    </a:p>
+                  </a:txBody>
+                  <a:tcPr/>
+                </a:tc>
+                <a:tc>
+                  <a:txBody>
+                    <a:bodyPr/>
+                    <a:lstStyle/>
+                    <a:p>
+                      <a:pPr algn="ctr"/>
+                      <a:r>
+                        <a:rPr lang="en-US" dirty="0"/>
+                        <a:t>ORB-SLAM2</a:t>
+                      </a:r>
+                    </a:p>
+                  </a:txBody>
+                  <a:tcPr/>
+                </a:tc>
+                <a:extLst>
+                  <a:ext uri="{0D108BD9-81ED-4DB2-BD59-A6C34878D82A}">
+                    <a16:rowId xmlns:a16="http://schemas.microsoft.com/office/drawing/2014/main" val="2284187269"/>
+                  </a:ext>
+                </a:extLst>
+              </a:tr>
+              <a:tr h="367167">
+                <a:tc>
+                  <a:txBody>
+                    <a:bodyPr/>
+                    <a:lstStyle/>
+                    <a:p>
+                      <a:pPr algn="ctr"/>
+                      <a:r>
+                        <a:rPr lang="en-US" b="1" dirty="0">
+                          <a:solidFill>
+                            <a:srgbClr val="00B050"/>
+                          </a:solidFill>
+                        </a:rPr>
+                        <a:t>Advantages</a:t>
+                      </a:r>
+                    </a:p>
+                  </a:txBody>
+                  <a:tcPr anchor="ctr"/>
+                </a:tc>
+                <a:tc>
+                  <a:txBody>
+                    <a:bodyPr/>
+                    <a:lstStyle/>
+                    <a:p>
+                      <a:pPr marL="285750" indent="-285750">
+                        <a:buFont typeface="Arial" panose="020B0604020202020204" pitchFamily="34" charset="0"/>
+                        <a:buChar char="•"/>
+                      </a:pPr>
+                      <a:r>
+                        <a:rPr lang="en-US" sz="1600" dirty="0"/>
+                        <a:t>Can accept a wide range of sensors as inputs. </a:t>
+                      </a:r>
+                    </a:p>
+                    <a:p>
+                      <a:pPr marL="285750" indent="-285750">
+                        <a:buFont typeface="Arial" panose="020B0604020202020204" pitchFamily="34" charset="0"/>
+                        <a:buChar char="•"/>
+                      </a:pPr>
+                      <a:r>
+                        <a:rPr lang="en-US" sz="1600" dirty="0"/>
+                        <a:t>Better trajectory estimation.</a:t>
+                      </a:r>
+                    </a:p>
+                    <a:p>
+                      <a:pPr marL="285750" indent="-285750">
+                        <a:buFont typeface="Arial" panose="020B0604020202020204" pitchFamily="34" charset="0"/>
+                        <a:buChar char="•"/>
+                      </a:pPr>
+                      <a:r>
+                        <a:rPr lang="en-US" sz="1600" dirty="0"/>
+                        <a:t>Better loop closure mechanism based on </a:t>
+                      </a:r>
+                      <a:r>
+                        <a:rPr lang="en-US" sz="1600" dirty="0" err="1"/>
+                        <a:t>BoW</a:t>
+                      </a:r>
+                      <a:r>
+                        <a:rPr lang="en-US" sz="1600" dirty="0"/>
+                        <a:t>.</a:t>
+                      </a:r>
+                    </a:p>
+                    <a:p>
+                      <a:pPr marL="285750" indent="-285750">
+                        <a:buFont typeface="Arial" panose="020B0604020202020204" pitchFamily="34" charset="0"/>
+                        <a:buChar char="•"/>
+                      </a:pPr>
+                      <a:r>
+                        <a:rPr lang="en-US" sz="1600" dirty="0"/>
+                        <a:t>Works better outdoors.</a:t>
+                      </a:r>
+                    </a:p>
+                    <a:p>
+                      <a:pPr marL="285750" indent="-285750">
+                        <a:buFont typeface="Arial" panose="020B0604020202020204" pitchFamily="34" charset="0"/>
+                        <a:buChar char="•"/>
+                      </a:pPr>
+                      <a:r>
+                        <a:rPr lang="en-US" sz="1600" dirty="0"/>
+                        <a:t>Dense map generation.</a:t>
+                      </a:r>
+                    </a:p>
+                    <a:p>
+                      <a:pPr marL="285750" indent="-285750">
+                        <a:buFont typeface="Arial" panose="020B0604020202020204" pitchFamily="34" charset="0"/>
+                        <a:buChar char="•"/>
+                      </a:pPr>
+                      <a:r>
+                        <a:rPr lang="en-US" sz="1600" dirty="0"/>
+                        <a:t>Better </a:t>
+                      </a:r>
+                      <a:r>
+                        <a:rPr lang="en-US" sz="1600" b="1" dirty="0"/>
+                        <a:t>RMS</a:t>
+                      </a:r>
+                      <a:r>
+                        <a:rPr lang="en-US" sz="1600" dirty="0"/>
+                        <a:t> trajectory error. </a:t>
+                      </a:r>
+                    </a:p>
+                  </a:txBody>
+                  <a:tcPr/>
+                </a:tc>
+                <a:tc>
+                  <a:txBody>
+                    <a:bodyPr/>
+                    <a:lstStyle/>
+                    <a:p>
+                      <a:pPr marL="285750" indent="-285750">
+                        <a:buFont typeface="Arial" panose="020B0604020202020204" pitchFamily="34" charset="0"/>
+                        <a:buChar char="•"/>
+                      </a:pPr>
+                      <a:r>
+                        <a:rPr lang="en-US" sz="1600" dirty="0"/>
+                        <a:t>Work with Monocular, Stereo, and RGB-D camera. </a:t>
+                      </a:r>
+                    </a:p>
+                    <a:p>
+                      <a:pPr marL="285750" indent="-285750">
+                        <a:buFont typeface="Arial" panose="020B0604020202020204" pitchFamily="34" charset="0"/>
+                        <a:buChar char="•"/>
+                      </a:pPr>
+                      <a:r>
+                        <a:rPr lang="en-US" sz="1600" dirty="0"/>
+                        <a:t>Better odometry measurements</a:t>
+                      </a:r>
+                    </a:p>
+                    <a:p>
+                      <a:pPr marL="285750" indent="-285750">
+                        <a:buFont typeface="Arial" panose="020B0604020202020204" pitchFamily="34" charset="0"/>
+                        <a:buChar char="•"/>
+                      </a:pPr>
+                      <a:r>
+                        <a:rPr lang="en-US" sz="1600" dirty="0"/>
+                        <a:t>Small number of outliers</a:t>
+                      </a:r>
+                    </a:p>
+                    <a:p>
+                      <a:pPr marL="285750" indent="-285750">
+                        <a:buFont typeface="Arial" panose="020B0604020202020204" pitchFamily="34" charset="0"/>
+                        <a:buChar char="•"/>
+                      </a:pPr>
+                      <a:r>
+                        <a:rPr lang="en-US" sz="1600" dirty="0"/>
+                        <a:t>Works better indoors</a:t>
+                      </a:r>
+                    </a:p>
+                    <a:p>
+                      <a:pPr marL="285750" indent="-285750">
+                        <a:buFont typeface="Arial" panose="020B0604020202020204" pitchFamily="34" charset="0"/>
+                        <a:buChar char="•"/>
+                      </a:pPr>
+                      <a:r>
+                        <a:rPr lang="en-US" sz="1600" dirty="0"/>
+                        <a:t>Strong loop closure resulting in rejection of false estimates. </a:t>
+                      </a:r>
+                    </a:p>
+                    <a:p>
+                      <a:pPr marL="285750" indent="-285750">
+                        <a:buFont typeface="Arial" panose="020B0604020202020204" pitchFamily="34" charset="0"/>
+                        <a:buChar char="•"/>
+                      </a:pPr>
+                      <a:r>
+                        <a:rPr lang="en-US" sz="1600" dirty="0"/>
+                        <a:t>Better </a:t>
+                      </a:r>
+                      <a:r>
+                        <a:rPr lang="en-US" sz="1600" b="1" dirty="0"/>
+                        <a:t>Max</a:t>
+                      </a:r>
+                      <a:r>
+                        <a:rPr lang="en-US" sz="1600" dirty="0"/>
+                        <a:t>. trajectory error. </a:t>
+                      </a:r>
+                    </a:p>
+                  </a:txBody>
+                  <a:tcPr/>
+                </a:tc>
+                <a:extLst>
+                  <a:ext uri="{0D108BD9-81ED-4DB2-BD59-A6C34878D82A}">
+                    <a16:rowId xmlns:a16="http://schemas.microsoft.com/office/drawing/2014/main" val="4085972108"/>
+                  </a:ext>
+                </a:extLst>
+              </a:tr>
+              <a:tr h="367167">
+                <a:tc>
+                  <a:txBody>
+                    <a:bodyPr/>
+                    <a:lstStyle/>
+                    <a:p>
+                      <a:pPr algn="ctr"/>
+                      <a:r>
+                        <a:rPr lang="en-US" b="1" dirty="0">
+                          <a:solidFill>
+                            <a:srgbClr val="FF0000"/>
+                          </a:solidFill>
+                        </a:rPr>
+                        <a:t>Disadvantages</a:t>
+                      </a:r>
+                    </a:p>
+                  </a:txBody>
+                  <a:tcPr anchor="ctr"/>
+                </a:tc>
+                <a:tc>
+                  <a:txBody>
+                    <a:bodyPr/>
+                    <a:lstStyle/>
+                    <a:p>
+                      <a:pPr marL="285750" indent="-285750">
+                        <a:buFont typeface="Arial" panose="020B0604020202020204" pitchFamily="34" charset="0"/>
+                        <a:buChar char="•"/>
+                      </a:pPr>
+                      <a:r>
+                        <a:rPr lang="en-US" sz="1600" dirty="0"/>
+                        <a:t>Bad odometry measurements.</a:t>
+                      </a:r>
+                    </a:p>
+                    <a:p>
+                      <a:pPr marL="285750" indent="-285750">
+                        <a:buFont typeface="Arial" panose="020B0604020202020204" pitchFamily="34" charset="0"/>
+                        <a:buChar char="•"/>
+                      </a:pPr>
+                      <a:r>
+                        <a:rPr lang="en-US" sz="1600" dirty="0"/>
+                        <a:t>Repeated surfaces due to odometry noise. </a:t>
+                      </a:r>
+                    </a:p>
+                    <a:p>
+                      <a:pPr marL="285750" indent="-285750">
+                        <a:buFont typeface="Arial" panose="020B0604020202020204" pitchFamily="34" charset="0"/>
+                        <a:buChar char="•"/>
+                      </a:pPr>
+                      <a:r>
+                        <a:rPr lang="en-US" sz="1600" dirty="0"/>
+                        <a:t>Performance depends on the environment when using internal odometry engine. </a:t>
+                      </a:r>
+                    </a:p>
+                    <a:p>
+                      <a:pPr marL="285750" indent="-285750">
+                        <a:buFont typeface="Arial" panose="020B0604020202020204" pitchFamily="34" charset="0"/>
+                        <a:buChar char="•"/>
+                      </a:pPr>
+                      <a:r>
+                        <a:rPr lang="en-US" sz="1600" dirty="0"/>
+                        <a:t>Lack of map optimization. </a:t>
+                      </a:r>
+                    </a:p>
+                  </a:txBody>
+                  <a:tcPr/>
+                </a:tc>
+                <a:tc>
+                  <a:txBody>
+                    <a:bodyPr/>
+                    <a:lstStyle/>
+                    <a:p>
+                      <a:pPr marL="285750" indent="-285750">
+                        <a:buFont typeface="Arial" panose="020B0604020202020204" pitchFamily="34" charset="0"/>
+                        <a:buChar char="•"/>
+                      </a:pPr>
+                      <a:r>
+                        <a:rPr lang="en-US" sz="1600" dirty="0"/>
+                        <a:t>Long initialization / re-initialization time.</a:t>
+                      </a:r>
+                    </a:p>
+                    <a:p>
+                      <a:pPr marL="285750" indent="-285750">
+                        <a:buFont typeface="Arial" panose="020B0604020202020204" pitchFamily="34" charset="0"/>
+                        <a:buChar char="•"/>
+                      </a:pPr>
+                      <a:r>
+                        <a:rPr lang="en-US" sz="1600" dirty="0"/>
+                        <a:t>Sparse non-detailed map.</a:t>
+                      </a:r>
+                    </a:p>
+                    <a:p>
+                      <a:pPr marL="285750" indent="-285750">
+                        <a:buFont typeface="Arial" panose="020B0604020202020204" pitchFamily="34" charset="0"/>
+                        <a:buChar char="•"/>
+                      </a:pPr>
+                      <a:r>
+                        <a:rPr lang="en-US" sz="1600" dirty="0"/>
+                        <a:t>Missing loop closure and allow the trajectory drift to be visible.</a:t>
+                      </a:r>
+                    </a:p>
+                  </a:txBody>
+                  <a:tcPr/>
+                </a:tc>
+                <a:extLst>
+                  <a:ext uri="{0D108BD9-81ED-4DB2-BD59-A6C34878D82A}">
+                    <a16:rowId xmlns:a16="http://schemas.microsoft.com/office/drawing/2014/main" val="1140184644"/>
+                  </a:ext>
+                </a:extLst>
+              </a:tr>
+            </a:tbl>
+          </a:graphicData>
+        </a:graphic>
+      </p:graphicFrame>
+    </p:spTree>
+    <p:extLst>
+      <p:ext uri="{BB962C8B-B14F-4D97-AF65-F5344CB8AC3E}">
+        <p14:creationId xmlns:p14="http://schemas.microsoft.com/office/powerpoint/2010/main" val="1728297064"/>
       </p:ext>
     </p:extLst>
   </p:cSld>

</xml_diff>